<commit_message>
Added Sounds slide to presentation
</commit_message>
<xml_diff>
--- a/Introduction to Pygame.pptx
+++ b/Introduction to Pygame.pptx
@@ -5,7 +5,7 @@
     <p:sldMasterId id="2147483648" r:id="rId1"/>
   </p:sldMasterIdLst>
   <p:notesMasterIdLst>
-    <p:notesMasterId r:id="rId37"/>
+    <p:notesMasterId r:id="rId38"/>
   </p:notesMasterIdLst>
   <p:sldIdLst>
     <p:sldId id="256" r:id="rId2"/>
@@ -34,15 +34,16 @@
     <p:sldId id="296" r:id="rId25"/>
     <p:sldId id="302" r:id="rId26"/>
     <p:sldId id="303" r:id="rId27"/>
-    <p:sldId id="297" r:id="rId28"/>
-    <p:sldId id="298" r:id="rId29"/>
-    <p:sldId id="304" r:id="rId30"/>
-    <p:sldId id="299" r:id="rId31"/>
-    <p:sldId id="305" r:id="rId32"/>
-    <p:sldId id="306" r:id="rId33"/>
-    <p:sldId id="300" r:id="rId34"/>
-    <p:sldId id="307" r:id="rId35"/>
-    <p:sldId id="301" r:id="rId36"/>
+    <p:sldId id="308" r:id="rId28"/>
+    <p:sldId id="297" r:id="rId29"/>
+    <p:sldId id="298" r:id="rId30"/>
+    <p:sldId id="304" r:id="rId31"/>
+    <p:sldId id="299" r:id="rId32"/>
+    <p:sldId id="305" r:id="rId33"/>
+    <p:sldId id="306" r:id="rId34"/>
+    <p:sldId id="300" r:id="rId35"/>
+    <p:sldId id="307" r:id="rId36"/>
+    <p:sldId id="301" r:id="rId37"/>
   </p:sldIdLst>
   <p:sldSz cx="12192000" cy="6858000"/>
   <p:notesSz cx="6858000" cy="9144000"/>
@@ -141,6 +142,11 @@
       </a:defRPr>
     </a:lvl9pPr>
   </p:defaultTextStyle>
+  <p:extLst>
+    <p:ext uri="{EFAFB233-063F-42B5-8137-9DF3F51BA10A}">
+      <p15:sldGuideLst xmlns:p15="http://schemas.microsoft.com/office/powerpoint/2012/main"/>
+    </p:ext>
+  </p:extLst>
 </p:presentation>
 </file>
 
@@ -642,7 +648,7 @@
           <a:p>
             <a:fld id="{3B730669-1943-413D-86BC-0568B6A0A813}" type="slidenum">
               <a:rPr lang="en-US" smtClean="0"/>
-              <a:t>31</a:t>
+              <a:t>32</a:t>
             </a:fld>
             <a:endParaRPr lang="en-US"/>
           </a:p>
@@ -750,7 +756,7 @@
           <a:p>
             <a:fld id="{3B730669-1943-413D-86BC-0568B6A0A813}" type="slidenum">
               <a:rPr lang="en-US" smtClean="0"/>
-              <a:t>32</a:t>
+              <a:t>33</a:t>
             </a:fld>
             <a:endParaRPr lang="en-US"/>
           </a:p>
@@ -916,7 +922,7 @@
           <a:p>
             <a:fld id="{6CD20D5A-348B-41D0-9FA9-82A2762E5F2F}" type="datetimeFigureOut">
               <a:rPr lang="en-US" smtClean="0"/>
-              <a:t>9/23/2025</a:t>
+              <a:t>9/24/2025</a:t>
             </a:fld>
             <a:endParaRPr lang="en-US"/>
           </a:p>
@@ -1114,7 +1120,7 @@
           <a:p>
             <a:fld id="{6CD20D5A-348B-41D0-9FA9-82A2762E5F2F}" type="datetimeFigureOut">
               <a:rPr lang="en-US" smtClean="0"/>
-              <a:t>9/23/2025</a:t>
+              <a:t>9/24/2025</a:t>
             </a:fld>
             <a:endParaRPr lang="en-US"/>
           </a:p>
@@ -1322,7 +1328,7 @@
           <a:p>
             <a:fld id="{6CD20D5A-348B-41D0-9FA9-82A2762E5F2F}" type="datetimeFigureOut">
               <a:rPr lang="en-US" smtClean="0"/>
-              <a:t>9/23/2025</a:t>
+              <a:t>9/24/2025</a:t>
             </a:fld>
             <a:endParaRPr lang="en-US"/>
           </a:p>
@@ -1520,7 +1526,7 @@
           <a:p>
             <a:fld id="{6CD20D5A-348B-41D0-9FA9-82A2762E5F2F}" type="datetimeFigureOut">
               <a:rPr lang="en-US" smtClean="0"/>
-              <a:t>9/23/2025</a:t>
+              <a:t>9/24/2025</a:t>
             </a:fld>
             <a:endParaRPr lang="en-US"/>
           </a:p>
@@ -1795,7 +1801,7 @@
           <a:p>
             <a:fld id="{6CD20D5A-348B-41D0-9FA9-82A2762E5F2F}" type="datetimeFigureOut">
               <a:rPr lang="en-US" smtClean="0"/>
-              <a:t>9/23/2025</a:t>
+              <a:t>9/24/2025</a:t>
             </a:fld>
             <a:endParaRPr lang="en-US"/>
           </a:p>
@@ -2060,7 +2066,7 @@
           <a:p>
             <a:fld id="{6CD20D5A-348B-41D0-9FA9-82A2762E5F2F}" type="datetimeFigureOut">
               <a:rPr lang="en-US" smtClean="0"/>
-              <a:t>9/23/2025</a:t>
+              <a:t>9/24/2025</a:t>
             </a:fld>
             <a:endParaRPr lang="en-US"/>
           </a:p>
@@ -2472,7 +2478,7 @@
           <a:p>
             <a:fld id="{6CD20D5A-348B-41D0-9FA9-82A2762E5F2F}" type="datetimeFigureOut">
               <a:rPr lang="en-US" smtClean="0"/>
-              <a:t>9/23/2025</a:t>
+              <a:t>9/24/2025</a:t>
             </a:fld>
             <a:endParaRPr lang="en-US"/>
           </a:p>
@@ -2613,7 +2619,7 @@
           <a:p>
             <a:fld id="{6CD20D5A-348B-41D0-9FA9-82A2762E5F2F}" type="datetimeFigureOut">
               <a:rPr lang="en-US" smtClean="0"/>
-              <a:t>9/23/2025</a:t>
+              <a:t>9/24/2025</a:t>
             </a:fld>
             <a:endParaRPr lang="en-US"/>
           </a:p>
@@ -2726,7 +2732,7 @@
           <a:p>
             <a:fld id="{6CD20D5A-348B-41D0-9FA9-82A2762E5F2F}" type="datetimeFigureOut">
               <a:rPr lang="en-US" smtClean="0"/>
-              <a:t>9/23/2025</a:t>
+              <a:t>9/24/2025</a:t>
             </a:fld>
             <a:endParaRPr lang="en-US"/>
           </a:p>
@@ -3037,7 +3043,7 @@
           <a:p>
             <a:fld id="{6CD20D5A-348B-41D0-9FA9-82A2762E5F2F}" type="datetimeFigureOut">
               <a:rPr lang="en-US" smtClean="0"/>
-              <a:t>9/23/2025</a:t>
+              <a:t>9/24/2025</a:t>
             </a:fld>
             <a:endParaRPr lang="en-US"/>
           </a:p>
@@ -3325,7 +3331,7 @@
           <a:p>
             <a:fld id="{6CD20D5A-348B-41D0-9FA9-82A2762E5F2F}" type="datetimeFigureOut">
               <a:rPr lang="en-US" smtClean="0"/>
-              <a:t>9/23/2025</a:t>
+              <a:t>9/24/2025</a:t>
             </a:fld>
             <a:endParaRPr lang="en-US"/>
           </a:p>
@@ -3566,7 +3572,7 @@
           <a:p>
             <a:fld id="{6CD20D5A-348B-41D0-9FA9-82A2762E5F2F}" type="datetimeFigureOut">
               <a:rPr lang="en-US" smtClean="0"/>
-              <a:t>9/23/2025</a:t>
+              <a:t>9/24/2025</a:t>
             </a:fld>
             <a:endParaRPr lang="en-US"/>
           </a:p>
@@ -11515,7 +11521,7 @@
         <p:cNvPr id="1" name="">
           <a:extLst>
             <a:ext uri="{FF2B5EF4-FFF2-40B4-BE49-F238E27FC236}">
-              <a16:creationId xmlns:a16="http://schemas.microsoft.com/office/drawing/2014/main" id="{6B8F0633-A6C1-2825-F3F3-00578AB3E25F}"/>
+              <a16:creationId xmlns:a16="http://schemas.microsoft.com/office/drawing/2014/main" id="{5C7A12BF-819B-AD00-5D02-57B66537F16F}"/>
             </a:ext>
           </a:extLst>
         </p:cNvPr>
@@ -11535,7 +11541,7 @@
           <p:cNvPr id="17" name="Rectangle 16">
             <a:extLst>
               <a:ext uri="{FF2B5EF4-FFF2-40B4-BE49-F238E27FC236}">
-                <a16:creationId xmlns:a16="http://schemas.microsoft.com/office/drawing/2014/main" id="{8CD68FB0-0ACF-11A3-B07F-FB26936385A7}"/>
+                <a16:creationId xmlns:a16="http://schemas.microsoft.com/office/drawing/2014/main" id="{F7C4A7C6-D3A1-DC20-CDA6-0A036CDDCFF5}"/>
               </a:ext>
               <a:ext uri="{C183D7F6-B498-43B3-948B-1728B52AA6E4}">
                 <adec:decorative xmlns:adec="http://schemas.microsoft.com/office/drawing/2017/decorative" val="1"/>
@@ -11600,7 +11606,7 @@
           <p:cNvPr id="19" name="Rectangle 18">
             <a:extLst>
               <a:ext uri="{FF2B5EF4-FFF2-40B4-BE49-F238E27FC236}">
-                <a16:creationId xmlns:a16="http://schemas.microsoft.com/office/drawing/2014/main" id="{795A460D-832F-9404-D4D4-3B46A3A7AEF2}"/>
+                <a16:creationId xmlns:a16="http://schemas.microsoft.com/office/drawing/2014/main" id="{644FC658-E79E-EEAB-FE39-287D39D06AD9}"/>
               </a:ext>
               <a:ext uri="{C183D7F6-B498-43B3-948B-1728B52AA6E4}">
                 <adec:decorative xmlns:adec="http://schemas.microsoft.com/office/drawing/2017/decorative" val="1"/>
@@ -11666,7 +11672,7 @@
           <p:cNvPr id="2" name="Title 1">
             <a:extLst>
               <a:ext uri="{FF2B5EF4-FFF2-40B4-BE49-F238E27FC236}">
-                <a16:creationId xmlns:a16="http://schemas.microsoft.com/office/drawing/2014/main" id="{650CB223-668C-7A5E-CE5B-D06BE47604CD}"/>
+                <a16:creationId xmlns:a16="http://schemas.microsoft.com/office/drawing/2014/main" id="{86A96EE2-66A7-70EF-5D81-C8774414528C}"/>
               </a:ext>
             </a:extLst>
           </p:cNvPr>
@@ -11696,7 +11702,7 @@
                   <a:schemeClr val="bg1"/>
                 </a:solidFill>
               </a:rPr>
-              <a:t>Sprite class</a:t>
+              <a:t>Sounds</a:t>
             </a:r>
           </a:p>
         </p:txBody>
@@ -11706,7 +11712,7 @@
           <p:cNvPr id="3" name="Content Placeholder 2">
             <a:extLst>
               <a:ext uri="{FF2B5EF4-FFF2-40B4-BE49-F238E27FC236}">
-                <a16:creationId xmlns:a16="http://schemas.microsoft.com/office/drawing/2014/main" id="{298CB288-E2BC-8843-E5A8-2FF09D9CEEBB}"/>
+                <a16:creationId xmlns:a16="http://schemas.microsoft.com/office/drawing/2014/main" id="{391F5161-B534-5F81-BA76-59324586B416}"/>
               </a:ext>
             </a:extLst>
           </p:cNvPr>
@@ -11725,7 +11731,7 @@
         </p:spPr>
         <p:txBody>
           <a:bodyPr>
-            <a:normAutofit/>
+            <a:noAutofit/>
           </a:bodyPr>
           <a:lstStyle/>
           <a:p>
@@ -11734,185 +11740,150 @@
             </a:pPr>
             <a:r>
               <a:rPr lang="en-US" dirty="0"/>
-              <a:t>The sprite class is used to unify the surface and the </a:t>
+              <a:t>Load sound:</a:t>
+            </a:r>
+          </a:p>
+          <a:p>
+            <a:pPr marL="0" indent="0">
+              <a:buNone/>
+            </a:pPr>
+            <a:r>
+              <a:rPr lang="en-US" dirty="0"/>
+              <a:t>sound = </a:t>
             </a:r>
             <a:r>
               <a:rPr lang="en-US" dirty="0" err="1"/>
-              <a:t>rect</a:t>
-            </a:r>
-            <a:r>
-              <a:rPr lang="en-US" dirty="0"/>
-              <a:t> under one object</a:t>
-            </a:r>
-          </a:p>
-          <a:p>
-            <a:pPr marL="0" indent="0">
-              <a:buNone/>
-            </a:pPr>
-            <a:r>
-              <a:rPr lang="en-US" dirty="0"/>
-              <a:t>Example</a:t>
-            </a:r>
-          </a:p>
-          <a:p>
-            <a:pPr marL="0" indent="0">
-              <a:buNone/>
-            </a:pPr>
-            <a:r>
-              <a:rPr lang="en-US" dirty="0"/>
-              <a:t>class Player(</a:t>
-            </a:r>
+              <a:t>pygame.mixer.load</a:t>
+            </a:r>
+            <a:r>
+              <a:rPr lang="en-US" dirty="0"/>
+              <a:t>(‘path/to/sound’)</a:t>
+            </a:r>
+          </a:p>
+          <a:p>
+            <a:pPr marL="0" indent="0">
+              <a:buNone/>
+            </a:pPr>
+            <a:r>
+              <a:rPr lang="en-US" dirty="0"/>
+              <a:t>Adjust volume:</a:t>
+            </a:r>
+          </a:p>
+          <a:p>
+            <a:pPr marL="0" indent="0">
+              <a:buNone/>
+            </a:pPr>
             <a:r>
               <a:rPr lang="en-US" dirty="0" err="1"/>
-              <a:t>pygame.sprite.Sprite</a:t>
-            </a:r>
-            <a:r>
-              <a:rPr lang="en-US" dirty="0"/>
-              <a:t>):</a:t>
-            </a:r>
-          </a:p>
-          <a:p>
-            <a:pPr marL="0" indent="0">
-              <a:buNone/>
-            </a:pPr>
-            <a:r>
-              <a:rPr lang="en-US" dirty="0"/>
-              <a:t>	self.__</a:t>
-            </a:r>
+              <a:t>sound.set_volume</a:t>
+            </a:r>
+            <a:r>
+              <a:rPr lang="en-US" dirty="0"/>
+              <a:t>(percentage) </a:t>
+            </a:r>
+          </a:p>
+          <a:p>
+            <a:pPr marL="0" indent="0">
+              <a:buNone/>
+            </a:pPr>
+            <a:r>
+              <a:rPr lang="en-US" dirty="0"/>
+              <a:t>Play Sound once:</a:t>
+            </a:r>
+          </a:p>
+          <a:p>
+            <a:pPr marL="0" indent="0">
+              <a:buNone/>
+            </a:pPr>
             <a:r>
               <a:rPr lang="en-US" dirty="0" err="1"/>
-              <a:t>init</a:t>
-            </a:r>
-            <a:r>
-              <a:rPr lang="en-US" dirty="0"/>
-              <a:t>__(self):</a:t>
-            </a:r>
-          </a:p>
-          <a:p>
-            <a:pPr marL="0" indent="0">
-              <a:buNone/>
-            </a:pPr>
-            <a:r>
-              <a:rPr lang="en-US" dirty="0"/>
-              <a:t>		super().__</a:t>
+              <a:t>sound.play</a:t>
+            </a:r>
+            <a:r>
+              <a:rPr lang="en-US" dirty="0"/>
+              <a:t>()</a:t>
+            </a:r>
+          </a:p>
+          <a:p>
+            <a:pPr marL="0" indent="0">
+              <a:buNone/>
+            </a:pPr>
+            <a:r>
+              <a:rPr lang="en-US" dirty="0"/>
+              <a:t>Play Sound </a:t>
             </a:r>
             <a:r>
               <a:rPr lang="en-US" dirty="0" err="1"/>
-              <a:t>init</a:t>
-            </a:r>
-            <a:r>
-              <a:rPr lang="en-US" dirty="0"/>
-              <a:t>__()</a:t>
-            </a:r>
-          </a:p>
-          <a:p>
-            <a:pPr marL="0" indent="0">
-              <a:buNone/>
-            </a:pPr>
-            <a:r>
-              <a:rPr lang="en-US" dirty="0"/>
-              <a:t>		</a:t>
-            </a:r>
+              <a:t>multplie</a:t>
+            </a:r>
+            <a:r>
+              <a:rPr lang="en-US" dirty="0"/>
+              <a:t> times:</a:t>
+            </a:r>
+          </a:p>
+          <a:p>
+            <a:pPr marL="0" indent="0">
+              <a:buNone/>
+            </a:pPr>
             <a:r>
               <a:rPr lang="en-US" dirty="0" err="1"/>
-              <a:t>self.image</a:t>
-            </a:r>
-            <a:r>
-              <a:rPr lang="en-US" dirty="0"/>
-              <a:t> = </a:t>
-            </a:r>
+              <a:t>sound.play</a:t>
+            </a:r>
+            <a:r>
+              <a:rPr lang="en-US" dirty="0"/>
+              <a:t>(n) #plays sound n times</a:t>
+            </a:r>
+          </a:p>
+          <a:p>
+            <a:pPr marL="0" indent="0">
+              <a:buNone/>
+            </a:pPr>
+            <a:r>
+              <a:rPr lang="en-US" dirty="0"/>
+              <a:t>Loop forever:</a:t>
+            </a:r>
+          </a:p>
+          <a:p>
+            <a:pPr marL="0" indent="0">
+              <a:buNone/>
+            </a:pPr>
             <a:r>
               <a:rPr lang="en-US" dirty="0" err="1"/>
-              <a:t>pygame.Surface</a:t>
-            </a:r>
-            <a:r>
-              <a:rPr lang="en-US" dirty="0"/>
-              <a:t>((</a:t>
-            </a:r>
+              <a:t>sound.play</a:t>
+            </a:r>
+            <a:r>
+              <a:rPr lang="en-US" dirty="0"/>
+              <a:t>(-1)</a:t>
+            </a:r>
+          </a:p>
+          <a:p>
+            <a:pPr marL="0" indent="0">
+              <a:buNone/>
+            </a:pPr>
+            <a:r>
+              <a:rPr lang="en-US" dirty="0"/>
+              <a:t>Stop:</a:t>
+            </a:r>
+          </a:p>
+          <a:p>
+            <a:pPr marL="0" indent="0">
+              <a:buNone/>
+            </a:pPr>
             <a:r>
               <a:rPr lang="en-US" dirty="0" err="1"/>
-              <a:t>w,h</a:t>
-            </a:r>
-            <a:r>
-              <a:rPr lang="en-US" dirty="0"/>
-              <a:t>))</a:t>
-            </a:r>
-          </a:p>
-          <a:p>
-            <a:pPr marL="0" indent="0">
-              <a:buNone/>
-            </a:pPr>
-            <a:r>
-              <a:rPr lang="en-US" dirty="0"/>
-              <a:t>		</a:t>
-            </a:r>
-            <a:r>
-              <a:rPr lang="en-US" dirty="0" err="1"/>
-              <a:t>self.rect</a:t>
-            </a:r>
-            <a:r>
-              <a:rPr lang="en-US" dirty="0"/>
-              <a:t> = </a:t>
-            </a:r>
-            <a:r>
-              <a:rPr lang="en-US" dirty="0" err="1"/>
-              <a:t>self.image.get_rect</a:t>
+              <a:t>sound.stop</a:t>
             </a:r>
             <a:r>
               <a:rPr lang="en-US" dirty="0"/>
               <a:t>()</a:t>
             </a:r>
-          </a:p>
-          <a:p>
-            <a:pPr marL="0" indent="0">
-              <a:buNone/>
-            </a:pPr>
-            <a:r>
-              <a:rPr lang="en-US" dirty="0" err="1"/>
-              <a:t>self.image</a:t>
-            </a:r>
-            <a:r>
-              <a:rPr lang="en-US" dirty="0"/>
-              <a:t> and </a:t>
-            </a:r>
-            <a:r>
-              <a:rPr lang="en-US" dirty="0" err="1"/>
-              <a:t>self.rect</a:t>
-            </a:r>
-            <a:r>
-              <a:rPr lang="en-US" dirty="0"/>
-              <a:t> are required attributes in a </a:t>
-            </a:r>
-            <a:r>
-              <a:rPr lang="en-US" dirty="0" err="1"/>
-              <a:t>pygame</a:t>
-            </a:r>
-            <a:r>
-              <a:rPr lang="en-US" dirty="0"/>
-              <a:t> Sprite</a:t>
-            </a:r>
-          </a:p>
-          <a:p>
-            <a:pPr marL="0" indent="0">
-              <a:buNone/>
-            </a:pPr>
-            <a:r>
-              <a:rPr lang="en-US" dirty="0"/>
-              <a:t>This may seem no different than if you were to create a class, but the real advantage is when you put sprites into groups.</a:t>
-            </a:r>
-          </a:p>
-          <a:p>
-            <a:pPr marL="0" indent="0">
-              <a:buNone/>
-            </a:pPr>
-            <a:endParaRPr lang="en-US" dirty="0"/>
           </a:p>
         </p:txBody>
       </p:sp>
     </p:spTree>
     <p:extLst>
       <p:ext uri="{BB962C8B-B14F-4D97-AF65-F5344CB8AC3E}">
-        <p14:creationId xmlns:p14="http://schemas.microsoft.com/office/powerpoint/2010/main" val="1199816036"/>
+        <p14:creationId xmlns:p14="http://schemas.microsoft.com/office/powerpoint/2010/main" val="662332618"/>
       </p:ext>
     </p:extLst>
   </p:cSld>
@@ -11938,7 +11909,7 @@
         <p:cNvPr id="1" name="">
           <a:extLst>
             <a:ext uri="{FF2B5EF4-FFF2-40B4-BE49-F238E27FC236}">
-              <a16:creationId xmlns:a16="http://schemas.microsoft.com/office/drawing/2014/main" id="{D9E2BB2A-1563-76E7-D9B7-D594C38C240B}"/>
+              <a16:creationId xmlns:a16="http://schemas.microsoft.com/office/drawing/2014/main" id="{6B8F0633-A6C1-2825-F3F3-00578AB3E25F}"/>
             </a:ext>
           </a:extLst>
         </p:cNvPr>
@@ -11958,7 +11929,7 @@
           <p:cNvPr id="17" name="Rectangle 16">
             <a:extLst>
               <a:ext uri="{FF2B5EF4-FFF2-40B4-BE49-F238E27FC236}">
-                <a16:creationId xmlns:a16="http://schemas.microsoft.com/office/drawing/2014/main" id="{50406A51-B634-3944-E849-993E546F1B6E}"/>
+                <a16:creationId xmlns:a16="http://schemas.microsoft.com/office/drawing/2014/main" id="{8CD68FB0-0ACF-11A3-B07F-FB26936385A7}"/>
               </a:ext>
               <a:ext uri="{C183D7F6-B498-43B3-948B-1728B52AA6E4}">
                 <adec:decorative xmlns:adec="http://schemas.microsoft.com/office/drawing/2017/decorative" val="1"/>
@@ -12023,7 +11994,7 @@
           <p:cNvPr id="19" name="Rectangle 18">
             <a:extLst>
               <a:ext uri="{FF2B5EF4-FFF2-40B4-BE49-F238E27FC236}">
-                <a16:creationId xmlns:a16="http://schemas.microsoft.com/office/drawing/2014/main" id="{4CD2E302-06FE-539B-47B4-2D0394348944}"/>
+                <a16:creationId xmlns:a16="http://schemas.microsoft.com/office/drawing/2014/main" id="{795A460D-832F-9404-D4D4-3B46A3A7AEF2}"/>
               </a:ext>
               <a:ext uri="{C183D7F6-B498-43B3-948B-1728B52AA6E4}">
                 <adec:decorative xmlns:adec="http://schemas.microsoft.com/office/drawing/2017/decorative" val="1"/>
@@ -12089,7 +12060,7 @@
           <p:cNvPr id="2" name="Title 1">
             <a:extLst>
               <a:ext uri="{FF2B5EF4-FFF2-40B4-BE49-F238E27FC236}">
-                <a16:creationId xmlns:a16="http://schemas.microsoft.com/office/drawing/2014/main" id="{DD5696DA-D024-1A36-6703-5CD44EB01FAC}"/>
+                <a16:creationId xmlns:a16="http://schemas.microsoft.com/office/drawing/2014/main" id="{650CB223-668C-7A5E-CE5B-D06BE47604CD}"/>
               </a:ext>
             </a:extLst>
           </p:cNvPr>
@@ -12119,7 +12090,7 @@
                   <a:schemeClr val="bg1"/>
                 </a:solidFill>
               </a:rPr>
-              <a:t>Sprite Groups</a:t>
+              <a:t>Sprite class</a:t>
             </a:r>
           </a:p>
         </p:txBody>
@@ -12129,7 +12100,7 @@
           <p:cNvPr id="3" name="Content Placeholder 2">
             <a:extLst>
               <a:ext uri="{FF2B5EF4-FFF2-40B4-BE49-F238E27FC236}">
-                <a16:creationId xmlns:a16="http://schemas.microsoft.com/office/drawing/2014/main" id="{28AD36F4-9DCC-B329-C3D6-377CF2F39288}"/>
+                <a16:creationId xmlns:a16="http://schemas.microsoft.com/office/drawing/2014/main" id="{298CB288-E2BC-8843-E5A8-2FF09D9CEEBB}"/>
               </a:ext>
             </a:extLst>
           </p:cNvPr>
@@ -12157,7 +12128,154 @@
             </a:pPr>
             <a:r>
               <a:rPr lang="en-US" dirty="0"/>
-              <a:t>A group in </a:t>
+              <a:t>The sprite class is used to unify the surface and the </a:t>
+            </a:r>
+            <a:r>
+              <a:rPr lang="en-US" dirty="0" err="1"/>
+              <a:t>rect</a:t>
+            </a:r>
+            <a:r>
+              <a:rPr lang="en-US" dirty="0"/>
+              <a:t> under one object</a:t>
+            </a:r>
+          </a:p>
+          <a:p>
+            <a:pPr marL="0" indent="0">
+              <a:buNone/>
+            </a:pPr>
+            <a:r>
+              <a:rPr lang="en-US" dirty="0"/>
+              <a:t>Example</a:t>
+            </a:r>
+          </a:p>
+          <a:p>
+            <a:pPr marL="0" indent="0">
+              <a:buNone/>
+            </a:pPr>
+            <a:r>
+              <a:rPr lang="en-US" dirty="0"/>
+              <a:t>class Player(</a:t>
+            </a:r>
+            <a:r>
+              <a:rPr lang="en-US" dirty="0" err="1"/>
+              <a:t>pygame.sprite.Sprite</a:t>
+            </a:r>
+            <a:r>
+              <a:rPr lang="en-US" dirty="0"/>
+              <a:t>):</a:t>
+            </a:r>
+          </a:p>
+          <a:p>
+            <a:pPr marL="0" indent="0">
+              <a:buNone/>
+            </a:pPr>
+            <a:r>
+              <a:rPr lang="en-US" dirty="0"/>
+              <a:t>	self.__</a:t>
+            </a:r>
+            <a:r>
+              <a:rPr lang="en-US" dirty="0" err="1"/>
+              <a:t>init</a:t>
+            </a:r>
+            <a:r>
+              <a:rPr lang="en-US" dirty="0"/>
+              <a:t>__(self):</a:t>
+            </a:r>
+          </a:p>
+          <a:p>
+            <a:pPr marL="0" indent="0">
+              <a:buNone/>
+            </a:pPr>
+            <a:r>
+              <a:rPr lang="en-US" dirty="0"/>
+              <a:t>		super().__</a:t>
+            </a:r>
+            <a:r>
+              <a:rPr lang="en-US" dirty="0" err="1"/>
+              <a:t>init</a:t>
+            </a:r>
+            <a:r>
+              <a:rPr lang="en-US" dirty="0"/>
+              <a:t>__()</a:t>
+            </a:r>
+          </a:p>
+          <a:p>
+            <a:pPr marL="0" indent="0">
+              <a:buNone/>
+            </a:pPr>
+            <a:r>
+              <a:rPr lang="en-US" dirty="0"/>
+              <a:t>		</a:t>
+            </a:r>
+            <a:r>
+              <a:rPr lang="en-US" dirty="0" err="1"/>
+              <a:t>self.image</a:t>
+            </a:r>
+            <a:r>
+              <a:rPr lang="en-US" dirty="0"/>
+              <a:t> = </a:t>
+            </a:r>
+            <a:r>
+              <a:rPr lang="en-US" dirty="0" err="1"/>
+              <a:t>pygame.Surface</a:t>
+            </a:r>
+            <a:r>
+              <a:rPr lang="en-US" dirty="0"/>
+              <a:t>((</a:t>
+            </a:r>
+            <a:r>
+              <a:rPr lang="en-US" dirty="0" err="1"/>
+              <a:t>w,h</a:t>
+            </a:r>
+            <a:r>
+              <a:rPr lang="en-US" dirty="0"/>
+              <a:t>))</a:t>
+            </a:r>
+          </a:p>
+          <a:p>
+            <a:pPr marL="0" indent="0">
+              <a:buNone/>
+            </a:pPr>
+            <a:r>
+              <a:rPr lang="en-US" dirty="0"/>
+              <a:t>		</a:t>
+            </a:r>
+            <a:r>
+              <a:rPr lang="en-US" dirty="0" err="1"/>
+              <a:t>self.rect</a:t>
+            </a:r>
+            <a:r>
+              <a:rPr lang="en-US" dirty="0"/>
+              <a:t> = </a:t>
+            </a:r>
+            <a:r>
+              <a:rPr lang="en-US" dirty="0" err="1"/>
+              <a:t>self.image.get_rect</a:t>
+            </a:r>
+            <a:r>
+              <a:rPr lang="en-US" dirty="0"/>
+              <a:t>()</a:t>
+            </a:r>
+          </a:p>
+          <a:p>
+            <a:pPr marL="0" indent="0">
+              <a:buNone/>
+            </a:pPr>
+            <a:r>
+              <a:rPr lang="en-US" dirty="0" err="1"/>
+              <a:t>self.image</a:t>
+            </a:r>
+            <a:r>
+              <a:rPr lang="en-US" dirty="0"/>
+              <a:t> and </a:t>
+            </a:r>
+            <a:r>
+              <a:rPr lang="en-US" dirty="0" err="1"/>
+              <a:t>self.rect</a:t>
+            </a:r>
+            <a:r>
+              <a:rPr lang="en-US" dirty="0"/>
+              <a:t> are required attributes in a </a:t>
             </a:r>
             <a:r>
               <a:rPr lang="en-US" dirty="0" err="1"/>
@@ -12165,127 +12283,30 @@
             </a:r>
             <a:r>
               <a:rPr lang="en-US" dirty="0"/>
-              <a:t> is a collection of sprites</a:t>
-            </a:r>
-          </a:p>
-          <a:p>
-            <a:pPr marL="0" indent="0">
-              <a:buNone/>
-            </a:pPr>
-            <a:r>
-              <a:rPr lang="en-US" dirty="0" err="1"/>
-              <a:t>Pygame</a:t>
-            </a:r>
-            <a:r>
-              <a:rPr lang="en-US" dirty="0"/>
-              <a:t> has two types of sprite groups</a:t>
-            </a:r>
-          </a:p>
-          <a:p>
-            <a:pPr marL="0" indent="0">
-              <a:buNone/>
-            </a:pPr>
-            <a:r>
-              <a:rPr lang="en-US" dirty="0"/>
-              <a:t>Group for multiple sprites</a:t>
-            </a:r>
-          </a:p>
-          <a:p>
-            <a:pPr marL="0" indent="0">
-              <a:buNone/>
-            </a:pPr>
-            <a:r>
-              <a:rPr lang="en-US" dirty="0" err="1"/>
-              <a:t>GroupSingle</a:t>
-            </a:r>
-            <a:r>
-              <a:rPr lang="en-US" dirty="0"/>
-              <a:t> for a single sprite</a:t>
-            </a:r>
-          </a:p>
-          <a:p>
-            <a:pPr marL="0" indent="0">
-              <a:buNone/>
-            </a:pPr>
-            <a:r>
-              <a:rPr lang="en-US" dirty="0"/>
-              <a:t>Group has a draw method that uses a sprites, image and </a:t>
-            </a:r>
-            <a:r>
-              <a:rPr lang="en-US" dirty="0" err="1"/>
-              <a:t>rect</a:t>
-            </a:r>
-            <a:r>
-              <a:rPr lang="en-US" dirty="0"/>
-              <a:t> to draw the sprites on a surface</a:t>
-            </a:r>
-          </a:p>
-          <a:p>
-            <a:pPr marL="0" indent="0">
-              <a:buNone/>
-            </a:pPr>
-            <a:r>
-              <a:rPr lang="en-US" dirty="0"/>
-              <a:t>Group has an update method that calls the update method of sprites in the group</a:t>
-            </a:r>
-          </a:p>
-          <a:p>
-            <a:pPr marL="0" indent="0">
-              <a:buNone/>
-            </a:pPr>
-            <a:r>
-              <a:rPr lang="en-US" dirty="0"/>
-              <a:t>Creating groups:</a:t>
-            </a:r>
-          </a:p>
-          <a:p>
-            <a:pPr marL="0" indent="0">
-              <a:buNone/>
-            </a:pPr>
-            <a:r>
-              <a:rPr lang="en-US" dirty="0" err="1"/>
-              <a:t>player_group</a:t>
-            </a:r>
-            <a:r>
-              <a:rPr lang="en-US" dirty="0"/>
-              <a:t> = </a:t>
-            </a:r>
-            <a:r>
-              <a:rPr lang="en-US" dirty="0" err="1"/>
-              <a:t>pygame.sprite.GroupSingle</a:t>
-            </a:r>
-            <a:r>
-              <a:rPr lang="en-US" dirty="0"/>
-              <a:t>()</a:t>
-            </a:r>
-          </a:p>
-          <a:p>
-            <a:pPr marL="0" indent="0">
-              <a:buNone/>
-            </a:pPr>
-            <a:r>
-              <a:rPr lang="en-US" dirty="0" err="1"/>
-              <a:t>Projectile_group</a:t>
-            </a:r>
-            <a:r>
-              <a:rPr lang="en-US" dirty="0"/>
-              <a:t> = </a:t>
-            </a:r>
-            <a:r>
-              <a:rPr lang="en-US" dirty="0" err="1"/>
-              <a:t>pygame.sprite.Group</a:t>
-            </a:r>
-            <a:r>
-              <a:rPr lang="en-US" dirty="0"/>
-              <a:t>()</a:t>
-            </a:r>
+              <a:t> Sprite</a:t>
+            </a:r>
+          </a:p>
+          <a:p>
+            <a:pPr marL="0" indent="0">
+              <a:buNone/>
+            </a:pPr>
+            <a:r>
+              <a:rPr lang="en-US" dirty="0"/>
+              <a:t>This may seem no different than if you were to create a class, but the real advantage is when you put sprites into groups.</a:t>
+            </a:r>
+          </a:p>
+          <a:p>
+            <a:pPr marL="0" indent="0">
+              <a:buNone/>
+            </a:pPr>
+            <a:endParaRPr lang="en-US" dirty="0"/>
           </a:p>
         </p:txBody>
       </p:sp>
     </p:spTree>
     <p:extLst>
       <p:ext uri="{BB962C8B-B14F-4D97-AF65-F5344CB8AC3E}">
-        <p14:creationId xmlns:p14="http://schemas.microsoft.com/office/powerpoint/2010/main" val="4114934819"/>
+        <p14:creationId xmlns:p14="http://schemas.microsoft.com/office/powerpoint/2010/main" val="1199816036"/>
       </p:ext>
     </p:extLst>
   </p:cSld>
@@ -12311,7 +12332,7 @@
         <p:cNvPr id="1" name="">
           <a:extLst>
             <a:ext uri="{FF2B5EF4-FFF2-40B4-BE49-F238E27FC236}">
-              <a16:creationId xmlns:a16="http://schemas.microsoft.com/office/drawing/2014/main" id="{12DD3006-2B5B-C92B-FC97-3927EC2AA197}"/>
+              <a16:creationId xmlns:a16="http://schemas.microsoft.com/office/drawing/2014/main" id="{D9E2BB2A-1563-76E7-D9B7-D594C38C240B}"/>
             </a:ext>
           </a:extLst>
         </p:cNvPr>
@@ -12331,7 +12352,7 @@
           <p:cNvPr id="17" name="Rectangle 16">
             <a:extLst>
               <a:ext uri="{FF2B5EF4-FFF2-40B4-BE49-F238E27FC236}">
-                <a16:creationId xmlns:a16="http://schemas.microsoft.com/office/drawing/2014/main" id="{1BAA7391-2E20-05D1-F011-70EB777C28C0}"/>
+                <a16:creationId xmlns:a16="http://schemas.microsoft.com/office/drawing/2014/main" id="{50406A51-B634-3944-E849-993E546F1B6E}"/>
               </a:ext>
               <a:ext uri="{C183D7F6-B498-43B3-948B-1728B52AA6E4}">
                 <adec:decorative xmlns:adec="http://schemas.microsoft.com/office/drawing/2017/decorative" val="1"/>
@@ -12396,7 +12417,7 @@
           <p:cNvPr id="19" name="Rectangle 18">
             <a:extLst>
               <a:ext uri="{FF2B5EF4-FFF2-40B4-BE49-F238E27FC236}">
-                <a16:creationId xmlns:a16="http://schemas.microsoft.com/office/drawing/2014/main" id="{A392D9CC-9004-F69E-7A51-515FA60587AC}"/>
+                <a16:creationId xmlns:a16="http://schemas.microsoft.com/office/drawing/2014/main" id="{4CD2E302-06FE-539B-47B4-2D0394348944}"/>
               </a:ext>
               <a:ext uri="{C183D7F6-B498-43B3-948B-1728B52AA6E4}">
                 <adec:decorative xmlns:adec="http://schemas.microsoft.com/office/drawing/2017/decorative" val="1"/>
@@ -12462,7 +12483,7 @@
           <p:cNvPr id="2" name="Title 1">
             <a:extLst>
               <a:ext uri="{FF2B5EF4-FFF2-40B4-BE49-F238E27FC236}">
-                <a16:creationId xmlns:a16="http://schemas.microsoft.com/office/drawing/2014/main" id="{3A5F4C17-CFE5-5CB7-B311-0602C163D62B}"/>
+                <a16:creationId xmlns:a16="http://schemas.microsoft.com/office/drawing/2014/main" id="{DD5696DA-D024-1A36-6703-5CD44EB01FAC}"/>
               </a:ext>
             </a:extLst>
           </p:cNvPr>
@@ -12502,7 +12523,7 @@
           <p:cNvPr id="3" name="Content Placeholder 2">
             <a:extLst>
               <a:ext uri="{FF2B5EF4-FFF2-40B4-BE49-F238E27FC236}">
-                <a16:creationId xmlns:a16="http://schemas.microsoft.com/office/drawing/2014/main" id="{EBA37450-CC87-1B6A-ADFE-E1F8D9910594}"/>
+                <a16:creationId xmlns:a16="http://schemas.microsoft.com/office/drawing/2014/main" id="{28AD36F4-9DCC-B329-C3D6-377CF2F39288}"/>
               </a:ext>
             </a:extLst>
           </p:cNvPr>
@@ -12515,8 +12536,8 @@
         </p:nvSpPr>
         <p:spPr>
           <a:xfrm>
-            <a:off x="3740382" y="0"/>
-            <a:ext cx="8451607" cy="6858000"/>
+            <a:off x="3740383" y="637762"/>
+            <a:ext cx="7876993" cy="6220238"/>
           </a:xfrm>
         </p:spPr>
         <p:txBody>
@@ -12530,160 +12551,135 @@
             </a:pPr>
             <a:r>
               <a:rPr lang="en-US" dirty="0"/>
-              <a:t>Drawing sprites in a group to screen:</a:t>
-            </a:r>
-          </a:p>
-          <a:p>
-            <a:pPr marL="0" indent="0">
-              <a:buNone/>
-            </a:pPr>
-            <a:r>
-              <a:rPr lang="en-US" dirty="0"/>
-              <a:t>	</a:t>
+              <a:t>A group in </a:t>
             </a:r>
             <a:r>
               <a:rPr lang="en-US" dirty="0" err="1"/>
-              <a:t>player_group.draw</a:t>
-            </a:r>
-            <a:r>
-              <a:rPr lang="en-US" dirty="0"/>
-              <a:t>(screen)</a:t>
-            </a:r>
-          </a:p>
-          <a:p>
-            <a:pPr marL="0" indent="0">
-              <a:buNone/>
-            </a:pPr>
-            <a:r>
-              <a:rPr lang="en-US" dirty="0"/>
-              <a:t>Updating sprites:</a:t>
-            </a:r>
-          </a:p>
-          <a:p>
-            <a:pPr marL="0" indent="0">
-              <a:buNone/>
-            </a:pPr>
-            <a:r>
-              <a:rPr lang="en-US" dirty="0"/>
-              <a:t>class Player(</a:t>
-            </a:r>
+              <a:t>pygame</a:t>
+            </a:r>
+            <a:r>
+              <a:rPr lang="en-US" dirty="0"/>
+              <a:t> is a collection of sprites</a:t>
+            </a:r>
+          </a:p>
+          <a:p>
+            <a:pPr marL="0" indent="0">
+              <a:buNone/>
+            </a:pPr>
             <a:r>
               <a:rPr lang="en-US" dirty="0" err="1"/>
-              <a:t>pygame.sprite.Sprite</a:t>
-            </a:r>
-            <a:r>
-              <a:rPr lang="en-US" dirty="0"/>
-              <a:t>):</a:t>
-            </a:r>
-          </a:p>
-          <a:p>
-            <a:pPr marL="0" indent="0">
-              <a:buNone/>
-            </a:pPr>
-            <a:r>
-              <a:rPr lang="en-US" dirty="0"/>
-              <a:t>	self.__</a:t>
-            </a:r>
-            <a:r>
-              <a:rPr lang="en-US" dirty="0" err="1"/>
-              <a:t>init</a:t>
-            </a:r>
-            <a:r>
-              <a:rPr lang="en-US" dirty="0"/>
-              <a:t>__(self):…</a:t>
-            </a:r>
-          </a:p>
-          <a:p>
-            <a:pPr marL="0" indent="0">
-              <a:buNone/>
-            </a:pPr>
-            <a:r>
-              <a:rPr lang="en-US" dirty="0"/>
-              <a:t>	def update(self):</a:t>
-            </a:r>
-          </a:p>
-          <a:p>
-            <a:pPr marL="0" indent="0">
-              <a:buNone/>
-            </a:pPr>
-            <a:r>
-              <a:rPr lang="en-US" dirty="0"/>
-              <a:t>		#update player</a:t>
-            </a:r>
-          </a:p>
-          <a:p>
-            <a:pPr marL="0" indent="0">
-              <a:buNone/>
-            </a:pPr>
-            <a:r>
-              <a:rPr lang="en-US" dirty="0" err="1"/>
-              <a:t>player_group.update</a:t>
-            </a:r>
-            <a:r>
-              <a:rPr lang="en-US" dirty="0"/>
-              <a:t>()</a:t>
-            </a:r>
-          </a:p>
-          <a:p>
-            <a:pPr marL="0" indent="0">
-              <a:buNone/>
-            </a:pPr>
-            <a:r>
-              <a:rPr lang="en-US" dirty="0"/>
-              <a:t>Referencing Sprites in groups:</a:t>
-            </a:r>
-          </a:p>
-          <a:p>
-            <a:pPr marL="0" indent="0">
-              <a:buNone/>
-            </a:pPr>
-            <a:r>
-              <a:rPr lang="en-US" dirty="0"/>
-              <a:t>player = </a:t>
-            </a:r>
-            <a:r>
-              <a:rPr lang="en-US" dirty="0" err="1"/>
-              <a:t>player_group.sprite</a:t>
-            </a:r>
-            <a:r>
-              <a:rPr lang="en-US" dirty="0"/>
-              <a:t> # for </a:t>
-            </a:r>
+              <a:t>Pygame</a:t>
+            </a:r>
+            <a:r>
+              <a:rPr lang="en-US" dirty="0"/>
+              <a:t> has two types of sprite groups</a:t>
+            </a:r>
+          </a:p>
+          <a:p>
+            <a:pPr marL="0" indent="0">
+              <a:buNone/>
+            </a:pPr>
+            <a:r>
+              <a:rPr lang="en-US" dirty="0"/>
+              <a:t>Group for multiple sprites</a:t>
+            </a:r>
+          </a:p>
+          <a:p>
+            <a:pPr marL="0" indent="0">
+              <a:buNone/>
+            </a:pPr>
             <a:r>
               <a:rPr lang="en-US" dirty="0" err="1"/>
               <a:t>GroupSingle</a:t>
             </a:r>
-            <a:endParaRPr lang="en-US" dirty="0"/>
-          </a:p>
-          <a:p>
-            <a:pPr marL="0" indent="0">
-              <a:buNone/>
-            </a:pPr>
-            <a:r>
-              <a:rPr lang="en-US" dirty="0"/>
-              <a:t>projectile = </a:t>
+            <a:r>
+              <a:rPr lang="en-US" dirty="0"/>
+              <a:t> for a single sprite</a:t>
+            </a:r>
+          </a:p>
+          <a:p>
+            <a:pPr marL="0" indent="0">
+              <a:buNone/>
+            </a:pPr>
+            <a:r>
+              <a:rPr lang="en-US" dirty="0"/>
+              <a:t>Group has a draw method that uses a sprites, image and </a:t>
             </a:r>
             <a:r>
               <a:rPr lang="en-US" dirty="0" err="1"/>
-              <a:t>projectile_group.sprites</a:t>
-            </a:r>
-            <a:r>
-              <a:rPr lang="en-US" dirty="0"/>
-              <a:t> # List, for Group</a:t>
-            </a:r>
-          </a:p>
-          <a:p>
-            <a:pPr marL="0" indent="0">
-              <a:buNone/>
-            </a:pPr>
-            <a:endParaRPr lang="en-US" dirty="0"/>
+              <a:t>rect</a:t>
+            </a:r>
+            <a:r>
+              <a:rPr lang="en-US" dirty="0"/>
+              <a:t> to draw the sprites on a surface</a:t>
+            </a:r>
+          </a:p>
+          <a:p>
+            <a:pPr marL="0" indent="0">
+              <a:buNone/>
+            </a:pPr>
+            <a:r>
+              <a:rPr lang="en-US" dirty="0"/>
+              <a:t>Group has an update method that calls the update method of sprites in the group</a:t>
+            </a:r>
+          </a:p>
+          <a:p>
+            <a:pPr marL="0" indent="0">
+              <a:buNone/>
+            </a:pPr>
+            <a:r>
+              <a:rPr lang="en-US" dirty="0"/>
+              <a:t>Creating groups:</a:t>
+            </a:r>
+          </a:p>
+          <a:p>
+            <a:pPr marL="0" indent="0">
+              <a:buNone/>
+            </a:pPr>
+            <a:r>
+              <a:rPr lang="en-US" dirty="0" err="1"/>
+              <a:t>player_group</a:t>
+            </a:r>
+            <a:r>
+              <a:rPr lang="en-US" dirty="0"/>
+              <a:t> = </a:t>
+            </a:r>
+            <a:r>
+              <a:rPr lang="en-US" dirty="0" err="1"/>
+              <a:t>pygame.sprite.GroupSingle</a:t>
+            </a:r>
+            <a:r>
+              <a:rPr lang="en-US" dirty="0"/>
+              <a:t>()</a:t>
+            </a:r>
+          </a:p>
+          <a:p>
+            <a:pPr marL="0" indent="0">
+              <a:buNone/>
+            </a:pPr>
+            <a:r>
+              <a:rPr lang="en-US" dirty="0" err="1"/>
+              <a:t>Projectile_group</a:t>
+            </a:r>
+            <a:r>
+              <a:rPr lang="en-US" dirty="0"/>
+              <a:t> = </a:t>
+            </a:r>
+            <a:r>
+              <a:rPr lang="en-US" dirty="0" err="1"/>
+              <a:t>pygame.sprite.Group</a:t>
+            </a:r>
+            <a:r>
+              <a:rPr lang="en-US" dirty="0"/>
+              <a:t>()</a:t>
+            </a:r>
           </a:p>
         </p:txBody>
       </p:sp>
     </p:spTree>
     <p:extLst>
       <p:ext uri="{BB962C8B-B14F-4D97-AF65-F5344CB8AC3E}">
-        <p14:creationId xmlns:p14="http://schemas.microsoft.com/office/powerpoint/2010/main" val="3207766642"/>
+        <p14:creationId xmlns:p14="http://schemas.microsoft.com/office/powerpoint/2010/main" val="4114934819"/>
       </p:ext>
     </p:extLst>
   </p:cSld>
@@ -13059,7 +13055,7 @@
         <p:cNvPr id="1" name="">
           <a:extLst>
             <a:ext uri="{FF2B5EF4-FFF2-40B4-BE49-F238E27FC236}">
-              <a16:creationId xmlns:a16="http://schemas.microsoft.com/office/drawing/2014/main" id="{E2143FF0-94B0-87EE-7545-F36694EF15B5}"/>
+              <a16:creationId xmlns:a16="http://schemas.microsoft.com/office/drawing/2014/main" id="{12DD3006-2B5B-C92B-FC97-3927EC2AA197}"/>
             </a:ext>
           </a:extLst>
         </p:cNvPr>
@@ -13079,7 +13075,7 @@
           <p:cNvPr id="17" name="Rectangle 16">
             <a:extLst>
               <a:ext uri="{FF2B5EF4-FFF2-40B4-BE49-F238E27FC236}">
-                <a16:creationId xmlns:a16="http://schemas.microsoft.com/office/drawing/2014/main" id="{BC89B25A-394A-6E53-1BFC-72FD48911229}"/>
+                <a16:creationId xmlns:a16="http://schemas.microsoft.com/office/drawing/2014/main" id="{1BAA7391-2E20-05D1-F011-70EB777C28C0}"/>
               </a:ext>
               <a:ext uri="{C183D7F6-B498-43B3-948B-1728B52AA6E4}">
                 <adec:decorative xmlns:adec="http://schemas.microsoft.com/office/drawing/2017/decorative" val="1"/>
@@ -13144,7 +13140,7 @@
           <p:cNvPr id="19" name="Rectangle 18">
             <a:extLst>
               <a:ext uri="{FF2B5EF4-FFF2-40B4-BE49-F238E27FC236}">
-                <a16:creationId xmlns:a16="http://schemas.microsoft.com/office/drawing/2014/main" id="{DDE279A4-E29A-601B-4E2B-FC511AB81D6F}"/>
+                <a16:creationId xmlns:a16="http://schemas.microsoft.com/office/drawing/2014/main" id="{A392D9CC-9004-F69E-7A51-515FA60587AC}"/>
               </a:ext>
               <a:ext uri="{C183D7F6-B498-43B3-948B-1728B52AA6E4}">
                 <adec:decorative xmlns:adec="http://schemas.microsoft.com/office/drawing/2017/decorative" val="1"/>
@@ -13210,7 +13206,7 @@
           <p:cNvPr id="2" name="Title 1">
             <a:extLst>
               <a:ext uri="{FF2B5EF4-FFF2-40B4-BE49-F238E27FC236}">
-                <a16:creationId xmlns:a16="http://schemas.microsoft.com/office/drawing/2014/main" id="{6A14881A-D4DC-0AFA-A714-F8CC90CECD39}"/>
+                <a16:creationId xmlns:a16="http://schemas.microsoft.com/office/drawing/2014/main" id="{3A5F4C17-CFE5-5CB7-B311-0602C163D62B}"/>
               </a:ext>
             </a:extLst>
           </p:cNvPr>
@@ -13240,7 +13236,7 @@
                   <a:schemeClr val="bg1"/>
                 </a:solidFill>
               </a:rPr>
-              <a:t>Spawning Objects</a:t>
+              <a:t>Sprite Groups</a:t>
             </a:r>
           </a:p>
         </p:txBody>
@@ -13250,7 +13246,7 @@
           <p:cNvPr id="3" name="Content Placeholder 2">
             <a:extLst>
               <a:ext uri="{FF2B5EF4-FFF2-40B4-BE49-F238E27FC236}">
-                <a16:creationId xmlns:a16="http://schemas.microsoft.com/office/drawing/2014/main" id="{D9388E04-7286-CC74-A662-A97ADC13A506}"/>
+                <a16:creationId xmlns:a16="http://schemas.microsoft.com/office/drawing/2014/main" id="{EBA37450-CC87-1B6A-ADFE-E1F8D9910594}"/>
               </a:ext>
             </a:extLst>
           </p:cNvPr>
@@ -13263,8 +13259,8 @@
         </p:nvSpPr>
         <p:spPr>
           <a:xfrm>
-            <a:off x="3740383" y="637762"/>
-            <a:ext cx="7876993" cy="6220238"/>
+            <a:off x="3740382" y="0"/>
+            <a:ext cx="8451607" cy="6858000"/>
           </a:xfrm>
         </p:spPr>
         <p:txBody>
@@ -13278,36 +13274,147 @@
             </a:pPr>
             <a:r>
               <a:rPr lang="en-US" dirty="0"/>
-              <a:t>Now that we have our groups and sprites drawing to the screen</a:t>
-            </a:r>
-          </a:p>
-          <a:p>
-            <a:pPr marL="0" indent="0">
-              <a:buNone/>
-            </a:pPr>
-            <a:r>
-              <a:rPr lang="en-US" dirty="0"/>
-              <a:t>We can spawn objects simply by adding them to their group.</a:t>
-            </a:r>
-          </a:p>
-          <a:p>
-            <a:pPr marL="0" indent="0">
-              <a:buNone/>
-            </a:pPr>
+              <a:t>Drawing sprites in a group to screen:</a:t>
+            </a:r>
+          </a:p>
+          <a:p>
+            <a:pPr marL="0" indent="0">
+              <a:buNone/>
+            </a:pPr>
+            <a:r>
+              <a:rPr lang="en-US" dirty="0"/>
+              <a:t>	</a:t>
+            </a:r>
             <a:r>
               <a:rPr lang="en-US" dirty="0" err="1"/>
-              <a:t>player_group.add</a:t>
-            </a:r>
-            <a:r>
-              <a:rPr lang="en-US" dirty="0"/>
-              <a:t>(Player())</a:t>
-            </a:r>
-          </a:p>
-          <a:p>
-            <a:pPr marL="0" indent="0">
-              <a:buNone/>
-            </a:pPr>
+              <a:t>player_group.draw</a:t>
+            </a:r>
+            <a:r>
+              <a:rPr lang="en-US" dirty="0"/>
+              <a:t>(screen)</a:t>
+            </a:r>
+          </a:p>
+          <a:p>
+            <a:pPr marL="0" indent="0">
+              <a:buNone/>
+            </a:pPr>
+            <a:r>
+              <a:rPr lang="en-US" dirty="0"/>
+              <a:t>Updating sprites:</a:t>
+            </a:r>
+          </a:p>
+          <a:p>
+            <a:pPr marL="0" indent="0">
+              <a:buNone/>
+            </a:pPr>
+            <a:r>
+              <a:rPr lang="en-US" dirty="0"/>
+              <a:t>class Player(</a:t>
+            </a:r>
+            <a:r>
+              <a:rPr lang="en-US" dirty="0" err="1"/>
+              <a:t>pygame.sprite.Sprite</a:t>
+            </a:r>
+            <a:r>
+              <a:rPr lang="en-US" dirty="0"/>
+              <a:t>):</a:t>
+            </a:r>
+          </a:p>
+          <a:p>
+            <a:pPr marL="0" indent="0">
+              <a:buNone/>
+            </a:pPr>
+            <a:r>
+              <a:rPr lang="en-US" dirty="0"/>
+              <a:t>	self.__</a:t>
+            </a:r>
+            <a:r>
+              <a:rPr lang="en-US" dirty="0" err="1"/>
+              <a:t>init</a:t>
+            </a:r>
+            <a:r>
+              <a:rPr lang="en-US" dirty="0"/>
+              <a:t>__(self):…</a:t>
+            </a:r>
+          </a:p>
+          <a:p>
+            <a:pPr marL="0" indent="0">
+              <a:buNone/>
+            </a:pPr>
+            <a:r>
+              <a:rPr lang="en-US" dirty="0"/>
+              <a:t>	def update(self):</a:t>
+            </a:r>
+          </a:p>
+          <a:p>
+            <a:pPr marL="0" indent="0">
+              <a:buNone/>
+            </a:pPr>
+            <a:r>
+              <a:rPr lang="en-US" dirty="0"/>
+              <a:t>		#update player</a:t>
+            </a:r>
+          </a:p>
+          <a:p>
+            <a:pPr marL="0" indent="0">
+              <a:buNone/>
+            </a:pPr>
+            <a:r>
+              <a:rPr lang="en-US" dirty="0" err="1"/>
+              <a:t>player_group.update</a:t>
+            </a:r>
+            <a:r>
+              <a:rPr lang="en-US" dirty="0"/>
+              <a:t>()</a:t>
+            </a:r>
+          </a:p>
+          <a:p>
+            <a:pPr marL="0" indent="0">
+              <a:buNone/>
+            </a:pPr>
+            <a:r>
+              <a:rPr lang="en-US" dirty="0"/>
+              <a:t>Referencing Sprites in groups:</a:t>
+            </a:r>
+          </a:p>
+          <a:p>
+            <a:pPr marL="0" indent="0">
+              <a:buNone/>
+            </a:pPr>
+            <a:r>
+              <a:rPr lang="en-US" dirty="0"/>
+              <a:t>player = </a:t>
+            </a:r>
+            <a:r>
+              <a:rPr lang="en-US" dirty="0" err="1"/>
+              <a:t>player_group.sprite</a:t>
+            </a:r>
+            <a:r>
+              <a:rPr lang="en-US" dirty="0"/>
+              <a:t> # for </a:t>
+            </a:r>
+            <a:r>
+              <a:rPr lang="en-US" dirty="0" err="1"/>
+              <a:t>GroupSingle</a:t>
+            </a:r>
             <a:endParaRPr lang="en-US" dirty="0"/>
+          </a:p>
+          <a:p>
+            <a:pPr marL="0" indent="0">
+              <a:buNone/>
+            </a:pPr>
+            <a:r>
+              <a:rPr lang="en-US" dirty="0"/>
+              <a:t>projectile = </a:t>
+            </a:r>
+            <a:r>
+              <a:rPr lang="en-US" dirty="0" err="1"/>
+              <a:t>projectile_group.sprites</a:t>
+            </a:r>
+            <a:r>
+              <a:rPr lang="en-US" dirty="0"/>
+              <a:t> # List, for Group</a:t>
+            </a:r>
           </a:p>
           <a:p>
             <a:pPr marL="0" indent="0">
@@ -13320,7 +13427,7 @@
     </p:spTree>
     <p:extLst>
       <p:ext uri="{BB962C8B-B14F-4D97-AF65-F5344CB8AC3E}">
-        <p14:creationId xmlns:p14="http://schemas.microsoft.com/office/powerpoint/2010/main" val="2556474688"/>
+        <p14:creationId xmlns:p14="http://schemas.microsoft.com/office/powerpoint/2010/main" val="3207766642"/>
       </p:ext>
     </p:extLst>
   </p:cSld>
@@ -13346,7 +13453,7 @@
         <p:cNvPr id="1" name="">
           <a:extLst>
             <a:ext uri="{FF2B5EF4-FFF2-40B4-BE49-F238E27FC236}">
-              <a16:creationId xmlns:a16="http://schemas.microsoft.com/office/drawing/2014/main" id="{B24F0BF3-3A9F-0F86-2AE9-F34E0AE0FE39}"/>
+              <a16:creationId xmlns:a16="http://schemas.microsoft.com/office/drawing/2014/main" id="{E2143FF0-94B0-87EE-7545-F36694EF15B5}"/>
             </a:ext>
           </a:extLst>
         </p:cNvPr>
@@ -13366,7 +13473,7 @@
           <p:cNvPr id="17" name="Rectangle 16">
             <a:extLst>
               <a:ext uri="{FF2B5EF4-FFF2-40B4-BE49-F238E27FC236}">
-                <a16:creationId xmlns:a16="http://schemas.microsoft.com/office/drawing/2014/main" id="{1A16AC5D-6403-3611-7D44-47C96754308F}"/>
+                <a16:creationId xmlns:a16="http://schemas.microsoft.com/office/drawing/2014/main" id="{BC89B25A-394A-6E53-1BFC-72FD48911229}"/>
               </a:ext>
               <a:ext uri="{C183D7F6-B498-43B3-948B-1728B52AA6E4}">
                 <adec:decorative xmlns:adec="http://schemas.microsoft.com/office/drawing/2017/decorative" val="1"/>
@@ -13431,7 +13538,7 @@
           <p:cNvPr id="19" name="Rectangle 18">
             <a:extLst>
               <a:ext uri="{FF2B5EF4-FFF2-40B4-BE49-F238E27FC236}">
-                <a16:creationId xmlns:a16="http://schemas.microsoft.com/office/drawing/2014/main" id="{9EF7BBD7-8E26-8C51-28D1-9FC90DAC73AC}"/>
+                <a16:creationId xmlns:a16="http://schemas.microsoft.com/office/drawing/2014/main" id="{DDE279A4-E29A-601B-4E2B-FC511AB81D6F}"/>
               </a:ext>
               <a:ext uri="{C183D7F6-B498-43B3-948B-1728B52AA6E4}">
                 <adec:decorative xmlns:adec="http://schemas.microsoft.com/office/drawing/2017/decorative" val="1"/>
@@ -13497,7 +13604,7 @@
           <p:cNvPr id="2" name="Title 1">
             <a:extLst>
               <a:ext uri="{FF2B5EF4-FFF2-40B4-BE49-F238E27FC236}">
-                <a16:creationId xmlns:a16="http://schemas.microsoft.com/office/drawing/2014/main" id="{C8D37617-32FC-77A0-83B9-66F002E8AF39}"/>
+                <a16:creationId xmlns:a16="http://schemas.microsoft.com/office/drawing/2014/main" id="{6A14881A-D4DC-0AFA-A714-F8CC90CECD39}"/>
               </a:ext>
             </a:extLst>
           </p:cNvPr>
@@ -13527,7 +13634,7 @@
                   <a:schemeClr val="bg1"/>
                 </a:solidFill>
               </a:rPr>
-              <a:t>Group Collision</a:t>
+              <a:t>Spawning Objects</a:t>
             </a:r>
           </a:p>
         </p:txBody>
@@ -13537,7 +13644,7 @@
           <p:cNvPr id="3" name="Content Placeholder 2">
             <a:extLst>
               <a:ext uri="{FF2B5EF4-FFF2-40B4-BE49-F238E27FC236}">
-                <a16:creationId xmlns:a16="http://schemas.microsoft.com/office/drawing/2014/main" id="{5F1A7350-C248-5286-44DF-A3E6116A1893}"/>
+                <a16:creationId xmlns:a16="http://schemas.microsoft.com/office/drawing/2014/main" id="{D9388E04-7286-CC74-A662-A97ADC13A506}"/>
               </a:ext>
             </a:extLst>
           </p:cNvPr>
@@ -13556,7 +13663,7 @@
         </p:spPr>
         <p:txBody>
           <a:bodyPr>
-            <a:normAutofit lnSpcReduction="10000"/>
+            <a:normAutofit/>
           </a:bodyPr>
           <a:lstStyle/>
           <a:p>
@@ -13565,16 +13672,16 @@
             </a:pPr>
             <a:r>
               <a:rPr lang="en-US" dirty="0"/>
-              <a:t>One of the largest benefits of Sprite Groups is to efficiently handle collisions</a:t>
-            </a:r>
-          </a:p>
-          <a:p>
-            <a:pPr marL="0" indent="0">
-              <a:buNone/>
-            </a:pPr>
-            <a:r>
-              <a:rPr lang="en-US" dirty="0"/>
-              <a:t>To check for collisions between two sprite groups:</a:t>
+              <a:t>Now that we have our groups and sprites drawing to the screen</a:t>
+            </a:r>
+          </a:p>
+          <a:p>
+            <a:pPr marL="0" indent="0">
+              <a:buNone/>
+            </a:pPr>
+            <a:r>
+              <a:rPr lang="en-US" dirty="0"/>
+              <a:t>We can spawn objects simply by adding them to their group.</a:t>
             </a:r>
           </a:p>
           <a:p>
@@ -13583,154 +13690,12 @@
             </a:pPr>
             <a:r>
               <a:rPr lang="en-US" dirty="0" err="1"/>
-              <a:t>GroupSingle</a:t>
-            </a:r>
-            <a:r>
-              <a:rPr lang="en-US" dirty="0"/>
-              <a:t>:</a:t>
-            </a:r>
-          </a:p>
-          <a:p>
-            <a:pPr marL="0" indent="0">
-              <a:buNone/>
-            </a:pPr>
-            <a:r>
-              <a:rPr lang="en-US" dirty="0" err="1"/>
-              <a:t>pygame.sprite.spritecollide</a:t>
-            </a:r>
-            <a:r>
-              <a:rPr lang="en-US" dirty="0"/>
-              <a:t>(</a:t>
-            </a:r>
-            <a:r>
-              <a:rPr lang="en-US" dirty="0" err="1"/>
-              <a:t>group.sprite</a:t>
-            </a:r>
-            <a:r>
-              <a:rPr lang="en-US" dirty="0"/>
-              <a:t>, </a:t>
-            </a:r>
-            <a:r>
-              <a:rPr lang="en-US" dirty="0" err="1"/>
-              <a:t>other_group</a:t>
-            </a:r>
-            <a:r>
-              <a:rPr lang="en-US" dirty="0"/>
-              <a:t>, bool)</a:t>
-            </a:r>
-          </a:p>
-          <a:p>
-            <a:pPr lvl="1"/>
-            <a:r>
-              <a:rPr lang="en-US" sz="2800" dirty="0"/>
-              <a:t>If bool is true, the sprite from </a:t>
-            </a:r>
-            <a:r>
-              <a:rPr lang="en-US" sz="2800" dirty="0" err="1"/>
-              <a:t>other_group</a:t>
-            </a:r>
-            <a:r>
-              <a:rPr lang="en-US" sz="2800" dirty="0"/>
-              <a:t> is destroyed</a:t>
-            </a:r>
-          </a:p>
-          <a:p>
-            <a:pPr lvl="1"/>
-            <a:r>
-              <a:rPr lang="en-US" sz="2800" dirty="0"/>
-              <a:t>Returns a list of sprites in </a:t>
-            </a:r>
-            <a:r>
-              <a:rPr lang="en-US" sz="2800" dirty="0" err="1"/>
-              <a:t>other_group</a:t>
-            </a:r>
-            <a:r>
-              <a:rPr lang="en-US" sz="2800" dirty="0"/>
-              <a:t> detected in the collision</a:t>
-            </a:r>
-          </a:p>
-          <a:p>
-            <a:pPr marL="0" indent="0">
-              <a:buNone/>
-            </a:pPr>
-            <a:r>
-              <a:rPr lang="en-US" dirty="0"/>
-              <a:t>Group:</a:t>
-            </a:r>
-          </a:p>
-          <a:p>
-            <a:pPr marL="0" indent="0">
-              <a:buNone/>
-            </a:pPr>
-            <a:r>
-              <a:rPr lang="en-US" dirty="0" err="1"/>
-              <a:t>pygame.sprite.groupcollide</a:t>
-            </a:r>
-            <a:r>
-              <a:rPr lang="en-US" dirty="0"/>
-              <a:t>(</a:t>
-            </a:r>
-            <a:r>
-              <a:rPr lang="en-US" dirty="0" err="1"/>
-              <a:t>groupA</a:t>
-            </a:r>
-            <a:r>
-              <a:rPr lang="en-US" dirty="0"/>
-              <a:t>, </a:t>
-            </a:r>
-            <a:r>
-              <a:rPr lang="en-US" dirty="0" err="1"/>
-              <a:t>groupB</a:t>
-            </a:r>
-            <a:r>
-              <a:rPr lang="en-US" dirty="0"/>
-              <a:t>, </a:t>
-            </a:r>
-            <a:r>
-              <a:rPr lang="en-US" dirty="0" err="1"/>
-              <a:t>destroyA</a:t>
-            </a:r>
-            <a:r>
-              <a:rPr lang="en-US" dirty="0"/>
-              <a:t>, </a:t>
-            </a:r>
-            <a:r>
-              <a:rPr lang="en-US" dirty="0" err="1"/>
-              <a:t>destroyB</a:t>
-            </a:r>
-            <a:r>
-              <a:rPr lang="en-US" dirty="0"/>
-              <a:t>)</a:t>
-            </a:r>
-          </a:p>
-          <a:p>
-            <a:pPr lvl="1"/>
-            <a:r>
-              <a:rPr lang="en-US" sz="2800" dirty="0"/>
-              <a:t>Returns a </a:t>
-            </a:r>
-            <a:r>
-              <a:rPr lang="en-US" sz="2800" dirty="0" err="1"/>
-              <a:t>Dict</a:t>
-            </a:r>
-            <a:r>
-              <a:rPr lang="en-US" sz="2800" dirty="0"/>
-              <a:t> of &lt;</a:t>
-            </a:r>
-            <a:r>
-              <a:rPr lang="en-US" sz="2800" dirty="0" err="1"/>
-              <a:t>spriteA</a:t>
-            </a:r>
-            <a:r>
-              <a:rPr lang="en-US" sz="2800" dirty="0"/>
-              <a:t>, List&lt;sprite&gt;&gt; </a:t>
-            </a:r>
-          </a:p>
-          <a:p>
-            <a:pPr marL="0" indent="0">
-              <a:buNone/>
-            </a:pPr>
-            <a:endParaRPr lang="en-US" dirty="0"/>
+              <a:t>player_group.add</a:t>
+            </a:r>
+            <a:r>
+              <a:rPr lang="en-US" dirty="0"/>
+              <a:t>(Player())</a:t>
+            </a:r>
           </a:p>
           <a:p>
             <a:pPr marL="0" indent="0">
@@ -13749,7 +13714,7 @@
     </p:spTree>
     <p:extLst>
       <p:ext uri="{BB962C8B-B14F-4D97-AF65-F5344CB8AC3E}">
-        <p14:creationId xmlns:p14="http://schemas.microsoft.com/office/powerpoint/2010/main" val="2705700190"/>
+        <p14:creationId xmlns:p14="http://schemas.microsoft.com/office/powerpoint/2010/main" val="2556474688"/>
       </p:ext>
     </p:extLst>
   </p:cSld>
@@ -13775,7 +13740,7 @@
         <p:cNvPr id="1" name="">
           <a:extLst>
             <a:ext uri="{FF2B5EF4-FFF2-40B4-BE49-F238E27FC236}">
-              <a16:creationId xmlns:a16="http://schemas.microsoft.com/office/drawing/2014/main" id="{C6944D35-42D8-1B17-C17D-19951433D5CC}"/>
+              <a16:creationId xmlns:a16="http://schemas.microsoft.com/office/drawing/2014/main" id="{B24F0BF3-3A9F-0F86-2AE9-F34E0AE0FE39}"/>
             </a:ext>
           </a:extLst>
         </p:cNvPr>
@@ -13795,7 +13760,7 @@
           <p:cNvPr id="17" name="Rectangle 16">
             <a:extLst>
               <a:ext uri="{FF2B5EF4-FFF2-40B4-BE49-F238E27FC236}">
-                <a16:creationId xmlns:a16="http://schemas.microsoft.com/office/drawing/2014/main" id="{42897E6B-597F-02E3-F65F-307B7351A87F}"/>
+                <a16:creationId xmlns:a16="http://schemas.microsoft.com/office/drawing/2014/main" id="{1A16AC5D-6403-3611-7D44-47C96754308F}"/>
               </a:ext>
               <a:ext uri="{C183D7F6-B498-43B3-948B-1728B52AA6E4}">
                 <adec:decorative xmlns:adec="http://schemas.microsoft.com/office/drawing/2017/decorative" val="1"/>
@@ -13860,7 +13825,7 @@
           <p:cNvPr id="19" name="Rectangle 18">
             <a:extLst>
               <a:ext uri="{FF2B5EF4-FFF2-40B4-BE49-F238E27FC236}">
-                <a16:creationId xmlns:a16="http://schemas.microsoft.com/office/drawing/2014/main" id="{894B2AEC-39D6-612D-F695-AF86E3CFAFE9}"/>
+                <a16:creationId xmlns:a16="http://schemas.microsoft.com/office/drawing/2014/main" id="{9EF7BBD7-8E26-8C51-28D1-9FC90DAC73AC}"/>
               </a:ext>
               <a:ext uri="{C183D7F6-B498-43B3-948B-1728B52AA6E4}">
                 <adec:decorative xmlns:adec="http://schemas.microsoft.com/office/drawing/2017/decorative" val="1"/>
@@ -13926,7 +13891,7 @@
           <p:cNvPr id="2" name="Title 1">
             <a:extLst>
               <a:ext uri="{FF2B5EF4-FFF2-40B4-BE49-F238E27FC236}">
-                <a16:creationId xmlns:a16="http://schemas.microsoft.com/office/drawing/2014/main" id="{A9125E4A-C522-C6F0-191C-745C85A832E1}"/>
+                <a16:creationId xmlns:a16="http://schemas.microsoft.com/office/drawing/2014/main" id="{C8D37617-32FC-77A0-83B9-66F002E8AF39}"/>
               </a:ext>
             </a:extLst>
           </p:cNvPr>
@@ -13966,7 +13931,7 @@
           <p:cNvPr id="3" name="Content Placeholder 2">
             <a:extLst>
               <a:ext uri="{FF2B5EF4-FFF2-40B4-BE49-F238E27FC236}">
-                <a16:creationId xmlns:a16="http://schemas.microsoft.com/office/drawing/2014/main" id="{2ECDAAA0-3F4C-8934-E913-749856207A58}"/>
+                <a16:creationId xmlns:a16="http://schemas.microsoft.com/office/drawing/2014/main" id="{5F1A7350-C248-5286-44DF-A3E6116A1893}"/>
               </a:ext>
             </a:extLst>
           </p:cNvPr>
@@ -13980,12 +13945,12 @@
         <p:spPr>
           <a:xfrm>
             <a:off x="3740383" y="637762"/>
-            <a:ext cx="8288707" cy="6220238"/>
+            <a:ext cx="7876993" cy="6220238"/>
           </a:xfrm>
         </p:spPr>
         <p:txBody>
           <a:bodyPr>
-            <a:normAutofit/>
+            <a:normAutofit lnSpcReduction="10000"/>
           </a:bodyPr>
           <a:lstStyle/>
           <a:p>
@@ -13994,26 +13959,35 @@
             </a:pPr>
             <a:r>
               <a:rPr lang="en-US" dirty="0"/>
-              <a:t>Examples:</a:t>
-            </a:r>
-          </a:p>
-          <a:p>
-            <a:pPr marL="0" indent="0">
-              <a:buNone/>
-            </a:pPr>
-            <a:r>
-              <a:rPr lang="en-US" dirty="0"/>
-              <a:t>Single collide with group</a:t>
-            </a:r>
-          </a:p>
-          <a:p>
-            <a:pPr marL="0" indent="0">
-              <a:buNone/>
-            </a:pPr>
-            <a:r>
-              <a:rPr lang="en-US" dirty="0"/>
-              <a:t>for sprite  in </a:t>
-            </a:r>
+              <a:t>One of the largest benefits of Sprite Groups is to efficiently handle collisions</a:t>
+            </a:r>
+          </a:p>
+          <a:p>
+            <a:pPr marL="0" indent="0">
+              <a:buNone/>
+            </a:pPr>
+            <a:r>
+              <a:rPr lang="en-US" dirty="0"/>
+              <a:t>To check for collisions between two sprite groups:</a:t>
+            </a:r>
+          </a:p>
+          <a:p>
+            <a:pPr marL="0" indent="0">
+              <a:buNone/>
+            </a:pPr>
+            <a:r>
+              <a:rPr lang="en-US" dirty="0" err="1"/>
+              <a:t>GroupSingle</a:t>
+            </a:r>
+            <a:r>
+              <a:rPr lang="en-US" dirty="0"/>
+              <a:t>:</a:t>
+            </a:r>
+          </a:p>
+          <a:p>
+            <a:pPr marL="0" indent="0">
+              <a:buNone/>
+            </a:pPr>
             <a:r>
               <a:rPr lang="en-US" dirty="0" err="1"/>
               <a:t>pygame.sprite.spritecollide</a:t>
@@ -14024,69 +13998,64 @@
             </a:r>
             <a:r>
               <a:rPr lang="en-US" dirty="0" err="1"/>
-              <a:t>a.sprite</a:t>
-            </a:r>
-            <a:r>
-              <a:rPr lang="en-US" dirty="0"/>
-              <a:t>, b, False,):</a:t>
-            </a:r>
-          </a:p>
-          <a:p>
-            <a:pPr marL="0" indent="0">
-              <a:buNone/>
-            </a:pPr>
-            <a:r>
-              <a:rPr lang="en-US" dirty="0"/>
-              <a:t>	print(f’{</a:t>
+              <a:t>group.sprite</a:t>
+            </a:r>
+            <a:r>
+              <a:rPr lang="en-US" dirty="0"/>
+              <a:t>, </a:t>
             </a:r>
             <a:r>
               <a:rPr lang="en-US" dirty="0" err="1"/>
-              <a:t>a.sprite</a:t>
-            </a:r>
-            <a:r>
-              <a:rPr lang="en-US" dirty="0"/>
-              <a:t>} collided with {sprite}”)</a:t>
-            </a:r>
-          </a:p>
-          <a:p>
-            <a:pPr marL="0" indent="0">
-              <a:buNone/>
-            </a:pPr>
-            <a:endParaRPr lang="en-US" dirty="0"/>
-          </a:p>
-          <a:p>
-            <a:pPr marL="0" indent="0">
-              <a:buNone/>
-            </a:pPr>
-            <a:r>
-              <a:rPr lang="en-US" dirty="0"/>
-              <a:t>Group collide with group</a:t>
-            </a:r>
-          </a:p>
-          <a:p>
-            <a:pPr marL="0" indent="0">
-              <a:buNone/>
-            </a:pPr>
-            <a:r>
-              <a:rPr lang="en-US" dirty="0"/>
-              <a:t>for </a:t>
-            </a:r>
-            <a:r>
-              <a:rPr lang="en-US" dirty="0" err="1"/>
-              <a:t>sprite_a</a:t>
-            </a:r>
-            <a:r>
-              <a:rPr lang="en-US" dirty="0"/>
-              <a:t>, </a:t>
-            </a:r>
-            <a:r>
-              <a:rPr lang="en-US" dirty="0" err="1"/>
-              <a:t>list_b</a:t>
-            </a:r>
-            <a:r>
-              <a:rPr lang="en-US" dirty="0"/>
-              <a:t> in </a:t>
-            </a:r>
+              <a:t>other_group</a:t>
+            </a:r>
+            <a:r>
+              <a:rPr lang="en-US" dirty="0"/>
+              <a:t>, bool)</a:t>
+            </a:r>
+          </a:p>
+          <a:p>
+            <a:pPr lvl="1"/>
+            <a:r>
+              <a:rPr lang="en-US" sz="2800" dirty="0"/>
+              <a:t>If bool is true, the sprite from </a:t>
+            </a:r>
+            <a:r>
+              <a:rPr lang="en-US" sz="2800" dirty="0" err="1"/>
+              <a:t>other_group</a:t>
+            </a:r>
+            <a:r>
+              <a:rPr lang="en-US" sz="2800" dirty="0"/>
+              <a:t> is destroyed</a:t>
+            </a:r>
+          </a:p>
+          <a:p>
+            <a:pPr lvl="1"/>
+            <a:r>
+              <a:rPr lang="en-US" sz="2800" dirty="0"/>
+              <a:t>Returns a list of sprites in </a:t>
+            </a:r>
+            <a:r>
+              <a:rPr lang="en-US" sz="2800" dirty="0" err="1"/>
+              <a:t>other_group</a:t>
+            </a:r>
+            <a:r>
+              <a:rPr lang="en-US" sz="2800" dirty="0"/>
+              <a:t> detected in the collision</a:t>
+            </a:r>
+          </a:p>
+          <a:p>
+            <a:pPr marL="0" indent="0">
+              <a:buNone/>
+            </a:pPr>
+            <a:r>
+              <a:rPr lang="en-US" dirty="0"/>
+              <a:t>Group:</a:t>
+            </a:r>
+          </a:p>
+          <a:p>
+            <a:pPr marL="0" indent="0">
+              <a:buNone/>
+            </a:pPr>
             <a:r>
               <a:rPr lang="en-US" dirty="0" err="1"/>
               <a:t>pygame.sprite.groupcollide</a:t>
@@ -14097,69 +14066,84 @@
             </a:r>
             <a:r>
               <a:rPr lang="en-US" dirty="0" err="1"/>
-              <a:t>a,b,False,False</a:t>
-            </a:r>
-            <a:r>
-              <a:rPr lang="en-US" dirty="0"/>
-              <a:t>).items():</a:t>
-            </a:r>
-          </a:p>
-          <a:p>
-            <a:pPr marL="0" indent="0">
-              <a:buNone/>
-            </a:pPr>
-            <a:r>
-              <a:rPr lang="en-US" dirty="0"/>
-              <a:t>	for </a:t>
+              <a:t>groupA</a:t>
+            </a:r>
+            <a:r>
+              <a:rPr lang="en-US" dirty="0"/>
+              <a:t>, </a:t>
             </a:r>
             <a:r>
               <a:rPr lang="en-US" dirty="0" err="1"/>
-              <a:t>sprite_b</a:t>
-            </a:r>
-            <a:r>
-              <a:rPr lang="en-US" dirty="0"/>
-              <a:t> in </a:t>
+              <a:t>groupB</a:t>
+            </a:r>
+            <a:r>
+              <a:rPr lang="en-US" dirty="0"/>
+              <a:t>, </a:t>
             </a:r>
             <a:r>
               <a:rPr lang="en-US" dirty="0" err="1"/>
-              <a:t>list_b</a:t>
-            </a:r>
-            <a:r>
-              <a:rPr lang="en-US" dirty="0"/>
-              <a:t>:</a:t>
-            </a:r>
-          </a:p>
-          <a:p>
-            <a:pPr marL="0" indent="0">
-              <a:buNone/>
-            </a:pPr>
-            <a:r>
-              <a:rPr lang="en-US" dirty="0"/>
-              <a:t>		print(f’{</a:t>
+              <a:t>destroyA</a:t>
+            </a:r>
+            <a:r>
+              <a:rPr lang="en-US" dirty="0"/>
+              <a:t>, </a:t>
             </a:r>
             <a:r>
               <a:rPr lang="en-US" dirty="0" err="1"/>
-              <a:t>sprite_a</a:t>
-            </a:r>
-            <a:r>
-              <a:rPr lang="en-US" dirty="0"/>
-              <a:t>} collided with {</a:t>
-            </a:r>
-            <a:r>
-              <a:rPr lang="en-US" dirty="0" err="1"/>
-              <a:t>sprite_b</a:t>
-            </a:r>
-            <a:r>
-              <a:rPr lang="en-US" dirty="0"/>
-              <a:t>}’)</a:t>
-            </a:r>
+              <a:t>destroyB</a:t>
+            </a:r>
+            <a:r>
+              <a:rPr lang="en-US" dirty="0"/>
+              <a:t>)</a:t>
+            </a:r>
+          </a:p>
+          <a:p>
+            <a:pPr lvl="1"/>
+            <a:r>
+              <a:rPr lang="en-US" sz="2800" dirty="0"/>
+              <a:t>Returns a </a:t>
+            </a:r>
+            <a:r>
+              <a:rPr lang="en-US" sz="2800" dirty="0" err="1"/>
+              <a:t>Dict</a:t>
+            </a:r>
+            <a:r>
+              <a:rPr lang="en-US" sz="2800" dirty="0"/>
+              <a:t> of &lt;</a:t>
+            </a:r>
+            <a:r>
+              <a:rPr lang="en-US" sz="2800" dirty="0" err="1"/>
+              <a:t>spriteA</a:t>
+            </a:r>
+            <a:r>
+              <a:rPr lang="en-US" sz="2800" dirty="0"/>
+              <a:t>, List&lt;sprite&gt;&gt; </a:t>
+            </a:r>
+          </a:p>
+          <a:p>
+            <a:pPr marL="0" indent="0">
+              <a:buNone/>
+            </a:pPr>
+            <a:endParaRPr lang="en-US" dirty="0"/>
+          </a:p>
+          <a:p>
+            <a:pPr marL="0" indent="0">
+              <a:buNone/>
+            </a:pPr>
+            <a:endParaRPr lang="en-US" dirty="0"/>
+          </a:p>
+          <a:p>
+            <a:pPr marL="0" indent="0">
+              <a:buNone/>
+            </a:pPr>
+            <a:endParaRPr lang="en-US" dirty="0"/>
           </a:p>
         </p:txBody>
       </p:sp>
     </p:spTree>
     <p:extLst>
       <p:ext uri="{BB962C8B-B14F-4D97-AF65-F5344CB8AC3E}">
-        <p14:creationId xmlns:p14="http://schemas.microsoft.com/office/powerpoint/2010/main" val="274593469"/>
+        <p14:creationId xmlns:p14="http://schemas.microsoft.com/office/powerpoint/2010/main" val="2705700190"/>
       </p:ext>
     </p:extLst>
   </p:cSld>
@@ -14185,7 +14169,7 @@
         <p:cNvPr id="1" name="">
           <a:extLst>
             <a:ext uri="{FF2B5EF4-FFF2-40B4-BE49-F238E27FC236}">
-              <a16:creationId xmlns:a16="http://schemas.microsoft.com/office/drawing/2014/main" id="{2F19921F-50C9-664A-AEC9-5D7965441A49}"/>
+              <a16:creationId xmlns:a16="http://schemas.microsoft.com/office/drawing/2014/main" id="{C6944D35-42D8-1B17-C17D-19951433D5CC}"/>
             </a:ext>
           </a:extLst>
         </p:cNvPr>
@@ -14205,7 +14189,7 @@
           <p:cNvPr id="17" name="Rectangle 16">
             <a:extLst>
               <a:ext uri="{FF2B5EF4-FFF2-40B4-BE49-F238E27FC236}">
-                <a16:creationId xmlns:a16="http://schemas.microsoft.com/office/drawing/2014/main" id="{121672D7-7D79-FE8F-5C18-CD0B5489A84C}"/>
+                <a16:creationId xmlns:a16="http://schemas.microsoft.com/office/drawing/2014/main" id="{42897E6B-597F-02E3-F65F-307B7351A87F}"/>
               </a:ext>
               <a:ext uri="{C183D7F6-B498-43B3-948B-1728B52AA6E4}">
                 <adec:decorative xmlns:adec="http://schemas.microsoft.com/office/drawing/2017/decorative" val="1"/>
@@ -14270,7 +14254,7 @@
           <p:cNvPr id="19" name="Rectangle 18">
             <a:extLst>
               <a:ext uri="{FF2B5EF4-FFF2-40B4-BE49-F238E27FC236}">
-                <a16:creationId xmlns:a16="http://schemas.microsoft.com/office/drawing/2014/main" id="{8A6EBE2D-EDB3-6B42-BBC4-92B384C1A114}"/>
+                <a16:creationId xmlns:a16="http://schemas.microsoft.com/office/drawing/2014/main" id="{894B2AEC-39D6-612D-F695-AF86E3CFAFE9}"/>
               </a:ext>
               <a:ext uri="{C183D7F6-B498-43B3-948B-1728B52AA6E4}">
                 <adec:decorative xmlns:adec="http://schemas.microsoft.com/office/drawing/2017/decorative" val="1"/>
@@ -14336,7 +14320,7 @@
           <p:cNvPr id="2" name="Title 1">
             <a:extLst>
               <a:ext uri="{FF2B5EF4-FFF2-40B4-BE49-F238E27FC236}">
-                <a16:creationId xmlns:a16="http://schemas.microsoft.com/office/drawing/2014/main" id="{93B9C3C6-0A7C-BAE4-4373-8DE733DC3564}"/>
+                <a16:creationId xmlns:a16="http://schemas.microsoft.com/office/drawing/2014/main" id="{A9125E4A-C522-C6F0-191C-745C85A832E1}"/>
               </a:ext>
             </a:extLst>
           </p:cNvPr>
@@ -14366,7 +14350,7 @@
                   <a:schemeClr val="bg1"/>
                 </a:solidFill>
               </a:rPr>
-              <a:t>Pixel-perfect Collisions</a:t>
+              <a:t>Group Collision</a:t>
             </a:r>
           </a:p>
         </p:txBody>
@@ -14376,7 +14360,7 @@
           <p:cNvPr id="3" name="Content Placeholder 2">
             <a:extLst>
               <a:ext uri="{FF2B5EF4-FFF2-40B4-BE49-F238E27FC236}">
-                <a16:creationId xmlns:a16="http://schemas.microsoft.com/office/drawing/2014/main" id="{851BFBC5-DDA8-1016-6166-85CB905F4CB9}"/>
+                <a16:creationId xmlns:a16="http://schemas.microsoft.com/office/drawing/2014/main" id="{2ECDAAA0-3F4C-8934-E913-749856207A58}"/>
               </a:ext>
             </a:extLst>
           </p:cNvPr>
@@ -14390,7 +14374,7 @@
         <p:spPr>
           <a:xfrm>
             <a:off x="3740383" y="637762"/>
-            <a:ext cx="7876993" cy="6220238"/>
+            <a:ext cx="8288707" cy="6220238"/>
           </a:xfrm>
         </p:spPr>
         <p:txBody>
@@ -14404,52 +14388,58 @@
             </a:pPr>
             <a:r>
               <a:rPr lang="en-US" dirty="0"/>
-              <a:t>At this point you may have noticed </a:t>
-            </a:r>
-            <a:br>
-              <a:rPr lang="en-US" dirty="0"/>
-            </a:br>
-            <a:r>
-              <a:rPr lang="en-US" dirty="0"/>
-              <a:t>the collisions look a bit strange.</a:t>
-            </a:r>
-          </a:p>
-          <a:p>
-            <a:pPr marL="0" indent="0">
-              <a:buNone/>
-            </a:pPr>
-            <a:r>
-              <a:rPr lang="en-US" dirty="0"/>
-              <a:t>This is caused by how </a:t>
+              <a:t>Examples:</a:t>
+            </a:r>
+          </a:p>
+          <a:p>
+            <a:pPr marL="0" indent="0">
+              <a:buNone/>
+            </a:pPr>
+            <a:r>
+              <a:rPr lang="en-US" dirty="0"/>
+              <a:t>Single collide with group</a:t>
+            </a:r>
+          </a:p>
+          <a:p>
+            <a:pPr marL="0" indent="0">
+              <a:buNone/>
+            </a:pPr>
+            <a:r>
+              <a:rPr lang="en-US" dirty="0"/>
+              <a:t>for sprite  in </a:t>
             </a:r>
             <a:r>
               <a:rPr lang="en-US" dirty="0" err="1"/>
-              <a:t>colliderect</a:t>
-            </a:r>
-            <a:r>
-              <a:rPr lang="en-US" dirty="0"/>
-              <a:t>() behaves</a:t>
-            </a:r>
-          </a:p>
-          <a:p>
-            <a:pPr marL="0" indent="0">
-              <a:buNone/>
-            </a:pPr>
+              <a:t>pygame.sprite.spritecollide</a:t>
+            </a:r>
+            <a:r>
+              <a:rPr lang="en-US" dirty="0"/>
+              <a:t>(</a:t>
+            </a:r>
             <a:r>
               <a:rPr lang="en-US" dirty="0" err="1"/>
-              <a:t>colliderect</a:t>
-            </a:r>
-            <a:r>
-              <a:rPr lang="en-US" dirty="0"/>
-              <a:t> checks if the </a:t>
+              <a:t>a.sprite</a:t>
+            </a:r>
+            <a:r>
+              <a:rPr lang="en-US" dirty="0"/>
+              <a:t>, b, False,):</a:t>
+            </a:r>
+          </a:p>
+          <a:p>
+            <a:pPr marL="0" indent="0">
+              <a:buNone/>
+            </a:pPr>
+            <a:r>
+              <a:rPr lang="en-US" dirty="0"/>
+              <a:t>	print(f’{</a:t>
             </a:r>
             <a:r>
               <a:rPr lang="en-US" dirty="0" err="1"/>
-              <a:t>rects</a:t>
-            </a:r>
-            <a:r>
-              <a:rPr lang="en-US" dirty="0"/>
-              <a:t> are overlapping and returns true if they are</a:t>
+              <a:t>a.sprite</a:t>
+            </a:r>
+            <a:r>
+              <a:rPr lang="en-US" dirty="0"/>
+              <a:t>} collided with {sprite}”)</a:t>
             </a:r>
           </a:p>
           <a:p>
@@ -14458,152 +14448,104 @@
             </a:pPr>
             <a:endParaRPr lang="en-US" dirty="0"/>
           </a:p>
-        </p:txBody>
-      </p:sp>
-      <p:pic>
-        <p:nvPicPr>
-          <p:cNvPr id="5" name="Picture 4">
-            <a:extLst>
-              <a:ext uri="{FF2B5EF4-FFF2-40B4-BE49-F238E27FC236}">
-                <a16:creationId xmlns:a16="http://schemas.microsoft.com/office/drawing/2014/main" id="{4103CE1B-E1CE-B01A-3BA1-05CA596AA766}"/>
-              </a:ext>
-            </a:extLst>
-          </p:cNvPr>
-          <p:cNvPicPr>
-            <a:picLocks noChangeAspect="1"/>
-          </p:cNvPicPr>
-          <p:nvPr/>
-        </p:nvPicPr>
-        <p:blipFill>
-          <a:blip r:embed="rId2"/>
-          <a:stretch>
-            <a:fillRect/>
-          </a:stretch>
-        </p:blipFill>
-        <p:spPr>
-          <a:xfrm>
-            <a:off x="4876800" y="3429000"/>
-            <a:ext cx="1219200" cy="1219200"/>
-          </a:xfrm>
-          <a:prstGeom prst="rect">
-            <a:avLst/>
-          </a:prstGeom>
-        </p:spPr>
-      </p:pic>
-      <p:pic>
-        <p:nvPicPr>
-          <p:cNvPr id="7" name="Picture 6">
-            <a:extLst>
-              <a:ext uri="{FF2B5EF4-FFF2-40B4-BE49-F238E27FC236}">
-                <a16:creationId xmlns:a16="http://schemas.microsoft.com/office/drawing/2014/main" id="{4927933C-2B1D-778D-038E-BA36DE60B0D4}"/>
-              </a:ext>
-            </a:extLst>
-          </p:cNvPr>
-          <p:cNvPicPr>
-            <a:picLocks noChangeAspect="1"/>
-          </p:cNvPicPr>
-          <p:nvPr/>
-        </p:nvPicPr>
-        <p:blipFill>
-          <a:blip r:embed="rId3"/>
-          <a:stretch>
-            <a:fillRect/>
-          </a:stretch>
-        </p:blipFill>
-        <p:spPr>
-          <a:xfrm>
-            <a:off x="4262396" y="3912045"/>
-            <a:ext cx="1219200" cy="1219200"/>
-          </a:xfrm>
-          <a:prstGeom prst="rect">
-            <a:avLst/>
-          </a:prstGeom>
-        </p:spPr>
-      </p:pic>
-      <p:sp>
-        <p:nvSpPr>
-          <p:cNvPr id="8" name="Arrow: Right 7">
-            <a:extLst>
-              <a:ext uri="{FF2B5EF4-FFF2-40B4-BE49-F238E27FC236}">
-                <a16:creationId xmlns:a16="http://schemas.microsoft.com/office/drawing/2014/main" id="{FDB365D0-63F3-4A94-2DF8-2DC161D0EF6B}"/>
-              </a:ext>
-            </a:extLst>
-          </p:cNvPr>
-          <p:cNvSpPr/>
-          <p:nvPr/>
-        </p:nvSpPr>
-        <p:spPr>
-          <a:xfrm rot="10800000">
-            <a:off x="6350688" y="3912045"/>
-            <a:ext cx="1753850" cy="884420"/>
-          </a:xfrm>
-          <a:prstGeom prst="rightArrow">
-            <a:avLst/>
-          </a:prstGeom>
-          <a:solidFill>
-            <a:srgbClr val="FF0000"/>
-          </a:solidFill>
-        </p:spPr>
-        <p:style>
-          <a:lnRef idx="2">
-            <a:schemeClr val="accent1">
-              <a:shade val="15000"/>
-            </a:schemeClr>
-          </a:lnRef>
-          <a:fillRef idx="1">
-            <a:schemeClr val="accent1"/>
-          </a:fillRef>
-          <a:effectRef idx="0">
-            <a:schemeClr val="accent1"/>
-          </a:effectRef>
-          <a:fontRef idx="minor">
-            <a:schemeClr val="lt1"/>
-          </a:fontRef>
-        </p:style>
-        <p:txBody>
-          <a:bodyPr rtlCol="0" anchor="ctr"/>
-          <a:lstStyle/>
-          <a:p>
-            <a:pPr algn="ctr"/>
-            <a:endParaRPr lang="en-US"/>
-          </a:p>
-        </p:txBody>
-      </p:sp>
-      <p:sp>
-        <p:nvSpPr>
-          <p:cNvPr id="9" name="TextBox 8">
-            <a:extLst>
-              <a:ext uri="{FF2B5EF4-FFF2-40B4-BE49-F238E27FC236}">
-                <a16:creationId xmlns:a16="http://schemas.microsoft.com/office/drawing/2014/main" id="{4136A0D9-9626-9CD3-6CDC-2C78DB8C105A}"/>
-              </a:ext>
-            </a:extLst>
-          </p:cNvPr>
-          <p:cNvSpPr txBox="1"/>
-          <p:nvPr/>
-        </p:nvSpPr>
-        <p:spPr>
-          <a:xfrm>
-            <a:off x="8359225" y="3912045"/>
-            <a:ext cx="3120636" cy="923330"/>
-          </a:xfrm>
-          <a:prstGeom prst="rect">
-            <a:avLst/>
-          </a:prstGeom>
-          <a:noFill/>
-        </p:spPr>
-        <p:txBody>
-          <a:bodyPr wrap="square" rtlCol="0">
-            <a:spAutoFit/>
-          </a:bodyPr>
-          <a:lstStyle/>
-          <a:p>
-            <a:r>
-              <a:rPr lang="en-US" sz="5400" dirty="0">
-                <a:solidFill>
-                  <a:srgbClr val="FF0000"/>
-                </a:solidFill>
-              </a:rPr>
-              <a:t>Collision!</a:t>
+          <a:p>
+            <a:pPr marL="0" indent="0">
+              <a:buNone/>
+            </a:pPr>
+            <a:r>
+              <a:rPr lang="en-US" dirty="0"/>
+              <a:t>Group collide with group</a:t>
+            </a:r>
+          </a:p>
+          <a:p>
+            <a:pPr marL="0" indent="0">
+              <a:buNone/>
+            </a:pPr>
+            <a:r>
+              <a:rPr lang="en-US" dirty="0"/>
+              <a:t>for </a:t>
+            </a:r>
+            <a:r>
+              <a:rPr lang="en-US" dirty="0" err="1"/>
+              <a:t>sprite_a</a:t>
+            </a:r>
+            <a:r>
+              <a:rPr lang="en-US" dirty="0"/>
+              <a:t>, </a:t>
+            </a:r>
+            <a:r>
+              <a:rPr lang="en-US" dirty="0" err="1"/>
+              <a:t>list_b</a:t>
+            </a:r>
+            <a:r>
+              <a:rPr lang="en-US" dirty="0"/>
+              <a:t> in </a:t>
+            </a:r>
+            <a:r>
+              <a:rPr lang="en-US" dirty="0" err="1"/>
+              <a:t>pygame.sprite.groupcollide</a:t>
+            </a:r>
+            <a:r>
+              <a:rPr lang="en-US" dirty="0"/>
+              <a:t>(</a:t>
+            </a:r>
+            <a:r>
+              <a:rPr lang="en-US" dirty="0" err="1"/>
+              <a:t>a,b,False,False</a:t>
+            </a:r>
+            <a:r>
+              <a:rPr lang="en-US" dirty="0"/>
+              <a:t>).items():</a:t>
+            </a:r>
+          </a:p>
+          <a:p>
+            <a:pPr marL="0" indent="0">
+              <a:buNone/>
+            </a:pPr>
+            <a:r>
+              <a:rPr lang="en-US" dirty="0"/>
+              <a:t>	for </a:t>
+            </a:r>
+            <a:r>
+              <a:rPr lang="en-US" dirty="0" err="1"/>
+              <a:t>sprite_b</a:t>
+            </a:r>
+            <a:r>
+              <a:rPr lang="en-US" dirty="0"/>
+              <a:t> in </a:t>
+            </a:r>
+            <a:r>
+              <a:rPr lang="en-US" dirty="0" err="1"/>
+              <a:t>list_b</a:t>
+            </a:r>
+            <a:r>
+              <a:rPr lang="en-US" dirty="0"/>
+              <a:t>:</a:t>
+            </a:r>
+          </a:p>
+          <a:p>
+            <a:pPr marL="0" indent="0">
+              <a:buNone/>
+            </a:pPr>
+            <a:r>
+              <a:rPr lang="en-US" dirty="0"/>
+              <a:t>		print(f’{</a:t>
+            </a:r>
+            <a:r>
+              <a:rPr lang="en-US" dirty="0" err="1"/>
+              <a:t>sprite_a</a:t>
+            </a:r>
+            <a:r>
+              <a:rPr lang="en-US" dirty="0"/>
+              <a:t>} collided with {</a:t>
+            </a:r>
+            <a:r>
+              <a:rPr lang="en-US" dirty="0" err="1"/>
+              <a:t>sprite_b</a:t>
+            </a:r>
+            <a:r>
+              <a:rPr lang="en-US" dirty="0"/>
+              <a:t>}’)</a:t>
             </a:r>
           </a:p>
         </p:txBody>
@@ -14611,7 +14553,7 @@
     </p:spTree>
     <p:extLst>
       <p:ext uri="{BB962C8B-B14F-4D97-AF65-F5344CB8AC3E}">
-        <p14:creationId xmlns:p14="http://schemas.microsoft.com/office/powerpoint/2010/main" val="4066703451"/>
+        <p14:creationId xmlns:p14="http://schemas.microsoft.com/office/powerpoint/2010/main" val="274593469"/>
       </p:ext>
     </p:extLst>
   </p:cSld>
@@ -14637,7 +14579,7 @@
         <p:cNvPr id="1" name="">
           <a:extLst>
             <a:ext uri="{FF2B5EF4-FFF2-40B4-BE49-F238E27FC236}">
-              <a16:creationId xmlns:a16="http://schemas.microsoft.com/office/drawing/2014/main" id="{CE50244F-CD8B-A436-A389-8B4E092E4DCD}"/>
+              <a16:creationId xmlns:a16="http://schemas.microsoft.com/office/drawing/2014/main" id="{2F19921F-50C9-664A-AEC9-5D7965441A49}"/>
             </a:ext>
           </a:extLst>
         </p:cNvPr>
@@ -14657,7 +14599,7 @@
           <p:cNvPr id="17" name="Rectangle 16">
             <a:extLst>
               <a:ext uri="{FF2B5EF4-FFF2-40B4-BE49-F238E27FC236}">
-                <a16:creationId xmlns:a16="http://schemas.microsoft.com/office/drawing/2014/main" id="{0ADE54DC-909C-366B-E3D1-D2112364D0CC}"/>
+                <a16:creationId xmlns:a16="http://schemas.microsoft.com/office/drawing/2014/main" id="{121672D7-7D79-FE8F-5C18-CD0B5489A84C}"/>
               </a:ext>
               <a:ext uri="{C183D7F6-B498-43B3-948B-1728B52AA6E4}">
                 <adec:decorative xmlns:adec="http://schemas.microsoft.com/office/drawing/2017/decorative" val="1"/>
@@ -14722,7 +14664,7 @@
           <p:cNvPr id="19" name="Rectangle 18">
             <a:extLst>
               <a:ext uri="{FF2B5EF4-FFF2-40B4-BE49-F238E27FC236}">
-                <a16:creationId xmlns:a16="http://schemas.microsoft.com/office/drawing/2014/main" id="{2BB34929-D405-D01E-B62B-0883B7625A9E}"/>
+                <a16:creationId xmlns:a16="http://schemas.microsoft.com/office/drawing/2014/main" id="{8A6EBE2D-EDB3-6B42-BBC4-92B384C1A114}"/>
               </a:ext>
               <a:ext uri="{C183D7F6-B498-43B3-948B-1728B52AA6E4}">
                 <adec:decorative xmlns:adec="http://schemas.microsoft.com/office/drawing/2017/decorative" val="1"/>
@@ -14788,6 +14730,458 @@
           <p:cNvPr id="2" name="Title 1">
             <a:extLst>
               <a:ext uri="{FF2B5EF4-FFF2-40B4-BE49-F238E27FC236}">
+                <a16:creationId xmlns:a16="http://schemas.microsoft.com/office/drawing/2014/main" id="{93B9C3C6-0A7C-BAE4-4373-8DE733DC3564}"/>
+              </a:ext>
+            </a:extLst>
+          </p:cNvPr>
+          <p:cNvSpPr>
+            <a:spLocks noGrp="1"/>
+          </p:cNvSpPr>
+          <p:nvPr>
+            <p:ph type="title"/>
+          </p:nvPr>
+        </p:nvSpPr>
+        <p:spPr>
+          <a:xfrm>
+            <a:off x="1" y="637762"/>
+            <a:ext cx="3740382" cy="5576770"/>
+          </a:xfrm>
+        </p:spPr>
+        <p:txBody>
+          <a:bodyPr anchor="t">
+            <a:normAutofit/>
+          </a:bodyPr>
+          <a:lstStyle/>
+          <a:p>
+            <a:pPr algn="ctr"/>
+            <a:r>
+              <a:rPr lang="en-US" sz="3600" dirty="0">
+                <a:solidFill>
+                  <a:schemeClr val="bg1"/>
+                </a:solidFill>
+              </a:rPr>
+              <a:t>Pixel-perfect Collisions</a:t>
+            </a:r>
+          </a:p>
+        </p:txBody>
+      </p:sp>
+      <p:sp>
+        <p:nvSpPr>
+          <p:cNvPr id="3" name="Content Placeholder 2">
+            <a:extLst>
+              <a:ext uri="{FF2B5EF4-FFF2-40B4-BE49-F238E27FC236}">
+                <a16:creationId xmlns:a16="http://schemas.microsoft.com/office/drawing/2014/main" id="{851BFBC5-DDA8-1016-6166-85CB905F4CB9}"/>
+              </a:ext>
+            </a:extLst>
+          </p:cNvPr>
+          <p:cNvSpPr>
+            <a:spLocks noGrp="1"/>
+          </p:cNvSpPr>
+          <p:nvPr>
+            <p:ph idx="1"/>
+          </p:nvPr>
+        </p:nvSpPr>
+        <p:spPr>
+          <a:xfrm>
+            <a:off x="3740383" y="637762"/>
+            <a:ext cx="7876993" cy="6220238"/>
+          </a:xfrm>
+        </p:spPr>
+        <p:txBody>
+          <a:bodyPr>
+            <a:normAutofit/>
+          </a:bodyPr>
+          <a:lstStyle/>
+          <a:p>
+            <a:pPr marL="0" indent="0">
+              <a:buNone/>
+            </a:pPr>
+            <a:r>
+              <a:rPr lang="en-US" dirty="0"/>
+              <a:t>At this point you may have noticed </a:t>
+            </a:r>
+            <a:br>
+              <a:rPr lang="en-US" dirty="0"/>
+            </a:br>
+            <a:r>
+              <a:rPr lang="en-US" dirty="0"/>
+              <a:t>the collisions look a bit strange.</a:t>
+            </a:r>
+          </a:p>
+          <a:p>
+            <a:pPr marL="0" indent="0">
+              <a:buNone/>
+            </a:pPr>
+            <a:r>
+              <a:rPr lang="en-US" dirty="0"/>
+              <a:t>This is caused by how </a:t>
+            </a:r>
+            <a:r>
+              <a:rPr lang="en-US" dirty="0" err="1"/>
+              <a:t>colliderect</a:t>
+            </a:r>
+            <a:r>
+              <a:rPr lang="en-US" dirty="0"/>
+              <a:t>() behaves</a:t>
+            </a:r>
+          </a:p>
+          <a:p>
+            <a:pPr marL="0" indent="0">
+              <a:buNone/>
+            </a:pPr>
+            <a:r>
+              <a:rPr lang="en-US" dirty="0" err="1"/>
+              <a:t>colliderect</a:t>
+            </a:r>
+            <a:r>
+              <a:rPr lang="en-US" dirty="0"/>
+              <a:t> checks if the </a:t>
+            </a:r>
+            <a:r>
+              <a:rPr lang="en-US" dirty="0" err="1"/>
+              <a:t>rects</a:t>
+            </a:r>
+            <a:r>
+              <a:rPr lang="en-US" dirty="0"/>
+              <a:t> are overlapping and returns true if they are</a:t>
+            </a:r>
+          </a:p>
+          <a:p>
+            <a:pPr marL="0" indent="0">
+              <a:buNone/>
+            </a:pPr>
+            <a:endParaRPr lang="en-US" dirty="0"/>
+          </a:p>
+        </p:txBody>
+      </p:sp>
+      <p:pic>
+        <p:nvPicPr>
+          <p:cNvPr id="5" name="Picture 4">
+            <a:extLst>
+              <a:ext uri="{FF2B5EF4-FFF2-40B4-BE49-F238E27FC236}">
+                <a16:creationId xmlns:a16="http://schemas.microsoft.com/office/drawing/2014/main" id="{4103CE1B-E1CE-B01A-3BA1-05CA596AA766}"/>
+              </a:ext>
+            </a:extLst>
+          </p:cNvPr>
+          <p:cNvPicPr>
+            <a:picLocks noChangeAspect="1"/>
+          </p:cNvPicPr>
+          <p:nvPr/>
+        </p:nvPicPr>
+        <p:blipFill>
+          <a:blip r:embed="rId2"/>
+          <a:stretch>
+            <a:fillRect/>
+          </a:stretch>
+        </p:blipFill>
+        <p:spPr>
+          <a:xfrm>
+            <a:off x="4876800" y="3429000"/>
+            <a:ext cx="1219200" cy="1219200"/>
+          </a:xfrm>
+          <a:prstGeom prst="rect">
+            <a:avLst/>
+          </a:prstGeom>
+        </p:spPr>
+      </p:pic>
+      <p:pic>
+        <p:nvPicPr>
+          <p:cNvPr id="7" name="Picture 6">
+            <a:extLst>
+              <a:ext uri="{FF2B5EF4-FFF2-40B4-BE49-F238E27FC236}">
+                <a16:creationId xmlns:a16="http://schemas.microsoft.com/office/drawing/2014/main" id="{4927933C-2B1D-778D-038E-BA36DE60B0D4}"/>
+              </a:ext>
+            </a:extLst>
+          </p:cNvPr>
+          <p:cNvPicPr>
+            <a:picLocks noChangeAspect="1"/>
+          </p:cNvPicPr>
+          <p:nvPr/>
+        </p:nvPicPr>
+        <p:blipFill>
+          <a:blip r:embed="rId3"/>
+          <a:stretch>
+            <a:fillRect/>
+          </a:stretch>
+        </p:blipFill>
+        <p:spPr>
+          <a:xfrm>
+            <a:off x="4262396" y="3912045"/>
+            <a:ext cx="1219200" cy="1219200"/>
+          </a:xfrm>
+          <a:prstGeom prst="rect">
+            <a:avLst/>
+          </a:prstGeom>
+        </p:spPr>
+      </p:pic>
+      <p:sp>
+        <p:nvSpPr>
+          <p:cNvPr id="8" name="Arrow: Right 7">
+            <a:extLst>
+              <a:ext uri="{FF2B5EF4-FFF2-40B4-BE49-F238E27FC236}">
+                <a16:creationId xmlns:a16="http://schemas.microsoft.com/office/drawing/2014/main" id="{FDB365D0-63F3-4A94-2DF8-2DC161D0EF6B}"/>
+              </a:ext>
+            </a:extLst>
+          </p:cNvPr>
+          <p:cNvSpPr/>
+          <p:nvPr/>
+        </p:nvSpPr>
+        <p:spPr>
+          <a:xfrm rot="10800000">
+            <a:off x="6350688" y="3912045"/>
+            <a:ext cx="1753850" cy="884420"/>
+          </a:xfrm>
+          <a:prstGeom prst="rightArrow">
+            <a:avLst/>
+          </a:prstGeom>
+          <a:solidFill>
+            <a:srgbClr val="FF0000"/>
+          </a:solidFill>
+        </p:spPr>
+        <p:style>
+          <a:lnRef idx="2">
+            <a:schemeClr val="accent1">
+              <a:shade val="15000"/>
+            </a:schemeClr>
+          </a:lnRef>
+          <a:fillRef idx="1">
+            <a:schemeClr val="accent1"/>
+          </a:fillRef>
+          <a:effectRef idx="0">
+            <a:schemeClr val="accent1"/>
+          </a:effectRef>
+          <a:fontRef idx="minor">
+            <a:schemeClr val="lt1"/>
+          </a:fontRef>
+        </p:style>
+        <p:txBody>
+          <a:bodyPr rtlCol="0" anchor="ctr"/>
+          <a:lstStyle/>
+          <a:p>
+            <a:pPr algn="ctr"/>
+            <a:endParaRPr lang="en-US"/>
+          </a:p>
+        </p:txBody>
+      </p:sp>
+      <p:sp>
+        <p:nvSpPr>
+          <p:cNvPr id="9" name="TextBox 8">
+            <a:extLst>
+              <a:ext uri="{FF2B5EF4-FFF2-40B4-BE49-F238E27FC236}">
+                <a16:creationId xmlns:a16="http://schemas.microsoft.com/office/drawing/2014/main" id="{4136A0D9-9626-9CD3-6CDC-2C78DB8C105A}"/>
+              </a:ext>
+            </a:extLst>
+          </p:cNvPr>
+          <p:cNvSpPr txBox="1"/>
+          <p:nvPr/>
+        </p:nvSpPr>
+        <p:spPr>
+          <a:xfrm>
+            <a:off x="8359225" y="3912045"/>
+            <a:ext cx="3120636" cy="923330"/>
+          </a:xfrm>
+          <a:prstGeom prst="rect">
+            <a:avLst/>
+          </a:prstGeom>
+          <a:noFill/>
+        </p:spPr>
+        <p:txBody>
+          <a:bodyPr wrap="square" rtlCol="0">
+            <a:spAutoFit/>
+          </a:bodyPr>
+          <a:lstStyle/>
+          <a:p>
+            <a:r>
+              <a:rPr lang="en-US" sz="5400" dirty="0">
+                <a:solidFill>
+                  <a:srgbClr val="FF0000"/>
+                </a:solidFill>
+              </a:rPr>
+              <a:t>Collision!</a:t>
+            </a:r>
+          </a:p>
+        </p:txBody>
+      </p:sp>
+    </p:spTree>
+    <p:extLst>
+      <p:ext uri="{BB962C8B-B14F-4D97-AF65-F5344CB8AC3E}">
+        <p14:creationId xmlns:p14="http://schemas.microsoft.com/office/powerpoint/2010/main" val="4066703451"/>
+      </p:ext>
+    </p:extLst>
+  </p:cSld>
+  <p:clrMapOvr>
+    <a:masterClrMapping/>
+  </p:clrMapOvr>
+</p:sld>
+</file>
+
+<file path=ppt/slides/slide35.xml><?xml version="1.0" encoding="utf-8"?>
+<p:sld xmlns:a="http://schemas.openxmlformats.org/drawingml/2006/main" xmlns:r="http://schemas.openxmlformats.org/officeDocument/2006/relationships" xmlns:p="http://schemas.openxmlformats.org/presentationml/2006/main">
+  <p:cSld>
+    <p:bg>
+      <p:bgPr>
+        <a:solidFill>
+          <a:schemeClr val="bg1"/>
+        </a:solidFill>
+        <a:effectLst/>
+      </p:bgPr>
+    </p:bg>
+    <p:spTree>
+      <p:nvGrpSpPr>
+        <p:cNvPr id="1" name="">
+          <a:extLst>
+            <a:ext uri="{FF2B5EF4-FFF2-40B4-BE49-F238E27FC236}">
+              <a16:creationId xmlns:a16="http://schemas.microsoft.com/office/drawing/2014/main" id="{CE50244F-CD8B-A436-A389-8B4E092E4DCD}"/>
+            </a:ext>
+          </a:extLst>
+        </p:cNvPr>
+        <p:cNvGrpSpPr/>
+        <p:nvPr/>
+      </p:nvGrpSpPr>
+      <p:grpSpPr>
+        <a:xfrm>
+          <a:off x="0" y="0"/>
+          <a:ext cx="0" cy="0"/>
+          <a:chOff x="0" y="0"/>
+          <a:chExt cx="0" cy="0"/>
+        </a:xfrm>
+      </p:grpSpPr>
+      <p:sp>
+        <p:nvSpPr>
+          <p:cNvPr id="17" name="Rectangle 16">
+            <a:extLst>
+              <a:ext uri="{FF2B5EF4-FFF2-40B4-BE49-F238E27FC236}">
+                <a16:creationId xmlns:a16="http://schemas.microsoft.com/office/drawing/2014/main" id="{0ADE54DC-909C-366B-E3D1-D2112364D0CC}"/>
+              </a:ext>
+              <a:ext uri="{C183D7F6-B498-43B3-948B-1728B52AA6E4}">
+                <adec:decorative xmlns:adec="http://schemas.microsoft.com/office/drawing/2017/decorative" val="1"/>
+              </a:ext>
+            </a:extLst>
+          </p:cNvPr>
+          <p:cNvSpPr>
+            <a:spLocks noGrp="1" noRot="1" noChangeAspect="1" noMove="1" noResize="1" noEditPoints="1" noAdjustHandles="1" noChangeArrowheads="1" noChangeShapeType="1" noTextEdit="1"/>
+          </p:cNvSpPr>
+          <p:nvPr>
+            <p:extLst>
+              <p:ext uri="{386F3935-93C4-4BCD-93E2-E3B085C9AB24}">
+                <p16:designElem xmlns:p16="http://schemas.microsoft.com/office/powerpoint/2015/main" val="1"/>
+              </p:ext>
+            </p:extLst>
+          </p:nvPr>
+        </p:nvSpPr>
+        <p:spPr>
+          <a:xfrm>
+            <a:off x="3740383" y="0"/>
+            <a:ext cx="8451607" cy="6858001"/>
+          </a:xfrm>
+          <a:prstGeom prst="rect">
+            <a:avLst/>
+          </a:prstGeom>
+          <a:solidFill>
+            <a:schemeClr val="bg1">
+              <a:lumMod val="95000"/>
+            </a:schemeClr>
+          </a:solidFill>
+          <a:ln>
+            <a:noFill/>
+          </a:ln>
+        </p:spPr>
+        <p:style>
+          <a:lnRef idx="2">
+            <a:schemeClr val="accent1">
+              <a:shade val="50000"/>
+            </a:schemeClr>
+          </a:lnRef>
+          <a:fillRef idx="1">
+            <a:schemeClr val="accent1"/>
+          </a:fillRef>
+          <a:effectRef idx="0">
+            <a:schemeClr val="accent1"/>
+          </a:effectRef>
+          <a:fontRef idx="minor">
+            <a:schemeClr val="lt1"/>
+          </a:fontRef>
+        </p:style>
+        <p:txBody>
+          <a:bodyPr rtlCol="0" anchor="ctr"/>
+          <a:lstStyle/>
+          <a:p>
+            <a:pPr algn="ctr"/>
+            <a:endParaRPr lang="en-US"/>
+          </a:p>
+        </p:txBody>
+      </p:sp>
+      <p:sp>
+        <p:nvSpPr>
+          <p:cNvPr id="19" name="Rectangle 18">
+            <a:extLst>
+              <a:ext uri="{FF2B5EF4-FFF2-40B4-BE49-F238E27FC236}">
+                <a16:creationId xmlns:a16="http://schemas.microsoft.com/office/drawing/2014/main" id="{2BB34929-D405-D01E-B62B-0883B7625A9E}"/>
+              </a:ext>
+              <a:ext uri="{C183D7F6-B498-43B3-948B-1728B52AA6E4}">
+                <adec:decorative xmlns:adec="http://schemas.microsoft.com/office/drawing/2017/decorative" val="1"/>
+              </a:ext>
+            </a:extLst>
+          </p:cNvPr>
+          <p:cNvSpPr>
+            <a:spLocks noGrp="1" noRot="1" noChangeAspect="1" noMove="1" noResize="1" noEditPoints="1" noAdjustHandles="1" noChangeArrowheads="1" noChangeShapeType="1" noTextEdit="1"/>
+          </p:cNvSpPr>
+          <p:nvPr>
+            <p:extLst>
+              <p:ext uri="{386F3935-93C4-4BCD-93E2-E3B085C9AB24}">
+                <p16:designElem xmlns:p16="http://schemas.microsoft.com/office/powerpoint/2015/main" val="1"/>
+              </p:ext>
+            </p:extLst>
+          </p:nvPr>
+        </p:nvSpPr>
+        <p:spPr>
+          <a:xfrm>
+            <a:off x="10" y="0"/>
+            <a:ext cx="3745177" cy="6858001"/>
+          </a:xfrm>
+          <a:prstGeom prst="rect">
+            <a:avLst/>
+          </a:prstGeom>
+          <a:solidFill>
+            <a:schemeClr val="tx1">
+              <a:lumMod val="85000"/>
+              <a:lumOff val="15000"/>
+            </a:schemeClr>
+          </a:solidFill>
+          <a:ln>
+            <a:noFill/>
+          </a:ln>
+        </p:spPr>
+        <p:style>
+          <a:lnRef idx="2">
+            <a:schemeClr val="accent1">
+              <a:shade val="50000"/>
+            </a:schemeClr>
+          </a:lnRef>
+          <a:fillRef idx="1">
+            <a:schemeClr val="accent1"/>
+          </a:fillRef>
+          <a:effectRef idx="0">
+            <a:schemeClr val="accent1"/>
+          </a:effectRef>
+          <a:fontRef idx="minor">
+            <a:schemeClr val="lt1"/>
+          </a:fontRef>
+        </p:style>
+        <p:txBody>
+          <a:bodyPr rtlCol="0" anchor="ctr"/>
+          <a:lstStyle/>
+          <a:p>
+            <a:pPr algn="ctr"/>
+            <a:endParaRPr lang="en-US"/>
+          </a:p>
+        </p:txBody>
+      </p:sp>
+      <p:sp>
+        <p:nvSpPr>
+          <p:cNvPr id="2" name="Title 1">
+            <a:extLst>
+              <a:ext uri="{FF2B5EF4-FFF2-40B4-BE49-F238E27FC236}">
                 <a16:creationId xmlns:a16="http://schemas.microsoft.com/office/drawing/2014/main" id="{6D33F85F-28BD-C295-4A28-7C9BCA48FBA8}"/>
               </a:ext>
             </a:extLst>
@@ -15041,7 +15435,7 @@
 </p:sld>
 </file>
 
-<file path=ppt/slides/slide35.xml><?xml version="1.0" encoding="utf-8"?>
+<file path=ppt/slides/slide36.xml><?xml version="1.0" encoding="utf-8"?>
 <p:sld xmlns:a="http://schemas.openxmlformats.org/drawingml/2006/main" xmlns:r="http://schemas.openxmlformats.org/officeDocument/2006/relationships" xmlns:p="http://schemas.openxmlformats.org/presentationml/2006/main">
   <p:cSld>
     <p:bg>
@@ -15379,7 +15773,7 @@
         </p:nvSpPr>
         <p:spPr>
           <a:xfrm>
-            <a:off x="0" y="6488668"/>
+            <a:off x="10589061" y="6488668"/>
             <a:ext cx="1602939" cy="369332"/>
           </a:xfrm>
           <a:prstGeom prst="rect">

</xml_diff>

<commit_message>
added attendance slide to presentation
</commit_message>
<xml_diff>
--- a/Introduction to Pygame.pptx
+++ b/Introduction to Pygame.pptx
@@ -5,45 +5,46 @@
     <p:sldMasterId id="2147483648" r:id="rId1"/>
   </p:sldMasterIdLst>
   <p:notesMasterIdLst>
-    <p:notesMasterId r:id="rId38"/>
+    <p:notesMasterId r:id="rId39"/>
   </p:notesMasterIdLst>
   <p:sldIdLst>
     <p:sldId id="256" r:id="rId2"/>
-    <p:sldId id="257" r:id="rId3"/>
-    <p:sldId id="278" r:id="rId4"/>
-    <p:sldId id="258" r:id="rId5"/>
-    <p:sldId id="277" r:id="rId6"/>
-    <p:sldId id="276" r:id="rId7"/>
-    <p:sldId id="279" r:id="rId8"/>
-    <p:sldId id="281" r:id="rId9"/>
-    <p:sldId id="280" r:id="rId10"/>
-    <p:sldId id="282" r:id="rId11"/>
-    <p:sldId id="283" r:id="rId12"/>
-    <p:sldId id="284" r:id="rId13"/>
-    <p:sldId id="285" r:id="rId14"/>
-    <p:sldId id="286" r:id="rId15"/>
-    <p:sldId id="293" r:id="rId16"/>
-    <p:sldId id="287" r:id="rId17"/>
-    <p:sldId id="288" r:id="rId18"/>
-    <p:sldId id="289" r:id="rId19"/>
-    <p:sldId id="290" r:id="rId20"/>
-    <p:sldId id="291" r:id="rId21"/>
-    <p:sldId id="292" r:id="rId22"/>
-    <p:sldId id="294" r:id="rId23"/>
-    <p:sldId id="295" r:id="rId24"/>
-    <p:sldId id="296" r:id="rId25"/>
-    <p:sldId id="302" r:id="rId26"/>
-    <p:sldId id="303" r:id="rId27"/>
-    <p:sldId id="308" r:id="rId28"/>
-    <p:sldId id="297" r:id="rId29"/>
-    <p:sldId id="298" r:id="rId30"/>
-    <p:sldId id="304" r:id="rId31"/>
-    <p:sldId id="299" r:id="rId32"/>
-    <p:sldId id="305" r:id="rId33"/>
-    <p:sldId id="306" r:id="rId34"/>
-    <p:sldId id="300" r:id="rId35"/>
-    <p:sldId id="307" r:id="rId36"/>
-    <p:sldId id="301" r:id="rId37"/>
+    <p:sldId id="309" r:id="rId3"/>
+    <p:sldId id="257" r:id="rId4"/>
+    <p:sldId id="278" r:id="rId5"/>
+    <p:sldId id="258" r:id="rId6"/>
+    <p:sldId id="277" r:id="rId7"/>
+    <p:sldId id="276" r:id="rId8"/>
+    <p:sldId id="279" r:id="rId9"/>
+    <p:sldId id="281" r:id="rId10"/>
+    <p:sldId id="280" r:id="rId11"/>
+    <p:sldId id="282" r:id="rId12"/>
+    <p:sldId id="283" r:id="rId13"/>
+    <p:sldId id="284" r:id="rId14"/>
+    <p:sldId id="285" r:id="rId15"/>
+    <p:sldId id="286" r:id="rId16"/>
+    <p:sldId id="293" r:id="rId17"/>
+    <p:sldId id="287" r:id="rId18"/>
+    <p:sldId id="288" r:id="rId19"/>
+    <p:sldId id="289" r:id="rId20"/>
+    <p:sldId id="290" r:id="rId21"/>
+    <p:sldId id="291" r:id="rId22"/>
+    <p:sldId id="292" r:id="rId23"/>
+    <p:sldId id="294" r:id="rId24"/>
+    <p:sldId id="295" r:id="rId25"/>
+    <p:sldId id="296" r:id="rId26"/>
+    <p:sldId id="302" r:id="rId27"/>
+    <p:sldId id="303" r:id="rId28"/>
+    <p:sldId id="308" r:id="rId29"/>
+    <p:sldId id="297" r:id="rId30"/>
+    <p:sldId id="298" r:id="rId31"/>
+    <p:sldId id="304" r:id="rId32"/>
+    <p:sldId id="299" r:id="rId33"/>
+    <p:sldId id="305" r:id="rId34"/>
+    <p:sldId id="306" r:id="rId35"/>
+    <p:sldId id="300" r:id="rId36"/>
+    <p:sldId id="307" r:id="rId37"/>
+    <p:sldId id="301" r:id="rId38"/>
   </p:sldIdLst>
   <p:sldSz cx="12192000" cy="6858000"/>
   <p:notesSz cx="6858000" cy="9144000"/>
@@ -564,7 +565,7 @@
           <a:p>
             <a:fld id="{3B730669-1943-413D-86BC-0568B6A0A813}" type="slidenum">
               <a:rPr lang="en-US" smtClean="0"/>
-              <a:t>23</a:t>
+              <a:t>24</a:t>
             </a:fld>
             <a:endParaRPr lang="en-US"/>
           </a:p>
@@ -648,7 +649,7 @@
           <a:p>
             <a:fld id="{3B730669-1943-413D-86BC-0568B6A0A813}" type="slidenum">
               <a:rPr lang="en-US" smtClean="0"/>
-              <a:t>32</a:t>
+              <a:t>33</a:t>
             </a:fld>
             <a:endParaRPr lang="en-US"/>
           </a:p>
@@ -756,7 +757,7 @@
           <a:p>
             <a:fld id="{3B730669-1943-413D-86BC-0568B6A0A813}" type="slidenum">
               <a:rPr lang="en-US" smtClean="0"/>
-              <a:t>33</a:t>
+              <a:t>34</a:t>
             </a:fld>
             <a:endParaRPr lang="en-US"/>
           </a:p>
@@ -4457,7 +4458,7 @@
         <p:cNvPr id="1" name="">
           <a:extLst>
             <a:ext uri="{FF2B5EF4-FFF2-40B4-BE49-F238E27FC236}">
-              <a16:creationId xmlns:a16="http://schemas.microsoft.com/office/drawing/2014/main" id="{60C3E795-E795-176F-EA90-00693A8FA5DE}"/>
+              <a16:creationId xmlns:a16="http://schemas.microsoft.com/office/drawing/2014/main" id="{1346CCEB-06CE-A3DC-EED0-AE02035611CB}"/>
             </a:ext>
           </a:extLst>
         </p:cNvPr>
@@ -4477,7 +4478,7 @@
           <p:cNvPr id="17" name="Rectangle 16">
             <a:extLst>
               <a:ext uri="{FF2B5EF4-FFF2-40B4-BE49-F238E27FC236}">
-                <a16:creationId xmlns:a16="http://schemas.microsoft.com/office/drawing/2014/main" id="{1DF6AD75-0AA1-7A6E-D3AB-BE3671546456}"/>
+                <a16:creationId xmlns:a16="http://schemas.microsoft.com/office/drawing/2014/main" id="{7C27D13A-093F-ECF9-A6F6-58F4923761A7}"/>
               </a:ext>
               <a:ext uri="{C183D7F6-B498-43B3-948B-1728B52AA6E4}">
                 <adec:decorative xmlns:adec="http://schemas.microsoft.com/office/drawing/2017/decorative" val="1"/>
@@ -4542,7 +4543,7 @@
           <p:cNvPr id="19" name="Rectangle 18">
             <a:extLst>
               <a:ext uri="{FF2B5EF4-FFF2-40B4-BE49-F238E27FC236}">
-                <a16:creationId xmlns:a16="http://schemas.microsoft.com/office/drawing/2014/main" id="{41FA2B4D-9278-98DE-68FF-AB01DAD29DFC}"/>
+                <a16:creationId xmlns:a16="http://schemas.microsoft.com/office/drawing/2014/main" id="{E9DCFABB-42CE-8C97-A3CD-01F4648C0489}"/>
               </a:ext>
               <a:ext uri="{C183D7F6-B498-43B3-948B-1728B52AA6E4}">
                 <adec:decorative xmlns:adec="http://schemas.microsoft.com/office/drawing/2017/decorative" val="1"/>
@@ -4608,6 +4609,375 @@
           <p:cNvPr id="2" name="Title 1">
             <a:extLst>
               <a:ext uri="{FF2B5EF4-FFF2-40B4-BE49-F238E27FC236}">
+                <a16:creationId xmlns:a16="http://schemas.microsoft.com/office/drawing/2014/main" id="{E183A313-F797-F728-04EA-533355890755}"/>
+              </a:ext>
+            </a:extLst>
+          </p:cNvPr>
+          <p:cNvSpPr>
+            <a:spLocks noGrp="1"/>
+          </p:cNvSpPr>
+          <p:nvPr>
+            <p:ph type="title"/>
+          </p:nvPr>
+        </p:nvSpPr>
+        <p:spPr>
+          <a:xfrm>
+            <a:off x="1" y="637762"/>
+            <a:ext cx="3740382" cy="5576770"/>
+          </a:xfrm>
+        </p:spPr>
+        <p:txBody>
+          <a:bodyPr anchor="t">
+            <a:normAutofit/>
+          </a:bodyPr>
+          <a:lstStyle/>
+          <a:p>
+            <a:pPr algn="ctr"/>
+            <a:r>
+              <a:rPr lang="en-US" sz="3600" dirty="0" err="1">
+                <a:solidFill>
+                  <a:schemeClr val="bg1"/>
+                </a:solidFill>
+              </a:rPr>
+              <a:t>Pygame</a:t>
+            </a:r>
+            <a:r>
+              <a:rPr lang="en-US" sz="3600" dirty="0">
+                <a:solidFill>
+                  <a:schemeClr val="bg1"/>
+                </a:solidFill>
+              </a:rPr>
+              <a:t> Surface</a:t>
+            </a:r>
+          </a:p>
+        </p:txBody>
+      </p:sp>
+      <p:sp>
+        <p:nvSpPr>
+          <p:cNvPr id="3" name="Content Placeholder 2">
+            <a:extLst>
+              <a:ext uri="{FF2B5EF4-FFF2-40B4-BE49-F238E27FC236}">
+                <a16:creationId xmlns:a16="http://schemas.microsoft.com/office/drawing/2014/main" id="{77A62FB1-B80A-7F82-35A6-43B04E2C07E4}"/>
+              </a:ext>
+            </a:extLst>
+          </p:cNvPr>
+          <p:cNvSpPr>
+            <a:spLocks noGrp="1"/>
+          </p:cNvSpPr>
+          <p:nvPr>
+            <p:ph idx="1"/>
+          </p:nvPr>
+        </p:nvSpPr>
+        <p:spPr>
+          <a:xfrm>
+            <a:off x="3740384" y="637762"/>
+            <a:ext cx="7989162" cy="6220238"/>
+          </a:xfrm>
+        </p:spPr>
+        <p:txBody>
+          <a:bodyPr>
+            <a:normAutofit/>
+          </a:bodyPr>
+          <a:lstStyle/>
+          <a:p>
+            <a:pPr marL="0" indent="0">
+              <a:buNone/>
+            </a:pPr>
+            <a:r>
+              <a:rPr lang="en-US" dirty="0" err="1"/>
+              <a:t>pygame.Surface</a:t>
+            </a:r>
+            <a:endParaRPr lang="en-US" dirty="0"/>
+          </a:p>
+          <a:p>
+            <a:pPr lvl="1"/>
+            <a:r>
+              <a:rPr lang="en-US" sz="2800" dirty="0"/>
+              <a:t>Used to draw images on the </a:t>
+            </a:r>
+            <a:r>
+              <a:rPr lang="en-US" sz="2800" dirty="0" err="1"/>
+              <a:t>pygame</a:t>
+            </a:r>
+            <a:r>
+              <a:rPr lang="en-US" sz="2800" dirty="0"/>
+              <a:t> window</a:t>
+            </a:r>
+          </a:p>
+          <a:p>
+            <a:pPr marL="0" indent="0">
+              <a:buNone/>
+            </a:pPr>
+            <a:r>
+              <a:rPr lang="en-US" dirty="0"/>
+              <a:t>Four “types” of surfaces</a:t>
+            </a:r>
+          </a:p>
+          <a:p>
+            <a:pPr lvl="1"/>
+            <a:r>
+              <a:rPr lang="en-US" sz="2800" dirty="0"/>
+              <a:t>Basic surface</a:t>
+            </a:r>
+          </a:p>
+          <a:p>
+            <a:pPr lvl="1"/>
+            <a:r>
+              <a:rPr lang="en-US" sz="2800" dirty="0"/>
+              <a:t>Main surface</a:t>
+            </a:r>
+          </a:p>
+          <a:p>
+            <a:pPr lvl="2"/>
+            <a:r>
+              <a:rPr lang="en-US" sz="2800" dirty="0"/>
+              <a:t>The base surface all other surfaces are drawn on top of</a:t>
+            </a:r>
+          </a:p>
+          <a:p>
+            <a:pPr lvl="1"/>
+            <a:r>
+              <a:rPr lang="en-US" sz="2800" dirty="0"/>
+              <a:t>Image surface</a:t>
+            </a:r>
+          </a:p>
+          <a:p>
+            <a:pPr lvl="2"/>
+            <a:r>
+              <a:rPr lang="en-US" sz="2800" dirty="0"/>
+              <a:t>Used to display image data</a:t>
+            </a:r>
+          </a:p>
+          <a:p>
+            <a:pPr lvl="1"/>
+            <a:r>
+              <a:rPr lang="en-US" sz="2800" dirty="0"/>
+              <a:t>Text surface</a:t>
+            </a:r>
+          </a:p>
+          <a:p>
+            <a:pPr lvl="2"/>
+            <a:r>
+              <a:rPr lang="en-US" sz="2800" dirty="0"/>
+              <a:t>Used to render text</a:t>
+            </a:r>
+          </a:p>
+          <a:p>
+            <a:pPr marL="0" indent="0">
+              <a:buNone/>
+            </a:pPr>
+            <a:r>
+              <a:rPr lang="en-US" dirty="0" err="1"/>
+              <a:t>Surface.blit</a:t>
+            </a:r>
+            <a:r>
+              <a:rPr lang="en-US" dirty="0"/>
+              <a:t>(surface, </a:t>
+            </a:r>
+            <a:r>
+              <a:rPr lang="en-US" dirty="0" err="1"/>
+              <a:t>rect</a:t>
+            </a:r>
+            <a:r>
+              <a:rPr lang="en-US" dirty="0"/>
+              <a:t>)</a:t>
+            </a:r>
+          </a:p>
+          <a:p>
+            <a:pPr lvl="1"/>
+            <a:r>
+              <a:rPr lang="en-US" sz="2800" dirty="0"/>
+              <a:t>Used to draw any surface to any other surface</a:t>
+            </a:r>
+          </a:p>
+          <a:p>
+            <a:pPr marL="0" indent="0">
+              <a:buNone/>
+            </a:pPr>
+            <a:endParaRPr lang="en-US" dirty="0"/>
+          </a:p>
+        </p:txBody>
+      </p:sp>
+    </p:spTree>
+    <p:extLst>
+      <p:ext uri="{BB962C8B-B14F-4D97-AF65-F5344CB8AC3E}">
+        <p14:creationId xmlns:p14="http://schemas.microsoft.com/office/powerpoint/2010/main" val="1240660593"/>
+      </p:ext>
+    </p:extLst>
+  </p:cSld>
+  <p:clrMapOvr>
+    <a:masterClrMapping/>
+  </p:clrMapOvr>
+</p:sld>
+</file>
+
+<file path=ppt/slides/slide11.xml><?xml version="1.0" encoding="utf-8"?>
+<p:sld xmlns:a="http://schemas.openxmlformats.org/drawingml/2006/main" xmlns:r="http://schemas.openxmlformats.org/officeDocument/2006/relationships" xmlns:p="http://schemas.openxmlformats.org/presentationml/2006/main">
+  <p:cSld>
+    <p:bg>
+      <p:bgPr>
+        <a:solidFill>
+          <a:schemeClr val="bg1"/>
+        </a:solidFill>
+        <a:effectLst/>
+      </p:bgPr>
+    </p:bg>
+    <p:spTree>
+      <p:nvGrpSpPr>
+        <p:cNvPr id="1" name="">
+          <a:extLst>
+            <a:ext uri="{FF2B5EF4-FFF2-40B4-BE49-F238E27FC236}">
+              <a16:creationId xmlns:a16="http://schemas.microsoft.com/office/drawing/2014/main" id="{60C3E795-E795-176F-EA90-00693A8FA5DE}"/>
+            </a:ext>
+          </a:extLst>
+        </p:cNvPr>
+        <p:cNvGrpSpPr/>
+        <p:nvPr/>
+      </p:nvGrpSpPr>
+      <p:grpSpPr>
+        <a:xfrm>
+          <a:off x="0" y="0"/>
+          <a:ext cx="0" cy="0"/>
+          <a:chOff x="0" y="0"/>
+          <a:chExt cx="0" cy="0"/>
+        </a:xfrm>
+      </p:grpSpPr>
+      <p:sp>
+        <p:nvSpPr>
+          <p:cNvPr id="17" name="Rectangle 16">
+            <a:extLst>
+              <a:ext uri="{FF2B5EF4-FFF2-40B4-BE49-F238E27FC236}">
+                <a16:creationId xmlns:a16="http://schemas.microsoft.com/office/drawing/2014/main" id="{1DF6AD75-0AA1-7A6E-D3AB-BE3671546456}"/>
+              </a:ext>
+              <a:ext uri="{C183D7F6-B498-43B3-948B-1728B52AA6E4}">
+                <adec:decorative xmlns:adec="http://schemas.microsoft.com/office/drawing/2017/decorative" val="1"/>
+              </a:ext>
+            </a:extLst>
+          </p:cNvPr>
+          <p:cNvSpPr>
+            <a:spLocks noGrp="1" noRot="1" noChangeAspect="1" noMove="1" noResize="1" noEditPoints="1" noAdjustHandles="1" noChangeArrowheads="1" noChangeShapeType="1" noTextEdit="1"/>
+          </p:cNvSpPr>
+          <p:nvPr>
+            <p:extLst>
+              <p:ext uri="{386F3935-93C4-4BCD-93E2-E3B085C9AB24}">
+                <p16:designElem xmlns:p16="http://schemas.microsoft.com/office/powerpoint/2015/main" val="1"/>
+              </p:ext>
+            </p:extLst>
+          </p:nvPr>
+        </p:nvSpPr>
+        <p:spPr>
+          <a:xfrm>
+            <a:off x="3740383" y="0"/>
+            <a:ext cx="8451607" cy="6858001"/>
+          </a:xfrm>
+          <a:prstGeom prst="rect">
+            <a:avLst/>
+          </a:prstGeom>
+          <a:solidFill>
+            <a:schemeClr val="bg1">
+              <a:lumMod val="95000"/>
+            </a:schemeClr>
+          </a:solidFill>
+          <a:ln>
+            <a:noFill/>
+          </a:ln>
+        </p:spPr>
+        <p:style>
+          <a:lnRef idx="2">
+            <a:schemeClr val="accent1">
+              <a:shade val="50000"/>
+            </a:schemeClr>
+          </a:lnRef>
+          <a:fillRef idx="1">
+            <a:schemeClr val="accent1"/>
+          </a:fillRef>
+          <a:effectRef idx="0">
+            <a:schemeClr val="accent1"/>
+          </a:effectRef>
+          <a:fontRef idx="minor">
+            <a:schemeClr val="lt1"/>
+          </a:fontRef>
+        </p:style>
+        <p:txBody>
+          <a:bodyPr rtlCol="0" anchor="ctr"/>
+          <a:lstStyle/>
+          <a:p>
+            <a:pPr algn="ctr"/>
+            <a:endParaRPr lang="en-US"/>
+          </a:p>
+        </p:txBody>
+      </p:sp>
+      <p:sp>
+        <p:nvSpPr>
+          <p:cNvPr id="19" name="Rectangle 18">
+            <a:extLst>
+              <a:ext uri="{FF2B5EF4-FFF2-40B4-BE49-F238E27FC236}">
+                <a16:creationId xmlns:a16="http://schemas.microsoft.com/office/drawing/2014/main" id="{41FA2B4D-9278-98DE-68FF-AB01DAD29DFC}"/>
+              </a:ext>
+              <a:ext uri="{C183D7F6-B498-43B3-948B-1728B52AA6E4}">
+                <adec:decorative xmlns:adec="http://schemas.microsoft.com/office/drawing/2017/decorative" val="1"/>
+              </a:ext>
+            </a:extLst>
+          </p:cNvPr>
+          <p:cNvSpPr>
+            <a:spLocks noGrp="1" noRot="1" noChangeAspect="1" noMove="1" noResize="1" noEditPoints="1" noAdjustHandles="1" noChangeArrowheads="1" noChangeShapeType="1" noTextEdit="1"/>
+          </p:cNvSpPr>
+          <p:nvPr>
+            <p:extLst>
+              <p:ext uri="{386F3935-93C4-4BCD-93E2-E3B085C9AB24}">
+                <p16:designElem xmlns:p16="http://schemas.microsoft.com/office/powerpoint/2015/main" val="1"/>
+              </p:ext>
+            </p:extLst>
+          </p:nvPr>
+        </p:nvSpPr>
+        <p:spPr>
+          <a:xfrm>
+            <a:off x="10" y="0"/>
+            <a:ext cx="3745177" cy="6858001"/>
+          </a:xfrm>
+          <a:prstGeom prst="rect">
+            <a:avLst/>
+          </a:prstGeom>
+          <a:solidFill>
+            <a:schemeClr val="tx1">
+              <a:lumMod val="85000"/>
+              <a:lumOff val="15000"/>
+            </a:schemeClr>
+          </a:solidFill>
+          <a:ln>
+            <a:noFill/>
+          </a:ln>
+        </p:spPr>
+        <p:style>
+          <a:lnRef idx="2">
+            <a:schemeClr val="accent1">
+              <a:shade val="50000"/>
+            </a:schemeClr>
+          </a:lnRef>
+          <a:fillRef idx="1">
+            <a:schemeClr val="accent1"/>
+          </a:fillRef>
+          <a:effectRef idx="0">
+            <a:schemeClr val="accent1"/>
+          </a:effectRef>
+          <a:fontRef idx="minor">
+            <a:schemeClr val="lt1"/>
+          </a:fontRef>
+        </p:style>
+        <p:txBody>
+          <a:bodyPr rtlCol="0" anchor="ctr"/>
+          <a:lstStyle/>
+          <a:p>
+            <a:pPr algn="ctr"/>
+            <a:endParaRPr lang="en-US"/>
+          </a:p>
+        </p:txBody>
+      </p:sp>
+      <p:sp>
+        <p:nvSpPr>
+          <p:cNvPr id="2" name="Title 1">
+            <a:extLst>
+              <a:ext uri="{FF2B5EF4-FFF2-40B4-BE49-F238E27FC236}">
                 <a16:creationId xmlns:a16="http://schemas.microsoft.com/office/drawing/2014/main" id="{70DEE0C7-9792-955C-8D11-36A5FA2406A0}"/>
               </a:ext>
             </a:extLst>
@@ -4838,7 +5208,7 @@
 </p:sld>
 </file>
 
-<file path=ppt/slides/slide11.xml><?xml version="1.0" encoding="utf-8"?>
+<file path=ppt/slides/slide12.xml><?xml version="1.0" encoding="utf-8"?>
 <p:sld xmlns:a="http://schemas.openxmlformats.org/drawingml/2006/main" xmlns:r="http://schemas.openxmlformats.org/officeDocument/2006/relationships" xmlns:p="http://schemas.openxmlformats.org/presentationml/2006/main">
   <p:cSld>
     <p:bg>
@@ -5242,7 +5612,7 @@
 </p:sld>
 </file>
 
-<file path=ppt/slides/slide12.xml><?xml version="1.0" encoding="utf-8"?>
+<file path=ppt/slides/slide13.xml><?xml version="1.0" encoding="utf-8"?>
 <p:sld xmlns:a="http://schemas.openxmlformats.org/drawingml/2006/main" xmlns:r="http://schemas.openxmlformats.org/officeDocument/2006/relationships" xmlns:p="http://schemas.openxmlformats.org/presentationml/2006/main">
   <p:cSld>
     <p:bg>
@@ -5648,7 +6018,7 @@
 </p:sld>
 </file>
 
-<file path=ppt/slides/slide13.xml><?xml version="1.0" encoding="utf-8"?>
+<file path=ppt/slides/slide14.xml><?xml version="1.0" encoding="utf-8"?>
 <p:sld xmlns:a="http://schemas.openxmlformats.org/drawingml/2006/main" xmlns:r="http://schemas.openxmlformats.org/officeDocument/2006/relationships" xmlns:p="http://schemas.openxmlformats.org/presentationml/2006/main">
   <p:cSld>
     <p:bg>
@@ -6184,7 +6554,7 @@
 </p:sld>
 </file>
 
-<file path=ppt/slides/slide14.xml><?xml version="1.0" encoding="utf-8"?>
+<file path=ppt/slides/slide15.xml><?xml version="1.0" encoding="utf-8"?>
 <p:sld xmlns:a="http://schemas.openxmlformats.org/drawingml/2006/main" xmlns:r="http://schemas.openxmlformats.org/officeDocument/2006/relationships" xmlns:p="http://schemas.openxmlformats.org/presentationml/2006/main">
   <p:cSld>
     <p:bg>
@@ -6553,7 +6923,7 @@
 </p:sld>
 </file>
 
-<file path=ppt/slides/slide15.xml><?xml version="1.0" encoding="utf-8"?>
+<file path=ppt/slides/slide16.xml><?xml version="1.0" encoding="utf-8"?>
 <p:sld xmlns:a="http://schemas.openxmlformats.org/drawingml/2006/main" xmlns:r="http://schemas.openxmlformats.org/officeDocument/2006/relationships" xmlns:p="http://schemas.openxmlformats.org/presentationml/2006/main">
   <p:cSld>
     <p:bg>
@@ -6939,7 +7309,7 @@
 </p:sld>
 </file>
 
-<file path=ppt/slides/slide16.xml><?xml version="1.0" encoding="utf-8"?>
+<file path=ppt/slides/slide17.xml><?xml version="1.0" encoding="utf-8"?>
 <p:sld xmlns:a="http://schemas.openxmlformats.org/drawingml/2006/main" xmlns:r="http://schemas.openxmlformats.org/officeDocument/2006/relationships" xmlns:p="http://schemas.openxmlformats.org/presentationml/2006/main">
   <p:cSld>
     <p:bg>
@@ -7252,7 +7622,7 @@
 </p:sld>
 </file>
 
-<file path=ppt/slides/slide17.xml><?xml version="1.0" encoding="utf-8"?>
+<file path=ppt/slides/slide18.xml><?xml version="1.0" encoding="utf-8"?>
 <p:sld xmlns:a="http://schemas.openxmlformats.org/drawingml/2006/main" xmlns:r="http://schemas.openxmlformats.org/officeDocument/2006/relationships" xmlns:p="http://schemas.openxmlformats.org/presentationml/2006/main">
   <p:cSld>
     <p:bg>
@@ -7667,7 +8037,7 @@
 </p:sld>
 </file>
 
-<file path=ppt/slides/slide18.xml><?xml version="1.0" encoding="utf-8"?>
+<file path=ppt/slides/slide19.xml><?xml version="1.0" encoding="utf-8"?>
 <p:sld xmlns:a="http://schemas.openxmlformats.org/drawingml/2006/main" xmlns:r="http://schemas.openxmlformats.org/officeDocument/2006/relationships" xmlns:p="http://schemas.openxmlformats.org/presentationml/2006/main">
   <p:cSld>
     <p:bg>
@@ -8090,7 +8460,191 @@
 </p:sld>
 </file>
 
-<file path=ppt/slides/slide19.xml><?xml version="1.0" encoding="utf-8"?>
+<file path=ppt/slides/slide2.xml><?xml version="1.0" encoding="utf-8"?>
+<p:sld xmlns:a="http://schemas.openxmlformats.org/drawingml/2006/main" xmlns:r="http://schemas.openxmlformats.org/officeDocument/2006/relationships" xmlns:p="http://schemas.openxmlformats.org/presentationml/2006/main">
+  <p:cSld>
+    <p:bg>
+      <p:bgPr>
+        <a:solidFill>
+          <a:schemeClr val="bg1"/>
+        </a:solidFill>
+        <a:effectLst/>
+      </p:bgPr>
+    </p:bg>
+    <p:spTree>
+      <p:nvGrpSpPr>
+        <p:cNvPr id="1" name="">
+          <a:extLst>
+            <a:ext uri="{FF2B5EF4-FFF2-40B4-BE49-F238E27FC236}">
+              <a16:creationId xmlns:a16="http://schemas.microsoft.com/office/drawing/2014/main" id="{ACD5CE63-743F-A9BC-9626-5CE85F79989F}"/>
+            </a:ext>
+          </a:extLst>
+        </p:cNvPr>
+        <p:cNvGrpSpPr/>
+        <p:nvPr/>
+      </p:nvGrpSpPr>
+      <p:grpSpPr>
+        <a:xfrm>
+          <a:off x="0" y="0"/>
+          <a:ext cx="0" cy="0"/>
+          <a:chOff x="0" y="0"/>
+          <a:chExt cx="0" cy="0"/>
+        </a:xfrm>
+      </p:grpSpPr>
+      <p:sp>
+        <p:nvSpPr>
+          <p:cNvPr id="13" name="Down Arrow 7">
+            <a:extLst>
+              <a:ext uri="{FF2B5EF4-FFF2-40B4-BE49-F238E27FC236}">
+                <a16:creationId xmlns:a16="http://schemas.microsoft.com/office/drawing/2014/main" id="{D4771268-CB57-404A-9271-370EB28F6090}"/>
+              </a:ext>
+              <a:ext uri="{C183D7F6-B498-43B3-948B-1728B52AA6E4}">
+                <adec:decorative xmlns:adec="http://schemas.microsoft.com/office/drawing/2017/decorative" val="1"/>
+              </a:ext>
+            </a:extLst>
+          </p:cNvPr>
+          <p:cNvSpPr>
+            <a:spLocks noGrp="1" noRot="1" noChangeAspect="1" noMove="1" noResize="1" noEditPoints="1" noAdjustHandles="1" noChangeArrowheads="1" noChangeShapeType="1" noTextEdit="1"/>
+          </p:cNvSpPr>
+          <p:nvPr>
+            <p:extLst>
+              <p:ext uri="{386F3935-93C4-4BCD-93E2-E3B085C9AB24}">
+                <p16:designElem xmlns:p16="http://schemas.microsoft.com/office/powerpoint/2015/main" val="1"/>
+              </p:ext>
+            </p:extLst>
+          </p:nvPr>
+        </p:nvSpPr>
+        <p:spPr>
+          <a:xfrm rot="16200000">
+            <a:off x="800100" y="1491343"/>
+            <a:ext cx="3333749" cy="3499103"/>
+          </a:xfrm>
+          <a:prstGeom prst="downArrow">
+            <a:avLst>
+              <a:gd name="adj1" fmla="val 100000"/>
+              <a:gd name="adj2" fmla="val 15788"/>
+            </a:avLst>
+          </a:prstGeom>
+          <a:solidFill>
+            <a:srgbClr val="404040"/>
+          </a:solidFill>
+          <a:ln w="53975">
+            <a:noFill/>
+          </a:ln>
+        </p:spPr>
+        <p:style>
+          <a:lnRef idx="2">
+            <a:schemeClr val="accent1">
+              <a:shade val="50000"/>
+            </a:schemeClr>
+          </a:lnRef>
+          <a:fillRef idx="1">
+            <a:schemeClr val="accent1"/>
+          </a:fillRef>
+          <a:effectRef idx="0">
+            <a:schemeClr val="accent1"/>
+          </a:effectRef>
+          <a:fontRef idx="minor">
+            <a:schemeClr val="lt1"/>
+          </a:fontRef>
+        </p:style>
+        <p:txBody>
+          <a:bodyPr rtlCol="0" anchor="ctr"/>
+          <a:lstStyle/>
+          <a:p>
+            <a:pPr algn="ctr"/>
+            <a:endParaRPr lang="en-US"/>
+          </a:p>
+        </p:txBody>
+      </p:sp>
+      <p:sp>
+        <p:nvSpPr>
+          <p:cNvPr id="2" name="Title 1">
+            <a:extLst>
+              <a:ext uri="{FF2B5EF4-FFF2-40B4-BE49-F238E27FC236}">
+                <a16:creationId xmlns:a16="http://schemas.microsoft.com/office/drawing/2014/main" id="{A060034B-E83A-5AD7-0178-14B77D5E85BE}"/>
+              </a:ext>
+            </a:extLst>
+          </p:cNvPr>
+          <p:cNvSpPr>
+            <a:spLocks noGrp="1"/>
+          </p:cNvSpPr>
+          <p:nvPr>
+            <p:ph type="title"/>
+          </p:nvPr>
+        </p:nvSpPr>
+        <p:spPr>
+          <a:xfrm>
+            <a:off x="1028700" y="1967266"/>
+            <a:ext cx="2628900" cy="2547257"/>
+          </a:xfrm>
+          <a:noFill/>
+        </p:spPr>
+        <p:txBody>
+          <a:bodyPr vert="horz" lIns="91440" tIns="45720" rIns="91440" bIns="45720" rtlCol="0" anchor="ctr">
+            <a:normAutofit/>
+          </a:bodyPr>
+          <a:lstStyle/>
+          <a:p>
+            <a:pPr algn="ctr"/>
+            <a:r>
+              <a:rPr lang="en-US" sz="3600" kern="1200">
+                <a:solidFill>
+                  <a:srgbClr val="FFFFFF"/>
+                </a:solidFill>
+                <a:latin typeface="+mj-lt"/>
+                <a:ea typeface="+mj-ea"/>
+                <a:cs typeface="+mj-cs"/>
+              </a:rPr>
+              <a:t>Attendance</a:t>
+            </a:r>
+          </a:p>
+        </p:txBody>
+      </p:sp>
+      <p:pic>
+        <p:nvPicPr>
+          <p:cNvPr id="4" name="Picture 3">
+            <a:extLst>
+              <a:ext uri="{FF2B5EF4-FFF2-40B4-BE49-F238E27FC236}">
+                <a16:creationId xmlns:a16="http://schemas.microsoft.com/office/drawing/2014/main" id="{1876CA86-F076-5DE8-AFD7-88B9B170D651}"/>
+              </a:ext>
+            </a:extLst>
+          </p:cNvPr>
+          <p:cNvPicPr>
+            <a:picLocks noChangeAspect="1"/>
+          </p:cNvPicPr>
+          <p:nvPr/>
+        </p:nvPicPr>
+        <p:blipFill>
+          <a:blip r:embed="rId2"/>
+          <a:stretch>
+            <a:fillRect/>
+          </a:stretch>
+        </p:blipFill>
+        <p:spPr>
+          <a:xfrm>
+            <a:off x="5383296" y="643466"/>
+            <a:ext cx="5568739" cy="5568739"/>
+          </a:xfrm>
+          <a:prstGeom prst="rect">
+            <a:avLst/>
+          </a:prstGeom>
+        </p:spPr>
+      </p:pic>
+    </p:spTree>
+    <p:extLst>
+      <p:ext uri="{BB962C8B-B14F-4D97-AF65-F5344CB8AC3E}">
+        <p14:creationId xmlns:p14="http://schemas.microsoft.com/office/powerpoint/2010/main" val="1864491236"/>
+      </p:ext>
+    </p:extLst>
+  </p:cSld>
+  <p:clrMapOvr>
+    <a:masterClrMapping/>
+  </p:clrMapOvr>
+</p:sld>
+</file>
+
+<file path=ppt/slides/slide20.xml><?xml version="1.0" encoding="utf-8"?>
 <p:sld xmlns:a="http://schemas.openxmlformats.org/drawingml/2006/main" xmlns:r="http://schemas.openxmlformats.org/officeDocument/2006/relationships" xmlns:p="http://schemas.openxmlformats.org/presentationml/2006/main">
   <p:cSld>
     <p:bg>
@@ -8556,468 +9110,7 @@
 </p:sld>
 </file>
 
-<file path=ppt/slides/slide2.xml><?xml version="1.0" encoding="utf-8"?>
-<p:sld xmlns:a="http://schemas.openxmlformats.org/drawingml/2006/main" xmlns:r="http://schemas.openxmlformats.org/officeDocument/2006/relationships" xmlns:p="http://schemas.openxmlformats.org/presentationml/2006/main">
-  <p:cSld>
-    <p:bg>
-      <p:bgPr>
-        <a:solidFill>
-          <a:schemeClr val="bg1"/>
-        </a:solidFill>
-        <a:effectLst/>
-      </p:bgPr>
-    </p:bg>
-    <p:spTree>
-      <p:nvGrpSpPr>
-        <p:cNvPr id="1" name=""/>
-        <p:cNvGrpSpPr/>
-        <p:nvPr/>
-      </p:nvGrpSpPr>
-      <p:grpSpPr>
-        <a:xfrm>
-          <a:off x="0" y="0"/>
-          <a:ext cx="0" cy="0"/>
-          <a:chOff x="0" y="0"/>
-          <a:chExt cx="0" cy="0"/>
-        </a:xfrm>
-      </p:grpSpPr>
-      <p:sp>
-        <p:nvSpPr>
-          <p:cNvPr id="7" name="Rectangle 6">
-            <a:extLst>
-              <a:ext uri="{FF2B5EF4-FFF2-40B4-BE49-F238E27FC236}">
-                <a16:creationId xmlns:a16="http://schemas.microsoft.com/office/drawing/2014/main" id="{9F3F54E9-29F0-8601-8487-CDD316AC4833}"/>
-              </a:ext>
-              <a:ext uri="{C183D7F6-B498-43B3-948B-1728B52AA6E4}">
-                <adec:decorative xmlns:adec="http://schemas.microsoft.com/office/drawing/2017/decorative" val="1"/>
-              </a:ext>
-            </a:extLst>
-          </p:cNvPr>
-          <p:cNvSpPr>
-            <a:spLocks noChangeAspect="1"/>
-          </p:cNvSpPr>
-          <p:nvPr>
-            <p:extLst>
-              <p:ext uri="{386F3935-93C4-4BCD-93E2-E3B085C9AB24}">
-                <p16:designElem xmlns:p16="http://schemas.microsoft.com/office/powerpoint/2015/main" val="1"/>
-              </p:ext>
-            </p:extLst>
-          </p:nvPr>
-        </p:nvSpPr>
-        <p:spPr>
-          <a:xfrm>
-            <a:off x="3740383" y="0"/>
-            <a:ext cx="8451607" cy="6858001"/>
-          </a:xfrm>
-          <a:prstGeom prst="rect">
-            <a:avLst/>
-          </a:prstGeom>
-          <a:solidFill>
-            <a:schemeClr val="bg1">
-              <a:lumMod val="95000"/>
-            </a:schemeClr>
-          </a:solidFill>
-          <a:ln>
-            <a:noFill/>
-          </a:ln>
-        </p:spPr>
-        <p:style>
-          <a:lnRef idx="2">
-            <a:schemeClr val="accent1">
-              <a:shade val="50000"/>
-            </a:schemeClr>
-          </a:lnRef>
-          <a:fillRef idx="1">
-            <a:schemeClr val="accent1"/>
-          </a:fillRef>
-          <a:effectRef idx="0">
-            <a:schemeClr val="accent1"/>
-          </a:effectRef>
-          <a:fontRef idx="minor">
-            <a:schemeClr val="lt1"/>
-          </a:fontRef>
-        </p:style>
-        <p:txBody>
-          <a:bodyPr rtlCol="0" anchor="ctr"/>
-          <a:lstStyle/>
-          <a:p>
-            <a:pPr algn="ctr"/>
-            <a:endParaRPr lang="en-US"/>
-          </a:p>
-        </p:txBody>
-      </p:sp>
-      <p:sp>
-        <p:nvSpPr>
-          <p:cNvPr id="8" name="Rectangle 7">
-            <a:extLst>
-              <a:ext uri="{FF2B5EF4-FFF2-40B4-BE49-F238E27FC236}">
-                <a16:creationId xmlns:a16="http://schemas.microsoft.com/office/drawing/2014/main" id="{19548216-06A4-D789-72B9-F7611D587A9E}"/>
-              </a:ext>
-              <a:ext uri="{C183D7F6-B498-43B3-948B-1728B52AA6E4}">
-                <adec:decorative xmlns:adec="http://schemas.microsoft.com/office/drawing/2017/decorative" val="1"/>
-              </a:ext>
-            </a:extLst>
-          </p:cNvPr>
-          <p:cNvSpPr>
-            <a:spLocks noChangeAspect="1"/>
-          </p:cNvSpPr>
-          <p:nvPr>
-            <p:extLst>
-              <p:ext uri="{386F3935-93C4-4BCD-93E2-E3B085C9AB24}">
-                <p16:designElem xmlns:p16="http://schemas.microsoft.com/office/powerpoint/2015/main" val="1"/>
-              </p:ext>
-            </p:extLst>
-          </p:nvPr>
-        </p:nvSpPr>
-        <p:spPr>
-          <a:xfrm>
-            <a:off x="10" y="0"/>
-            <a:ext cx="3745177" cy="6858001"/>
-          </a:xfrm>
-          <a:prstGeom prst="rect">
-            <a:avLst/>
-          </a:prstGeom>
-          <a:solidFill>
-            <a:schemeClr val="tx1">
-              <a:lumMod val="85000"/>
-              <a:lumOff val="15000"/>
-            </a:schemeClr>
-          </a:solidFill>
-          <a:ln>
-            <a:noFill/>
-          </a:ln>
-        </p:spPr>
-        <p:style>
-          <a:lnRef idx="2">
-            <a:schemeClr val="accent1">
-              <a:shade val="50000"/>
-            </a:schemeClr>
-          </a:lnRef>
-          <a:fillRef idx="1">
-            <a:schemeClr val="accent1"/>
-          </a:fillRef>
-          <a:effectRef idx="0">
-            <a:schemeClr val="accent1"/>
-          </a:effectRef>
-          <a:fontRef idx="minor">
-            <a:schemeClr val="lt1"/>
-          </a:fontRef>
-        </p:style>
-        <p:txBody>
-          <a:bodyPr rtlCol="0" anchor="ctr"/>
-          <a:lstStyle/>
-          <a:p>
-            <a:pPr algn="ctr"/>
-            <a:endParaRPr lang="en-US"/>
-          </a:p>
-        </p:txBody>
-      </p:sp>
-      <p:sp>
-        <p:nvSpPr>
-          <p:cNvPr id="2" name="Title 1">
-            <a:extLst>
-              <a:ext uri="{FF2B5EF4-FFF2-40B4-BE49-F238E27FC236}">
-                <a16:creationId xmlns:a16="http://schemas.microsoft.com/office/drawing/2014/main" id="{641BD0F0-C3AB-7696-E27E-FDC1C4921089}"/>
-              </a:ext>
-            </a:extLst>
-          </p:cNvPr>
-          <p:cNvSpPr>
-            <a:spLocks noGrp="1"/>
-          </p:cNvSpPr>
-          <p:nvPr>
-            <p:ph type="title"/>
-          </p:nvPr>
-        </p:nvSpPr>
-        <p:spPr>
-          <a:xfrm>
-            <a:off x="7807" y="637934"/>
-            <a:ext cx="3745179" cy="4716967"/>
-          </a:xfrm>
-        </p:spPr>
-        <p:txBody>
-          <a:bodyPr vert="horz" lIns="91440" tIns="45720" rIns="91440" bIns="45720" rtlCol="0" anchor="t">
-            <a:normAutofit/>
-          </a:bodyPr>
-          <a:lstStyle/>
-          <a:p>
-            <a:pPr algn="ctr"/>
-            <a:r>
-              <a:rPr lang="en-US" kern="1200" dirty="0">
-                <a:solidFill>
-                  <a:srgbClr val="FFFFFF"/>
-                </a:solidFill>
-                <a:latin typeface="+mj-lt"/>
-                <a:ea typeface="+mj-ea"/>
-                <a:cs typeface="+mj-cs"/>
-              </a:rPr>
-              <a:t>Requirements</a:t>
-            </a:r>
-          </a:p>
-        </p:txBody>
-      </p:sp>
-      <p:sp>
-        <p:nvSpPr>
-          <p:cNvPr id="3" name="Content Placeholder 2">
-            <a:extLst>
-              <a:ext uri="{FF2B5EF4-FFF2-40B4-BE49-F238E27FC236}">
-                <a16:creationId xmlns:a16="http://schemas.microsoft.com/office/drawing/2014/main" id="{7A936E0D-8183-1845-65D7-5F9FB4EBA5DA}"/>
-              </a:ext>
-            </a:extLst>
-          </p:cNvPr>
-          <p:cNvSpPr>
-            <a:spLocks noGrp="1"/>
-          </p:cNvSpPr>
-          <p:nvPr>
-            <p:ph idx="1"/>
-          </p:nvPr>
-        </p:nvSpPr>
-        <p:spPr>
-          <a:xfrm>
-            <a:off x="3760784" y="637934"/>
-            <a:ext cx="4148138" cy="5841693"/>
-          </a:xfrm>
-        </p:spPr>
-        <p:txBody>
-          <a:bodyPr vert="horz" lIns="91440" tIns="45720" rIns="91440" bIns="45720" rtlCol="0">
-            <a:normAutofit/>
-          </a:bodyPr>
-          <a:lstStyle/>
-          <a:p>
-            <a:pPr marL="0" indent="0">
-              <a:buNone/>
-            </a:pPr>
-            <a:r>
-              <a:rPr lang="en-US" sz="4400" dirty="0"/>
-              <a:t>Python</a:t>
-            </a:r>
-          </a:p>
-          <a:p>
-            <a:r>
-              <a:rPr lang="en-US" dirty="0"/>
-              <a:t>Download python from</a:t>
-            </a:r>
-          </a:p>
-          <a:p>
-            <a:r>
-              <a:rPr lang="en-US" sz="2800" dirty="0">
-                <a:hlinkClick r:id="rId2"/>
-              </a:rPr>
-              <a:t>https://www.python.org/downloads/</a:t>
-            </a:r>
-            <a:endParaRPr lang="en-US" sz="2800" dirty="0"/>
-          </a:p>
-          <a:p>
-            <a:r>
-              <a:rPr lang="en-US" dirty="0"/>
-              <a:t>Run the installer:</a:t>
-            </a:r>
-          </a:p>
-          <a:p>
-            <a:pPr lvl="1"/>
-            <a:r>
-              <a:rPr lang="en-US" sz="2800" dirty="0"/>
-              <a:t>Windows: Ensure “Add Python to Path” is checked when installing</a:t>
-            </a:r>
-          </a:p>
-        </p:txBody>
-      </p:sp>
-      <p:cxnSp>
-        <p:nvCxnSpPr>
-          <p:cNvPr id="53" name="Straight Connector 52">
-            <a:extLst>
-              <a:ext uri="{FF2B5EF4-FFF2-40B4-BE49-F238E27FC236}">
-                <a16:creationId xmlns:a16="http://schemas.microsoft.com/office/drawing/2014/main" id="{1F16A8D4-FE87-4604-88B2-394B5D1EB437}"/>
-              </a:ext>
-              <a:ext uri="{C183D7F6-B498-43B3-948B-1728B52AA6E4}">
-                <adec:decorative xmlns:adec="http://schemas.microsoft.com/office/drawing/2017/decorative" val="1"/>
-              </a:ext>
-            </a:extLst>
-          </p:cNvPr>
-          <p:cNvCxnSpPr>
-            <a:cxnSpLocks noGrp="1" noRot="1" noChangeAspect="1" noMove="1" noResize="1" noEditPoints="1" noAdjustHandles="1" noChangeArrowheads="1" noChangeShapeType="1"/>
-          </p:cNvCxnSpPr>
-          <p:nvPr>
-            <p:extLst>
-              <p:ext uri="{386F3935-93C4-4BCD-93E2-E3B085C9AB24}">
-                <p16:designElem xmlns:p16="http://schemas.microsoft.com/office/powerpoint/2015/main" val="1"/>
-              </p:ext>
-            </p:extLst>
-          </p:nvPr>
-        </p:nvCxnSpPr>
-        <p:spPr>
-          <a:xfrm>
-            <a:off x="8129871" y="1412488"/>
-            <a:ext cx="0" cy="3657600"/>
-          </a:xfrm>
-          <a:prstGeom prst="line">
-            <a:avLst/>
-          </a:prstGeom>
-          <a:ln w="12700">
-            <a:solidFill>
-              <a:schemeClr val="tx1">
-                <a:lumMod val="50000"/>
-                <a:lumOff val="50000"/>
-              </a:schemeClr>
-            </a:solidFill>
-          </a:ln>
-        </p:spPr>
-        <p:style>
-          <a:lnRef idx="1">
-            <a:schemeClr val="accent1"/>
-          </a:lnRef>
-          <a:fillRef idx="0">
-            <a:schemeClr val="accent1"/>
-          </a:fillRef>
-          <a:effectRef idx="0">
-            <a:schemeClr val="accent1"/>
-          </a:effectRef>
-          <a:fontRef idx="minor">
-            <a:schemeClr val="tx1"/>
-          </a:fontRef>
-        </p:style>
-      </p:cxnSp>
-      <p:sp>
-        <p:nvSpPr>
-          <p:cNvPr id="6" name="TextBox 5">
-            <a:extLst>
-              <a:ext uri="{FF2B5EF4-FFF2-40B4-BE49-F238E27FC236}">
-                <a16:creationId xmlns:a16="http://schemas.microsoft.com/office/drawing/2014/main" id="{1812826B-1893-1DE5-C17A-FB0D3B6D85F9}"/>
-              </a:ext>
-            </a:extLst>
-          </p:cNvPr>
-          <p:cNvSpPr txBox="1"/>
-          <p:nvPr/>
-        </p:nvSpPr>
-        <p:spPr>
-          <a:xfrm>
-            <a:off x="8451605" y="637935"/>
-            <a:ext cx="3197701" cy="5832336"/>
-          </a:xfrm>
-          <a:prstGeom prst="rect">
-            <a:avLst/>
-          </a:prstGeom>
-        </p:spPr>
-        <p:txBody>
-          <a:bodyPr vert="horz" lIns="91440" tIns="45720" rIns="91440" bIns="45720" rtlCol="0">
-            <a:noAutofit/>
-          </a:bodyPr>
-          <a:lstStyle/>
-          <a:p>
-            <a:pPr>
-              <a:lnSpc>
-                <a:spcPct val="90000"/>
-              </a:lnSpc>
-              <a:spcAft>
-                <a:spcPts val="600"/>
-              </a:spcAft>
-            </a:pPr>
-            <a:r>
-              <a:rPr lang="en-US" sz="2800" dirty="0"/>
-              <a:t>A plain text editor and a shell environment</a:t>
-            </a:r>
-          </a:p>
-          <a:p>
-            <a:pPr indent="-228600">
-              <a:lnSpc>
-                <a:spcPct val="90000"/>
-              </a:lnSpc>
-              <a:spcAft>
-                <a:spcPts val="600"/>
-              </a:spcAft>
-              <a:buFont typeface="Arial" panose="020B0604020202020204" pitchFamily="34" charset="0"/>
-              <a:buChar char="•"/>
-            </a:pPr>
-            <a:endParaRPr lang="en-US" sz="2800" dirty="0"/>
-          </a:p>
-          <a:p>
-            <a:pPr>
-              <a:lnSpc>
-                <a:spcPct val="90000"/>
-              </a:lnSpc>
-              <a:spcAft>
-                <a:spcPts val="600"/>
-              </a:spcAft>
-            </a:pPr>
-            <a:r>
-              <a:rPr lang="en-US" sz="2800" dirty="0"/>
-              <a:t>-or-</a:t>
-            </a:r>
-          </a:p>
-          <a:p>
-            <a:pPr indent="-228600">
-              <a:lnSpc>
-                <a:spcPct val="90000"/>
-              </a:lnSpc>
-              <a:spcAft>
-                <a:spcPts val="600"/>
-              </a:spcAft>
-              <a:buFont typeface="Arial" panose="020B0604020202020204" pitchFamily="34" charset="0"/>
-              <a:buChar char="•"/>
-            </a:pPr>
-            <a:endParaRPr lang="en-US" sz="2800" dirty="0"/>
-          </a:p>
-          <a:p>
-            <a:pPr>
-              <a:lnSpc>
-                <a:spcPct val="90000"/>
-              </a:lnSpc>
-              <a:spcAft>
-                <a:spcPts val="600"/>
-              </a:spcAft>
-            </a:pPr>
-            <a:r>
-              <a:rPr lang="en-US" sz="2800" dirty="0"/>
-              <a:t>An Integrated Development Environment (IDE)</a:t>
-            </a:r>
-          </a:p>
-          <a:p>
-            <a:pPr marL="285750" indent="-228600">
-              <a:lnSpc>
-                <a:spcPct val="90000"/>
-              </a:lnSpc>
-              <a:spcAft>
-                <a:spcPts val="600"/>
-              </a:spcAft>
-              <a:buFont typeface="Arial" panose="020B0604020202020204" pitchFamily="34" charset="0"/>
-              <a:buChar char="•"/>
-            </a:pPr>
-            <a:r>
-              <a:rPr lang="en-US" sz="2800" dirty="0"/>
-              <a:t>VS Code</a:t>
-            </a:r>
-          </a:p>
-          <a:p>
-            <a:pPr marL="285750" indent="-228600">
-              <a:lnSpc>
-                <a:spcPct val="90000"/>
-              </a:lnSpc>
-              <a:spcAft>
-                <a:spcPts val="600"/>
-              </a:spcAft>
-              <a:buFont typeface="Arial" panose="020B0604020202020204" pitchFamily="34" charset="0"/>
-              <a:buChar char="•"/>
-            </a:pPr>
-            <a:r>
-              <a:rPr lang="en-US" sz="2800" dirty="0"/>
-              <a:t>Etc..</a:t>
-            </a:r>
-          </a:p>
-        </p:txBody>
-      </p:sp>
-    </p:spTree>
-    <p:extLst>
-      <p:ext uri="{BB962C8B-B14F-4D97-AF65-F5344CB8AC3E}">
-        <p14:creationId xmlns:p14="http://schemas.microsoft.com/office/powerpoint/2010/main" val="1369342629"/>
-      </p:ext>
-    </p:extLst>
-  </p:cSld>
-  <p:clrMapOvr>
-    <a:masterClrMapping/>
-  </p:clrMapOvr>
-</p:sld>
-</file>
-
-<file path=ppt/slides/slide20.xml><?xml version="1.0" encoding="utf-8"?>
+<file path=ppt/slides/slide21.xml><?xml version="1.0" encoding="utf-8"?>
 <p:sld xmlns:a="http://schemas.openxmlformats.org/drawingml/2006/main" xmlns:r="http://schemas.openxmlformats.org/officeDocument/2006/relationships" xmlns:p="http://schemas.openxmlformats.org/presentationml/2006/main">
   <p:cSld>
     <p:bg>
@@ -9369,7 +9462,7 @@
 </p:sld>
 </file>
 
-<file path=ppt/slides/slide21.xml><?xml version="1.0" encoding="utf-8"?>
+<file path=ppt/slides/slide22.xml><?xml version="1.0" encoding="utf-8"?>
 <p:sld xmlns:a="http://schemas.openxmlformats.org/drawingml/2006/main" xmlns:r="http://schemas.openxmlformats.org/officeDocument/2006/relationships" xmlns:p="http://schemas.openxmlformats.org/presentationml/2006/main">
   <p:cSld>
     <p:bg>
@@ -9753,7 +9846,7 @@
 </p:sld>
 </file>
 
-<file path=ppt/slides/slide22.xml><?xml version="1.0" encoding="utf-8"?>
+<file path=ppt/slides/slide23.xml><?xml version="1.0" encoding="utf-8"?>
 <p:sld xmlns:a="http://schemas.openxmlformats.org/drawingml/2006/main" xmlns:r="http://schemas.openxmlformats.org/officeDocument/2006/relationships" xmlns:p="http://schemas.openxmlformats.org/presentationml/2006/main">
   <p:cSld>
     <p:bg>
@@ -10101,7 +10194,7 @@
 </p:sld>
 </file>
 
-<file path=ppt/slides/slide23.xml><?xml version="1.0" encoding="utf-8"?>
+<file path=ppt/slides/slide24.xml><?xml version="1.0" encoding="utf-8"?>
 <p:sld xmlns:a="http://schemas.openxmlformats.org/drawingml/2006/main" xmlns:r="http://schemas.openxmlformats.org/officeDocument/2006/relationships" xmlns:p="http://schemas.openxmlformats.org/presentationml/2006/main">
   <p:cSld>
     <p:bg>
@@ -10480,7 +10573,7 @@
 </p:sld>
 </file>
 
-<file path=ppt/slides/slide24.xml><?xml version="1.0" encoding="utf-8"?>
+<file path=ppt/slides/slide25.xml><?xml version="1.0" encoding="utf-8"?>
 <p:sld xmlns:a="http://schemas.openxmlformats.org/drawingml/2006/main" xmlns:r="http://schemas.openxmlformats.org/officeDocument/2006/relationships" xmlns:p="http://schemas.openxmlformats.org/presentationml/2006/main">
   <p:cSld>
     <p:bg>
@@ -10816,7 +10909,7 @@
 </p:sld>
 </file>
 
-<file path=ppt/slides/slide25.xml><?xml version="1.0" encoding="utf-8"?>
+<file path=ppt/slides/slide26.xml><?xml version="1.0" encoding="utf-8"?>
 <p:sld xmlns:a="http://schemas.openxmlformats.org/drawingml/2006/main" xmlns:r="http://schemas.openxmlformats.org/officeDocument/2006/relationships" xmlns:p="http://schemas.openxmlformats.org/presentationml/2006/main">
   <p:cSld>
     <p:bg>
@@ -11132,7 +11225,7 @@
 </p:sld>
 </file>
 
-<file path=ppt/slides/slide26.xml><?xml version="1.0" encoding="utf-8"?>
+<file path=ppt/slides/slide27.xml><?xml version="1.0" encoding="utf-8"?>
 <p:sld xmlns:a="http://schemas.openxmlformats.org/drawingml/2006/main" xmlns:r="http://schemas.openxmlformats.org/officeDocument/2006/relationships" xmlns:p="http://schemas.openxmlformats.org/presentationml/2006/main">
   <p:cSld>
     <p:bg>
@@ -11505,7 +11598,7 @@
 </p:sld>
 </file>
 
-<file path=ppt/slides/slide27.xml><?xml version="1.0" encoding="utf-8"?>
+<file path=ppt/slides/slide28.xml><?xml version="1.0" encoding="utf-8"?>
 <p:sld xmlns:a="http://schemas.openxmlformats.org/drawingml/2006/main" xmlns:r="http://schemas.openxmlformats.org/officeDocument/2006/relationships" xmlns:p="http://schemas.openxmlformats.org/presentationml/2006/main">
   <p:cSld>
     <p:bg>
@@ -11893,7 +11986,7 @@
 </p:sld>
 </file>
 
-<file path=ppt/slides/slide28.xml><?xml version="1.0" encoding="utf-8"?>
+<file path=ppt/slides/slide29.xml><?xml version="1.0" encoding="utf-8"?>
 <p:sld xmlns:a="http://schemas.openxmlformats.org/drawingml/2006/main" xmlns:r="http://schemas.openxmlformats.org/officeDocument/2006/relationships" xmlns:p="http://schemas.openxmlformats.org/presentationml/2006/main">
   <p:cSld>
     <p:bg>
@@ -12316,7 +12409,468 @@
 </p:sld>
 </file>
 
-<file path=ppt/slides/slide29.xml><?xml version="1.0" encoding="utf-8"?>
+<file path=ppt/slides/slide3.xml><?xml version="1.0" encoding="utf-8"?>
+<p:sld xmlns:a="http://schemas.openxmlformats.org/drawingml/2006/main" xmlns:r="http://schemas.openxmlformats.org/officeDocument/2006/relationships" xmlns:p="http://schemas.openxmlformats.org/presentationml/2006/main">
+  <p:cSld>
+    <p:bg>
+      <p:bgPr>
+        <a:solidFill>
+          <a:schemeClr val="bg1"/>
+        </a:solidFill>
+        <a:effectLst/>
+      </p:bgPr>
+    </p:bg>
+    <p:spTree>
+      <p:nvGrpSpPr>
+        <p:cNvPr id="1" name=""/>
+        <p:cNvGrpSpPr/>
+        <p:nvPr/>
+      </p:nvGrpSpPr>
+      <p:grpSpPr>
+        <a:xfrm>
+          <a:off x="0" y="0"/>
+          <a:ext cx="0" cy="0"/>
+          <a:chOff x="0" y="0"/>
+          <a:chExt cx="0" cy="0"/>
+        </a:xfrm>
+      </p:grpSpPr>
+      <p:sp>
+        <p:nvSpPr>
+          <p:cNvPr id="7" name="Rectangle 6">
+            <a:extLst>
+              <a:ext uri="{FF2B5EF4-FFF2-40B4-BE49-F238E27FC236}">
+                <a16:creationId xmlns:a16="http://schemas.microsoft.com/office/drawing/2014/main" id="{9F3F54E9-29F0-8601-8487-CDD316AC4833}"/>
+              </a:ext>
+              <a:ext uri="{C183D7F6-B498-43B3-948B-1728B52AA6E4}">
+                <adec:decorative xmlns:adec="http://schemas.microsoft.com/office/drawing/2017/decorative" val="1"/>
+              </a:ext>
+            </a:extLst>
+          </p:cNvPr>
+          <p:cNvSpPr>
+            <a:spLocks noChangeAspect="1"/>
+          </p:cNvSpPr>
+          <p:nvPr>
+            <p:extLst>
+              <p:ext uri="{386F3935-93C4-4BCD-93E2-E3B085C9AB24}">
+                <p16:designElem xmlns:p16="http://schemas.microsoft.com/office/powerpoint/2015/main" val="1"/>
+              </p:ext>
+            </p:extLst>
+          </p:nvPr>
+        </p:nvSpPr>
+        <p:spPr>
+          <a:xfrm>
+            <a:off x="3740383" y="0"/>
+            <a:ext cx="8451607" cy="6858001"/>
+          </a:xfrm>
+          <a:prstGeom prst="rect">
+            <a:avLst/>
+          </a:prstGeom>
+          <a:solidFill>
+            <a:schemeClr val="bg1">
+              <a:lumMod val="95000"/>
+            </a:schemeClr>
+          </a:solidFill>
+          <a:ln>
+            <a:noFill/>
+          </a:ln>
+        </p:spPr>
+        <p:style>
+          <a:lnRef idx="2">
+            <a:schemeClr val="accent1">
+              <a:shade val="50000"/>
+            </a:schemeClr>
+          </a:lnRef>
+          <a:fillRef idx="1">
+            <a:schemeClr val="accent1"/>
+          </a:fillRef>
+          <a:effectRef idx="0">
+            <a:schemeClr val="accent1"/>
+          </a:effectRef>
+          <a:fontRef idx="minor">
+            <a:schemeClr val="lt1"/>
+          </a:fontRef>
+        </p:style>
+        <p:txBody>
+          <a:bodyPr rtlCol="0" anchor="ctr"/>
+          <a:lstStyle/>
+          <a:p>
+            <a:pPr algn="ctr"/>
+            <a:endParaRPr lang="en-US"/>
+          </a:p>
+        </p:txBody>
+      </p:sp>
+      <p:sp>
+        <p:nvSpPr>
+          <p:cNvPr id="8" name="Rectangle 7">
+            <a:extLst>
+              <a:ext uri="{FF2B5EF4-FFF2-40B4-BE49-F238E27FC236}">
+                <a16:creationId xmlns:a16="http://schemas.microsoft.com/office/drawing/2014/main" id="{19548216-06A4-D789-72B9-F7611D587A9E}"/>
+              </a:ext>
+              <a:ext uri="{C183D7F6-B498-43B3-948B-1728B52AA6E4}">
+                <adec:decorative xmlns:adec="http://schemas.microsoft.com/office/drawing/2017/decorative" val="1"/>
+              </a:ext>
+            </a:extLst>
+          </p:cNvPr>
+          <p:cNvSpPr>
+            <a:spLocks noChangeAspect="1"/>
+          </p:cNvSpPr>
+          <p:nvPr>
+            <p:extLst>
+              <p:ext uri="{386F3935-93C4-4BCD-93E2-E3B085C9AB24}">
+                <p16:designElem xmlns:p16="http://schemas.microsoft.com/office/powerpoint/2015/main" val="1"/>
+              </p:ext>
+            </p:extLst>
+          </p:nvPr>
+        </p:nvSpPr>
+        <p:spPr>
+          <a:xfrm>
+            <a:off x="10" y="0"/>
+            <a:ext cx="3745177" cy="6858001"/>
+          </a:xfrm>
+          <a:prstGeom prst="rect">
+            <a:avLst/>
+          </a:prstGeom>
+          <a:solidFill>
+            <a:schemeClr val="tx1">
+              <a:lumMod val="85000"/>
+              <a:lumOff val="15000"/>
+            </a:schemeClr>
+          </a:solidFill>
+          <a:ln>
+            <a:noFill/>
+          </a:ln>
+        </p:spPr>
+        <p:style>
+          <a:lnRef idx="2">
+            <a:schemeClr val="accent1">
+              <a:shade val="50000"/>
+            </a:schemeClr>
+          </a:lnRef>
+          <a:fillRef idx="1">
+            <a:schemeClr val="accent1"/>
+          </a:fillRef>
+          <a:effectRef idx="0">
+            <a:schemeClr val="accent1"/>
+          </a:effectRef>
+          <a:fontRef idx="minor">
+            <a:schemeClr val="lt1"/>
+          </a:fontRef>
+        </p:style>
+        <p:txBody>
+          <a:bodyPr rtlCol="0" anchor="ctr"/>
+          <a:lstStyle/>
+          <a:p>
+            <a:pPr algn="ctr"/>
+            <a:endParaRPr lang="en-US"/>
+          </a:p>
+        </p:txBody>
+      </p:sp>
+      <p:sp>
+        <p:nvSpPr>
+          <p:cNvPr id="2" name="Title 1">
+            <a:extLst>
+              <a:ext uri="{FF2B5EF4-FFF2-40B4-BE49-F238E27FC236}">
+                <a16:creationId xmlns:a16="http://schemas.microsoft.com/office/drawing/2014/main" id="{641BD0F0-C3AB-7696-E27E-FDC1C4921089}"/>
+              </a:ext>
+            </a:extLst>
+          </p:cNvPr>
+          <p:cNvSpPr>
+            <a:spLocks noGrp="1"/>
+          </p:cNvSpPr>
+          <p:nvPr>
+            <p:ph type="title"/>
+          </p:nvPr>
+        </p:nvSpPr>
+        <p:spPr>
+          <a:xfrm>
+            <a:off x="7807" y="637934"/>
+            <a:ext cx="3745179" cy="4716967"/>
+          </a:xfrm>
+        </p:spPr>
+        <p:txBody>
+          <a:bodyPr vert="horz" lIns="91440" tIns="45720" rIns="91440" bIns="45720" rtlCol="0" anchor="t">
+            <a:normAutofit/>
+          </a:bodyPr>
+          <a:lstStyle/>
+          <a:p>
+            <a:pPr algn="ctr"/>
+            <a:r>
+              <a:rPr lang="en-US" kern="1200" dirty="0">
+                <a:solidFill>
+                  <a:srgbClr val="FFFFFF"/>
+                </a:solidFill>
+                <a:latin typeface="+mj-lt"/>
+                <a:ea typeface="+mj-ea"/>
+                <a:cs typeface="+mj-cs"/>
+              </a:rPr>
+              <a:t>Requirements</a:t>
+            </a:r>
+          </a:p>
+        </p:txBody>
+      </p:sp>
+      <p:sp>
+        <p:nvSpPr>
+          <p:cNvPr id="3" name="Content Placeholder 2">
+            <a:extLst>
+              <a:ext uri="{FF2B5EF4-FFF2-40B4-BE49-F238E27FC236}">
+                <a16:creationId xmlns:a16="http://schemas.microsoft.com/office/drawing/2014/main" id="{7A936E0D-8183-1845-65D7-5F9FB4EBA5DA}"/>
+              </a:ext>
+            </a:extLst>
+          </p:cNvPr>
+          <p:cNvSpPr>
+            <a:spLocks noGrp="1"/>
+          </p:cNvSpPr>
+          <p:nvPr>
+            <p:ph idx="1"/>
+          </p:nvPr>
+        </p:nvSpPr>
+        <p:spPr>
+          <a:xfrm>
+            <a:off x="3760784" y="637934"/>
+            <a:ext cx="4148138" cy="5841693"/>
+          </a:xfrm>
+        </p:spPr>
+        <p:txBody>
+          <a:bodyPr vert="horz" lIns="91440" tIns="45720" rIns="91440" bIns="45720" rtlCol="0">
+            <a:normAutofit/>
+          </a:bodyPr>
+          <a:lstStyle/>
+          <a:p>
+            <a:pPr marL="0" indent="0">
+              <a:buNone/>
+            </a:pPr>
+            <a:r>
+              <a:rPr lang="en-US" sz="4400" dirty="0"/>
+              <a:t>Python</a:t>
+            </a:r>
+          </a:p>
+          <a:p>
+            <a:r>
+              <a:rPr lang="en-US" dirty="0"/>
+              <a:t>Download python from</a:t>
+            </a:r>
+          </a:p>
+          <a:p>
+            <a:r>
+              <a:rPr lang="en-US" sz="2800" dirty="0">
+                <a:hlinkClick r:id="rId2"/>
+              </a:rPr>
+              <a:t>https://www.python.org/downloads/</a:t>
+            </a:r>
+            <a:endParaRPr lang="en-US" sz="2800" dirty="0"/>
+          </a:p>
+          <a:p>
+            <a:r>
+              <a:rPr lang="en-US" dirty="0"/>
+              <a:t>Run the installer:</a:t>
+            </a:r>
+          </a:p>
+          <a:p>
+            <a:pPr lvl="1"/>
+            <a:r>
+              <a:rPr lang="en-US" sz="2800" dirty="0"/>
+              <a:t>Windows: Ensure “Add Python to Path” is checked when installing</a:t>
+            </a:r>
+          </a:p>
+        </p:txBody>
+      </p:sp>
+      <p:cxnSp>
+        <p:nvCxnSpPr>
+          <p:cNvPr id="53" name="Straight Connector 52">
+            <a:extLst>
+              <a:ext uri="{FF2B5EF4-FFF2-40B4-BE49-F238E27FC236}">
+                <a16:creationId xmlns:a16="http://schemas.microsoft.com/office/drawing/2014/main" id="{1F16A8D4-FE87-4604-88B2-394B5D1EB437}"/>
+              </a:ext>
+              <a:ext uri="{C183D7F6-B498-43B3-948B-1728B52AA6E4}">
+                <adec:decorative xmlns:adec="http://schemas.microsoft.com/office/drawing/2017/decorative" val="1"/>
+              </a:ext>
+            </a:extLst>
+          </p:cNvPr>
+          <p:cNvCxnSpPr>
+            <a:cxnSpLocks noGrp="1" noRot="1" noChangeAspect="1" noMove="1" noResize="1" noEditPoints="1" noAdjustHandles="1" noChangeArrowheads="1" noChangeShapeType="1"/>
+          </p:cNvCxnSpPr>
+          <p:nvPr>
+            <p:extLst>
+              <p:ext uri="{386F3935-93C4-4BCD-93E2-E3B085C9AB24}">
+                <p16:designElem xmlns:p16="http://schemas.microsoft.com/office/powerpoint/2015/main" val="1"/>
+              </p:ext>
+            </p:extLst>
+          </p:nvPr>
+        </p:nvCxnSpPr>
+        <p:spPr>
+          <a:xfrm>
+            <a:off x="8129871" y="1412488"/>
+            <a:ext cx="0" cy="3657600"/>
+          </a:xfrm>
+          <a:prstGeom prst="line">
+            <a:avLst/>
+          </a:prstGeom>
+          <a:ln w="12700">
+            <a:solidFill>
+              <a:schemeClr val="tx1">
+                <a:lumMod val="50000"/>
+                <a:lumOff val="50000"/>
+              </a:schemeClr>
+            </a:solidFill>
+          </a:ln>
+        </p:spPr>
+        <p:style>
+          <a:lnRef idx="1">
+            <a:schemeClr val="accent1"/>
+          </a:lnRef>
+          <a:fillRef idx="0">
+            <a:schemeClr val="accent1"/>
+          </a:fillRef>
+          <a:effectRef idx="0">
+            <a:schemeClr val="accent1"/>
+          </a:effectRef>
+          <a:fontRef idx="minor">
+            <a:schemeClr val="tx1"/>
+          </a:fontRef>
+        </p:style>
+      </p:cxnSp>
+      <p:sp>
+        <p:nvSpPr>
+          <p:cNvPr id="6" name="TextBox 5">
+            <a:extLst>
+              <a:ext uri="{FF2B5EF4-FFF2-40B4-BE49-F238E27FC236}">
+                <a16:creationId xmlns:a16="http://schemas.microsoft.com/office/drawing/2014/main" id="{1812826B-1893-1DE5-C17A-FB0D3B6D85F9}"/>
+              </a:ext>
+            </a:extLst>
+          </p:cNvPr>
+          <p:cNvSpPr txBox="1"/>
+          <p:nvPr/>
+        </p:nvSpPr>
+        <p:spPr>
+          <a:xfrm>
+            <a:off x="8451605" y="637935"/>
+            <a:ext cx="3197701" cy="5832336"/>
+          </a:xfrm>
+          <a:prstGeom prst="rect">
+            <a:avLst/>
+          </a:prstGeom>
+        </p:spPr>
+        <p:txBody>
+          <a:bodyPr vert="horz" lIns="91440" tIns="45720" rIns="91440" bIns="45720" rtlCol="0">
+            <a:noAutofit/>
+          </a:bodyPr>
+          <a:lstStyle/>
+          <a:p>
+            <a:pPr>
+              <a:lnSpc>
+                <a:spcPct val="90000"/>
+              </a:lnSpc>
+              <a:spcAft>
+                <a:spcPts val="600"/>
+              </a:spcAft>
+            </a:pPr>
+            <a:r>
+              <a:rPr lang="en-US" sz="2800" dirty="0"/>
+              <a:t>A plain text editor and a shell environment</a:t>
+            </a:r>
+          </a:p>
+          <a:p>
+            <a:pPr indent="-228600">
+              <a:lnSpc>
+                <a:spcPct val="90000"/>
+              </a:lnSpc>
+              <a:spcAft>
+                <a:spcPts val="600"/>
+              </a:spcAft>
+              <a:buFont typeface="Arial" panose="020B0604020202020204" pitchFamily="34" charset="0"/>
+              <a:buChar char="•"/>
+            </a:pPr>
+            <a:endParaRPr lang="en-US" sz="2800" dirty="0"/>
+          </a:p>
+          <a:p>
+            <a:pPr>
+              <a:lnSpc>
+                <a:spcPct val="90000"/>
+              </a:lnSpc>
+              <a:spcAft>
+                <a:spcPts val="600"/>
+              </a:spcAft>
+            </a:pPr>
+            <a:r>
+              <a:rPr lang="en-US" sz="2800" dirty="0"/>
+              <a:t>-or-</a:t>
+            </a:r>
+          </a:p>
+          <a:p>
+            <a:pPr indent="-228600">
+              <a:lnSpc>
+                <a:spcPct val="90000"/>
+              </a:lnSpc>
+              <a:spcAft>
+                <a:spcPts val="600"/>
+              </a:spcAft>
+              <a:buFont typeface="Arial" panose="020B0604020202020204" pitchFamily="34" charset="0"/>
+              <a:buChar char="•"/>
+            </a:pPr>
+            <a:endParaRPr lang="en-US" sz="2800" dirty="0"/>
+          </a:p>
+          <a:p>
+            <a:pPr>
+              <a:lnSpc>
+                <a:spcPct val="90000"/>
+              </a:lnSpc>
+              <a:spcAft>
+                <a:spcPts val="600"/>
+              </a:spcAft>
+            </a:pPr>
+            <a:r>
+              <a:rPr lang="en-US" sz="2800" dirty="0"/>
+              <a:t>An Integrated Development Environment (IDE)</a:t>
+            </a:r>
+          </a:p>
+          <a:p>
+            <a:pPr marL="285750" indent="-228600">
+              <a:lnSpc>
+                <a:spcPct val="90000"/>
+              </a:lnSpc>
+              <a:spcAft>
+                <a:spcPts val="600"/>
+              </a:spcAft>
+              <a:buFont typeface="Arial" panose="020B0604020202020204" pitchFamily="34" charset="0"/>
+              <a:buChar char="•"/>
+            </a:pPr>
+            <a:r>
+              <a:rPr lang="en-US" sz="2800" dirty="0"/>
+              <a:t>VS Code</a:t>
+            </a:r>
+          </a:p>
+          <a:p>
+            <a:pPr marL="285750" indent="-228600">
+              <a:lnSpc>
+                <a:spcPct val="90000"/>
+              </a:lnSpc>
+              <a:spcAft>
+                <a:spcPts val="600"/>
+              </a:spcAft>
+              <a:buFont typeface="Arial" panose="020B0604020202020204" pitchFamily="34" charset="0"/>
+              <a:buChar char="•"/>
+            </a:pPr>
+            <a:r>
+              <a:rPr lang="en-US" sz="2800" dirty="0"/>
+              <a:t>Etc..</a:t>
+            </a:r>
+          </a:p>
+        </p:txBody>
+      </p:sp>
+    </p:spTree>
+    <p:extLst>
+      <p:ext uri="{BB962C8B-B14F-4D97-AF65-F5344CB8AC3E}">
+        <p14:creationId xmlns:p14="http://schemas.microsoft.com/office/powerpoint/2010/main" val="1369342629"/>
+      </p:ext>
+    </p:extLst>
+  </p:cSld>
+  <p:clrMapOvr>
+    <a:masterClrMapping/>
+  </p:clrMapOvr>
+</p:sld>
+</file>
+
+<file path=ppt/slides/slide30.xml><?xml version="1.0" encoding="utf-8"?>
 <p:sld xmlns:a="http://schemas.openxmlformats.org/drawingml/2006/main" xmlns:r="http://schemas.openxmlformats.org/officeDocument/2006/relationships" xmlns:p="http://schemas.openxmlformats.org/presentationml/2006/main">
   <p:cSld>
     <p:bg>
@@ -12689,357 +13243,7 @@
 </p:sld>
 </file>
 
-<file path=ppt/slides/slide3.xml><?xml version="1.0" encoding="utf-8"?>
-<p:sld xmlns:a="http://schemas.openxmlformats.org/drawingml/2006/main" xmlns:r="http://schemas.openxmlformats.org/officeDocument/2006/relationships" xmlns:p="http://schemas.openxmlformats.org/presentationml/2006/main">
-  <p:cSld>
-    <p:bg>
-      <p:bgPr>
-        <a:solidFill>
-          <a:schemeClr val="bg1"/>
-        </a:solidFill>
-        <a:effectLst/>
-      </p:bgPr>
-    </p:bg>
-    <p:spTree>
-      <p:nvGrpSpPr>
-        <p:cNvPr id="1" name="">
-          <a:extLst>
-            <a:ext uri="{FF2B5EF4-FFF2-40B4-BE49-F238E27FC236}">
-              <a16:creationId xmlns:a16="http://schemas.microsoft.com/office/drawing/2014/main" id="{951C245A-E817-470A-5314-B27D505F1E9A}"/>
-            </a:ext>
-          </a:extLst>
-        </p:cNvPr>
-        <p:cNvGrpSpPr/>
-        <p:nvPr/>
-      </p:nvGrpSpPr>
-      <p:grpSpPr>
-        <a:xfrm>
-          <a:off x="0" y="0"/>
-          <a:ext cx="0" cy="0"/>
-          <a:chOff x="0" y="0"/>
-          <a:chExt cx="0" cy="0"/>
-        </a:xfrm>
-      </p:grpSpPr>
-      <p:sp>
-        <p:nvSpPr>
-          <p:cNvPr id="17" name="Rectangle 16">
-            <a:extLst>
-              <a:ext uri="{FF2B5EF4-FFF2-40B4-BE49-F238E27FC236}">
-                <a16:creationId xmlns:a16="http://schemas.microsoft.com/office/drawing/2014/main" id="{CD450132-CCCD-F33A-5421-80CBDA9B9903}"/>
-              </a:ext>
-              <a:ext uri="{C183D7F6-B498-43B3-948B-1728B52AA6E4}">
-                <adec:decorative xmlns:adec="http://schemas.microsoft.com/office/drawing/2017/decorative" val="1"/>
-              </a:ext>
-            </a:extLst>
-          </p:cNvPr>
-          <p:cNvSpPr>
-            <a:spLocks noGrp="1" noRot="1" noChangeAspect="1" noMove="1" noResize="1" noEditPoints="1" noAdjustHandles="1" noChangeArrowheads="1" noChangeShapeType="1" noTextEdit="1"/>
-          </p:cNvSpPr>
-          <p:nvPr>
-            <p:extLst>
-              <p:ext uri="{386F3935-93C4-4BCD-93E2-E3B085C9AB24}">
-                <p16:designElem xmlns:p16="http://schemas.microsoft.com/office/powerpoint/2015/main" val="1"/>
-              </p:ext>
-            </p:extLst>
-          </p:nvPr>
-        </p:nvSpPr>
-        <p:spPr>
-          <a:xfrm>
-            <a:off x="3740383" y="0"/>
-            <a:ext cx="8451607" cy="6858001"/>
-          </a:xfrm>
-          <a:prstGeom prst="rect">
-            <a:avLst/>
-          </a:prstGeom>
-          <a:solidFill>
-            <a:schemeClr val="bg1">
-              <a:lumMod val="95000"/>
-            </a:schemeClr>
-          </a:solidFill>
-          <a:ln>
-            <a:noFill/>
-          </a:ln>
-        </p:spPr>
-        <p:style>
-          <a:lnRef idx="2">
-            <a:schemeClr val="accent1">
-              <a:shade val="50000"/>
-            </a:schemeClr>
-          </a:lnRef>
-          <a:fillRef idx="1">
-            <a:schemeClr val="accent1"/>
-          </a:fillRef>
-          <a:effectRef idx="0">
-            <a:schemeClr val="accent1"/>
-          </a:effectRef>
-          <a:fontRef idx="minor">
-            <a:schemeClr val="lt1"/>
-          </a:fontRef>
-        </p:style>
-        <p:txBody>
-          <a:bodyPr rtlCol="0" anchor="ctr"/>
-          <a:lstStyle/>
-          <a:p>
-            <a:pPr algn="ctr"/>
-            <a:endParaRPr lang="en-US"/>
-          </a:p>
-        </p:txBody>
-      </p:sp>
-      <p:sp>
-        <p:nvSpPr>
-          <p:cNvPr id="19" name="Rectangle 18">
-            <a:extLst>
-              <a:ext uri="{FF2B5EF4-FFF2-40B4-BE49-F238E27FC236}">
-                <a16:creationId xmlns:a16="http://schemas.microsoft.com/office/drawing/2014/main" id="{04923298-063D-35D5-6E85-146C128D035D}"/>
-              </a:ext>
-              <a:ext uri="{C183D7F6-B498-43B3-948B-1728B52AA6E4}">
-                <adec:decorative xmlns:adec="http://schemas.microsoft.com/office/drawing/2017/decorative" val="1"/>
-              </a:ext>
-            </a:extLst>
-          </p:cNvPr>
-          <p:cNvSpPr>
-            <a:spLocks noGrp="1" noRot="1" noChangeAspect="1" noMove="1" noResize="1" noEditPoints="1" noAdjustHandles="1" noChangeArrowheads="1" noChangeShapeType="1" noTextEdit="1"/>
-          </p:cNvSpPr>
-          <p:nvPr>
-            <p:extLst>
-              <p:ext uri="{386F3935-93C4-4BCD-93E2-E3B085C9AB24}">
-                <p16:designElem xmlns:p16="http://schemas.microsoft.com/office/powerpoint/2015/main" val="1"/>
-              </p:ext>
-            </p:extLst>
-          </p:nvPr>
-        </p:nvSpPr>
-        <p:spPr>
-          <a:xfrm>
-            <a:off x="10" y="0"/>
-            <a:ext cx="3745177" cy="6858001"/>
-          </a:xfrm>
-          <a:prstGeom prst="rect">
-            <a:avLst/>
-          </a:prstGeom>
-          <a:solidFill>
-            <a:schemeClr val="tx1">
-              <a:lumMod val="85000"/>
-              <a:lumOff val="15000"/>
-            </a:schemeClr>
-          </a:solidFill>
-          <a:ln>
-            <a:noFill/>
-          </a:ln>
-        </p:spPr>
-        <p:style>
-          <a:lnRef idx="2">
-            <a:schemeClr val="accent1">
-              <a:shade val="50000"/>
-            </a:schemeClr>
-          </a:lnRef>
-          <a:fillRef idx="1">
-            <a:schemeClr val="accent1"/>
-          </a:fillRef>
-          <a:effectRef idx="0">
-            <a:schemeClr val="accent1"/>
-          </a:effectRef>
-          <a:fontRef idx="minor">
-            <a:schemeClr val="lt1"/>
-          </a:fontRef>
-        </p:style>
-        <p:txBody>
-          <a:bodyPr rtlCol="0" anchor="ctr"/>
-          <a:lstStyle/>
-          <a:p>
-            <a:pPr algn="ctr"/>
-            <a:endParaRPr lang="en-US"/>
-          </a:p>
-        </p:txBody>
-      </p:sp>
-      <p:sp>
-        <p:nvSpPr>
-          <p:cNvPr id="2" name="Title 1">
-            <a:extLst>
-              <a:ext uri="{FF2B5EF4-FFF2-40B4-BE49-F238E27FC236}">
-                <a16:creationId xmlns:a16="http://schemas.microsoft.com/office/drawing/2014/main" id="{C7AA33C0-7992-0BE3-11C6-7751899023C0}"/>
-              </a:ext>
-            </a:extLst>
-          </p:cNvPr>
-          <p:cNvSpPr>
-            <a:spLocks noGrp="1"/>
-          </p:cNvSpPr>
-          <p:nvPr>
-            <p:ph type="title"/>
-          </p:nvPr>
-        </p:nvSpPr>
-        <p:spPr>
-          <a:xfrm>
-            <a:off x="1" y="637762"/>
-            <a:ext cx="3740382" cy="5576770"/>
-          </a:xfrm>
-        </p:spPr>
-        <p:txBody>
-          <a:bodyPr anchor="t">
-            <a:normAutofit/>
-          </a:bodyPr>
-          <a:lstStyle/>
-          <a:p>
-            <a:pPr algn="ctr"/>
-            <a:r>
-              <a:rPr lang="en-US" sz="3600" dirty="0">
-                <a:solidFill>
-                  <a:schemeClr val="bg1"/>
-                </a:solidFill>
-              </a:rPr>
-              <a:t>Set Up</a:t>
-            </a:r>
-          </a:p>
-        </p:txBody>
-      </p:sp>
-      <p:sp>
-        <p:nvSpPr>
-          <p:cNvPr id="3" name="Content Placeholder 2">
-            <a:extLst>
-              <a:ext uri="{FF2B5EF4-FFF2-40B4-BE49-F238E27FC236}">
-                <a16:creationId xmlns:a16="http://schemas.microsoft.com/office/drawing/2014/main" id="{E116E414-9A84-47B1-B753-37EA56CDEFA6}"/>
-              </a:ext>
-            </a:extLst>
-          </p:cNvPr>
-          <p:cNvSpPr>
-            <a:spLocks noGrp="1"/>
-          </p:cNvSpPr>
-          <p:nvPr>
-            <p:ph idx="1"/>
-          </p:nvPr>
-        </p:nvSpPr>
-        <p:spPr>
-          <a:xfrm>
-            <a:off x="3740384" y="637762"/>
-            <a:ext cx="8311708" cy="5539201"/>
-          </a:xfrm>
-        </p:spPr>
-        <p:txBody>
-          <a:bodyPr>
-            <a:normAutofit/>
-          </a:bodyPr>
-          <a:lstStyle/>
-          <a:p>
-            <a:pPr marL="0" indent="0">
-              <a:buNone/>
-            </a:pPr>
-            <a:r>
-              <a:rPr lang="en-US" dirty="0"/>
-              <a:t>Download or clone repository from</a:t>
-            </a:r>
-          </a:p>
-          <a:p>
-            <a:pPr marL="0" indent="0">
-              <a:buNone/>
-            </a:pPr>
-            <a:r>
-              <a:rPr lang="en-US" dirty="0"/>
-              <a:t>https://www.github.com/JakobieBrown/PygameIntro</a:t>
-            </a:r>
-          </a:p>
-          <a:p>
-            <a:pPr marL="0" indent="0">
-              <a:buNone/>
-            </a:pPr>
-            <a:r>
-              <a:rPr lang="en-US" dirty="0"/>
-              <a:t>(link in discord)</a:t>
-            </a:r>
-          </a:p>
-          <a:p>
-            <a:pPr marL="0" indent="0">
-              <a:buNone/>
-            </a:pPr>
-            <a:r>
-              <a:rPr lang="en-US" dirty="0"/>
-              <a:t>Open the directory in a terminal or IDE</a:t>
-            </a:r>
-          </a:p>
-          <a:p>
-            <a:pPr marL="0" indent="0">
-              <a:buNone/>
-            </a:pPr>
-            <a:endParaRPr lang="en-US" dirty="0"/>
-          </a:p>
-          <a:p>
-            <a:pPr marL="0" indent="0">
-              <a:buNone/>
-            </a:pPr>
-            <a:r>
-              <a:rPr lang="en-US" dirty="0"/>
-              <a:t>Install </a:t>
-            </a:r>
-            <a:r>
-              <a:rPr lang="en-US" dirty="0" err="1"/>
-              <a:t>pygame</a:t>
-            </a:r>
-            <a:r>
-              <a:rPr lang="en-US" dirty="0"/>
-              <a:t>. </a:t>
-            </a:r>
-          </a:p>
-          <a:p>
-            <a:pPr marL="0" indent="0">
-              <a:buNone/>
-            </a:pPr>
-            <a:r>
-              <a:rPr lang="en-US" dirty="0"/>
-              <a:t>In your terminal type:</a:t>
-            </a:r>
-          </a:p>
-          <a:p>
-            <a:pPr marL="0" indent="0">
-              <a:buNone/>
-            </a:pPr>
-            <a:r>
-              <a:rPr lang="en-US" dirty="0"/>
-              <a:t>	pip install </a:t>
-            </a:r>
-            <a:r>
-              <a:rPr lang="en-US" dirty="0" err="1"/>
-              <a:t>pygame</a:t>
-            </a:r>
-            <a:endParaRPr lang="en-US" dirty="0"/>
-          </a:p>
-          <a:p>
-            <a:pPr marL="0" indent="0">
-              <a:buNone/>
-            </a:pPr>
-            <a:endParaRPr lang="en-US" dirty="0"/>
-          </a:p>
-          <a:p>
-            <a:pPr marL="0" indent="0">
-              <a:buNone/>
-            </a:pPr>
-            <a:endParaRPr lang="en-US" dirty="0"/>
-          </a:p>
-          <a:p>
-            <a:pPr marL="0" indent="0">
-              <a:buNone/>
-            </a:pPr>
-            <a:endParaRPr lang="en-US" dirty="0"/>
-          </a:p>
-          <a:p>
-            <a:pPr marL="0" indent="0">
-              <a:buNone/>
-            </a:pPr>
-            <a:endParaRPr lang="en-US" dirty="0"/>
-          </a:p>
-        </p:txBody>
-      </p:sp>
-    </p:spTree>
-    <p:extLst>
-      <p:ext uri="{BB962C8B-B14F-4D97-AF65-F5344CB8AC3E}">
-        <p14:creationId xmlns:p14="http://schemas.microsoft.com/office/powerpoint/2010/main" val="2984204111"/>
-      </p:ext>
-    </p:extLst>
-  </p:cSld>
-  <p:clrMapOvr>
-    <a:masterClrMapping/>
-  </p:clrMapOvr>
-</p:sld>
-</file>
-
-<file path=ppt/slides/slide30.xml><?xml version="1.0" encoding="utf-8"?>
+<file path=ppt/slides/slide31.xml><?xml version="1.0" encoding="utf-8"?>
 <p:sld xmlns:a="http://schemas.openxmlformats.org/drawingml/2006/main" xmlns:r="http://schemas.openxmlformats.org/officeDocument/2006/relationships" xmlns:p="http://schemas.openxmlformats.org/presentationml/2006/main">
   <p:cSld>
     <p:bg>
@@ -13437,7 +13641,7 @@
 </p:sld>
 </file>
 
-<file path=ppt/slides/slide31.xml><?xml version="1.0" encoding="utf-8"?>
+<file path=ppt/slides/slide32.xml><?xml version="1.0" encoding="utf-8"?>
 <p:sld xmlns:a="http://schemas.openxmlformats.org/drawingml/2006/main" xmlns:r="http://schemas.openxmlformats.org/officeDocument/2006/relationships" xmlns:p="http://schemas.openxmlformats.org/presentationml/2006/main">
   <p:cSld>
     <p:bg>
@@ -13724,7 +13928,7 @@
 </p:sld>
 </file>
 
-<file path=ppt/slides/slide32.xml><?xml version="1.0" encoding="utf-8"?>
+<file path=ppt/slides/slide33.xml><?xml version="1.0" encoding="utf-8"?>
 <p:sld xmlns:a="http://schemas.openxmlformats.org/drawingml/2006/main" xmlns:r="http://schemas.openxmlformats.org/officeDocument/2006/relationships" xmlns:p="http://schemas.openxmlformats.org/presentationml/2006/main">
   <p:cSld>
     <p:bg>
@@ -14153,7 +14357,7 @@
 </p:sld>
 </file>
 
-<file path=ppt/slides/slide33.xml><?xml version="1.0" encoding="utf-8"?>
+<file path=ppt/slides/slide34.xml><?xml version="1.0" encoding="utf-8"?>
 <p:sld xmlns:a="http://schemas.openxmlformats.org/drawingml/2006/main" xmlns:r="http://schemas.openxmlformats.org/officeDocument/2006/relationships" xmlns:p="http://schemas.openxmlformats.org/presentationml/2006/main">
   <p:cSld>
     <p:bg>
@@ -14563,7 +14767,7 @@
 </p:sld>
 </file>
 
-<file path=ppt/slides/slide34.xml><?xml version="1.0" encoding="utf-8"?>
+<file path=ppt/slides/slide35.xml><?xml version="1.0" encoding="utf-8"?>
 <p:sld xmlns:a="http://schemas.openxmlformats.org/drawingml/2006/main" xmlns:r="http://schemas.openxmlformats.org/officeDocument/2006/relationships" xmlns:p="http://schemas.openxmlformats.org/presentationml/2006/main">
   <p:cSld>
     <p:bg>
@@ -15015,7 +15219,7 @@
 </p:sld>
 </file>
 
-<file path=ppt/slides/slide35.xml><?xml version="1.0" encoding="utf-8"?>
+<file path=ppt/slides/slide36.xml><?xml version="1.0" encoding="utf-8"?>
 <p:sld xmlns:a="http://schemas.openxmlformats.org/drawingml/2006/main" xmlns:r="http://schemas.openxmlformats.org/officeDocument/2006/relationships" xmlns:p="http://schemas.openxmlformats.org/presentationml/2006/main">
   <p:cSld>
     <p:bg>
@@ -15435,7 +15639,7 @@
 </p:sld>
 </file>
 
-<file path=ppt/slides/slide36.xml><?xml version="1.0" encoding="utf-8"?>
+<file path=ppt/slides/slide37.xml><?xml version="1.0" encoding="utf-8"?>
 <p:sld xmlns:a="http://schemas.openxmlformats.org/drawingml/2006/main" xmlns:r="http://schemas.openxmlformats.org/officeDocument/2006/relationships" xmlns:p="http://schemas.openxmlformats.org/presentationml/2006/main">
   <p:cSld>
     <p:bg>
@@ -15936,7 +16140,13 @@
     </p:bg>
     <p:spTree>
       <p:nvGrpSpPr>
-        <p:cNvPr id="1" name=""/>
+        <p:cNvPr id="1" name="">
+          <a:extLst>
+            <a:ext uri="{FF2B5EF4-FFF2-40B4-BE49-F238E27FC236}">
+              <a16:creationId xmlns:a16="http://schemas.microsoft.com/office/drawing/2014/main" id="{951C245A-E817-470A-5314-B27D505F1E9A}"/>
+            </a:ext>
+          </a:extLst>
+        </p:cNvPr>
         <p:cNvGrpSpPr/>
         <p:nvPr/>
       </p:nvGrpSpPr>
@@ -15953,7 +16163,7 @@
           <p:cNvPr id="17" name="Rectangle 16">
             <a:extLst>
               <a:ext uri="{FF2B5EF4-FFF2-40B4-BE49-F238E27FC236}">
-                <a16:creationId xmlns:a16="http://schemas.microsoft.com/office/drawing/2014/main" id="{B34F5AD2-EDBD-4BBD-A55C-EAFFD0C7097A}"/>
+                <a16:creationId xmlns:a16="http://schemas.microsoft.com/office/drawing/2014/main" id="{CD450132-CCCD-F33A-5421-80CBDA9B9903}"/>
               </a:ext>
               <a:ext uri="{C183D7F6-B498-43B3-948B-1728B52AA6E4}">
                 <adec:decorative xmlns:adec="http://schemas.microsoft.com/office/drawing/2017/decorative" val="1"/>
@@ -16018,7 +16228,7 @@
           <p:cNvPr id="19" name="Rectangle 18">
             <a:extLst>
               <a:ext uri="{FF2B5EF4-FFF2-40B4-BE49-F238E27FC236}">
-                <a16:creationId xmlns:a16="http://schemas.microsoft.com/office/drawing/2014/main" id="{C3896A03-3945-419A-B66B-4EE266EDD152}"/>
+                <a16:creationId xmlns:a16="http://schemas.microsoft.com/office/drawing/2014/main" id="{04923298-063D-35D5-6E85-146C128D035D}"/>
               </a:ext>
               <a:ext uri="{C183D7F6-B498-43B3-948B-1728B52AA6E4}">
                 <adec:decorative xmlns:adec="http://schemas.microsoft.com/office/drawing/2017/decorative" val="1"/>
@@ -16084,6 +16294,356 @@
           <p:cNvPr id="2" name="Title 1">
             <a:extLst>
               <a:ext uri="{FF2B5EF4-FFF2-40B4-BE49-F238E27FC236}">
+                <a16:creationId xmlns:a16="http://schemas.microsoft.com/office/drawing/2014/main" id="{C7AA33C0-7992-0BE3-11C6-7751899023C0}"/>
+              </a:ext>
+            </a:extLst>
+          </p:cNvPr>
+          <p:cNvSpPr>
+            <a:spLocks noGrp="1"/>
+          </p:cNvSpPr>
+          <p:nvPr>
+            <p:ph type="title"/>
+          </p:nvPr>
+        </p:nvSpPr>
+        <p:spPr>
+          <a:xfrm>
+            <a:off x="1" y="637762"/>
+            <a:ext cx="3740382" cy="5576770"/>
+          </a:xfrm>
+        </p:spPr>
+        <p:txBody>
+          <a:bodyPr anchor="t">
+            <a:normAutofit/>
+          </a:bodyPr>
+          <a:lstStyle/>
+          <a:p>
+            <a:pPr algn="ctr"/>
+            <a:r>
+              <a:rPr lang="en-US" sz="3600" dirty="0">
+                <a:solidFill>
+                  <a:schemeClr val="bg1"/>
+                </a:solidFill>
+              </a:rPr>
+              <a:t>Set Up</a:t>
+            </a:r>
+          </a:p>
+        </p:txBody>
+      </p:sp>
+      <p:sp>
+        <p:nvSpPr>
+          <p:cNvPr id="3" name="Content Placeholder 2">
+            <a:extLst>
+              <a:ext uri="{FF2B5EF4-FFF2-40B4-BE49-F238E27FC236}">
+                <a16:creationId xmlns:a16="http://schemas.microsoft.com/office/drawing/2014/main" id="{E116E414-9A84-47B1-B753-37EA56CDEFA6}"/>
+              </a:ext>
+            </a:extLst>
+          </p:cNvPr>
+          <p:cNvSpPr>
+            <a:spLocks noGrp="1"/>
+          </p:cNvSpPr>
+          <p:nvPr>
+            <p:ph idx="1"/>
+          </p:nvPr>
+        </p:nvSpPr>
+        <p:spPr>
+          <a:xfrm>
+            <a:off x="3740384" y="637762"/>
+            <a:ext cx="8311708" cy="5539201"/>
+          </a:xfrm>
+        </p:spPr>
+        <p:txBody>
+          <a:bodyPr>
+            <a:normAutofit/>
+          </a:bodyPr>
+          <a:lstStyle/>
+          <a:p>
+            <a:pPr marL="0" indent="0">
+              <a:buNone/>
+            </a:pPr>
+            <a:r>
+              <a:rPr lang="en-US" dirty="0"/>
+              <a:t>Download or clone repository from</a:t>
+            </a:r>
+          </a:p>
+          <a:p>
+            <a:pPr marL="0" indent="0">
+              <a:buNone/>
+            </a:pPr>
+            <a:r>
+              <a:rPr lang="en-US" dirty="0"/>
+              <a:t>https://www.github.com/JakobieBrown/PygameIntro</a:t>
+            </a:r>
+          </a:p>
+          <a:p>
+            <a:pPr marL="0" indent="0">
+              <a:buNone/>
+            </a:pPr>
+            <a:r>
+              <a:rPr lang="en-US" dirty="0"/>
+              <a:t>(link in discord)</a:t>
+            </a:r>
+          </a:p>
+          <a:p>
+            <a:pPr marL="0" indent="0">
+              <a:buNone/>
+            </a:pPr>
+            <a:endParaRPr lang="en-US" dirty="0"/>
+          </a:p>
+          <a:p>
+            <a:pPr marL="0" indent="0">
+              <a:buNone/>
+            </a:pPr>
+            <a:r>
+              <a:rPr lang="en-US" dirty="0"/>
+              <a:t>Open the directory in a terminal or IDE</a:t>
+            </a:r>
+          </a:p>
+          <a:p>
+            <a:pPr marL="0" indent="0">
+              <a:buNone/>
+            </a:pPr>
+            <a:endParaRPr lang="en-US" dirty="0"/>
+          </a:p>
+          <a:p>
+            <a:pPr marL="0" indent="0">
+              <a:buNone/>
+            </a:pPr>
+            <a:r>
+              <a:rPr lang="en-US" dirty="0"/>
+              <a:t>Install </a:t>
+            </a:r>
+            <a:r>
+              <a:rPr lang="en-US" dirty="0" err="1"/>
+              <a:t>pygame</a:t>
+            </a:r>
+            <a:r>
+              <a:rPr lang="en-US" dirty="0"/>
+              <a:t>. </a:t>
+            </a:r>
+          </a:p>
+          <a:p>
+            <a:pPr marL="0" indent="0">
+              <a:buNone/>
+            </a:pPr>
+            <a:r>
+              <a:rPr lang="en-US" dirty="0"/>
+              <a:t>In your terminal type:</a:t>
+            </a:r>
+          </a:p>
+          <a:p>
+            <a:pPr marL="0" indent="0">
+              <a:buNone/>
+            </a:pPr>
+            <a:r>
+              <a:rPr lang="en-US" dirty="0"/>
+              <a:t>	pip install </a:t>
+            </a:r>
+            <a:r>
+              <a:rPr lang="en-US" dirty="0" err="1"/>
+              <a:t>pygame</a:t>
+            </a:r>
+            <a:endParaRPr lang="en-US" dirty="0"/>
+          </a:p>
+          <a:p>
+            <a:pPr marL="0" indent="0">
+              <a:buNone/>
+            </a:pPr>
+            <a:endParaRPr lang="en-US" dirty="0"/>
+          </a:p>
+          <a:p>
+            <a:pPr marL="0" indent="0">
+              <a:buNone/>
+            </a:pPr>
+            <a:endParaRPr lang="en-US" dirty="0"/>
+          </a:p>
+          <a:p>
+            <a:pPr marL="0" indent="0">
+              <a:buNone/>
+            </a:pPr>
+            <a:endParaRPr lang="en-US" dirty="0"/>
+          </a:p>
+          <a:p>
+            <a:pPr marL="0" indent="0">
+              <a:buNone/>
+            </a:pPr>
+            <a:endParaRPr lang="en-US" dirty="0"/>
+          </a:p>
+        </p:txBody>
+      </p:sp>
+    </p:spTree>
+    <p:extLst>
+      <p:ext uri="{BB962C8B-B14F-4D97-AF65-F5344CB8AC3E}">
+        <p14:creationId xmlns:p14="http://schemas.microsoft.com/office/powerpoint/2010/main" val="2984204111"/>
+      </p:ext>
+    </p:extLst>
+  </p:cSld>
+  <p:clrMapOvr>
+    <a:masterClrMapping/>
+  </p:clrMapOvr>
+</p:sld>
+</file>
+
+<file path=ppt/slides/slide5.xml><?xml version="1.0" encoding="utf-8"?>
+<p:sld xmlns:a="http://schemas.openxmlformats.org/drawingml/2006/main" xmlns:r="http://schemas.openxmlformats.org/officeDocument/2006/relationships" xmlns:p="http://schemas.openxmlformats.org/presentationml/2006/main">
+  <p:cSld>
+    <p:bg>
+      <p:bgPr>
+        <a:solidFill>
+          <a:schemeClr val="bg1"/>
+        </a:solidFill>
+        <a:effectLst/>
+      </p:bgPr>
+    </p:bg>
+    <p:spTree>
+      <p:nvGrpSpPr>
+        <p:cNvPr id="1" name=""/>
+        <p:cNvGrpSpPr/>
+        <p:nvPr/>
+      </p:nvGrpSpPr>
+      <p:grpSpPr>
+        <a:xfrm>
+          <a:off x="0" y="0"/>
+          <a:ext cx="0" cy="0"/>
+          <a:chOff x="0" y="0"/>
+          <a:chExt cx="0" cy="0"/>
+        </a:xfrm>
+      </p:grpSpPr>
+      <p:sp>
+        <p:nvSpPr>
+          <p:cNvPr id="17" name="Rectangle 16">
+            <a:extLst>
+              <a:ext uri="{FF2B5EF4-FFF2-40B4-BE49-F238E27FC236}">
+                <a16:creationId xmlns:a16="http://schemas.microsoft.com/office/drawing/2014/main" id="{B34F5AD2-EDBD-4BBD-A55C-EAFFD0C7097A}"/>
+              </a:ext>
+              <a:ext uri="{C183D7F6-B498-43B3-948B-1728B52AA6E4}">
+                <adec:decorative xmlns:adec="http://schemas.microsoft.com/office/drawing/2017/decorative" val="1"/>
+              </a:ext>
+            </a:extLst>
+          </p:cNvPr>
+          <p:cNvSpPr>
+            <a:spLocks noGrp="1" noRot="1" noChangeAspect="1" noMove="1" noResize="1" noEditPoints="1" noAdjustHandles="1" noChangeArrowheads="1" noChangeShapeType="1" noTextEdit="1"/>
+          </p:cNvSpPr>
+          <p:nvPr>
+            <p:extLst>
+              <p:ext uri="{386F3935-93C4-4BCD-93E2-E3B085C9AB24}">
+                <p16:designElem xmlns:p16="http://schemas.microsoft.com/office/powerpoint/2015/main" val="1"/>
+              </p:ext>
+            </p:extLst>
+          </p:nvPr>
+        </p:nvSpPr>
+        <p:spPr>
+          <a:xfrm>
+            <a:off x="3740383" y="0"/>
+            <a:ext cx="8451607" cy="6858001"/>
+          </a:xfrm>
+          <a:prstGeom prst="rect">
+            <a:avLst/>
+          </a:prstGeom>
+          <a:solidFill>
+            <a:schemeClr val="bg1">
+              <a:lumMod val="95000"/>
+            </a:schemeClr>
+          </a:solidFill>
+          <a:ln>
+            <a:noFill/>
+          </a:ln>
+        </p:spPr>
+        <p:style>
+          <a:lnRef idx="2">
+            <a:schemeClr val="accent1">
+              <a:shade val="50000"/>
+            </a:schemeClr>
+          </a:lnRef>
+          <a:fillRef idx="1">
+            <a:schemeClr val="accent1"/>
+          </a:fillRef>
+          <a:effectRef idx="0">
+            <a:schemeClr val="accent1"/>
+          </a:effectRef>
+          <a:fontRef idx="minor">
+            <a:schemeClr val="lt1"/>
+          </a:fontRef>
+        </p:style>
+        <p:txBody>
+          <a:bodyPr rtlCol="0" anchor="ctr"/>
+          <a:lstStyle/>
+          <a:p>
+            <a:pPr algn="ctr"/>
+            <a:endParaRPr lang="en-US"/>
+          </a:p>
+        </p:txBody>
+      </p:sp>
+      <p:sp>
+        <p:nvSpPr>
+          <p:cNvPr id="19" name="Rectangle 18">
+            <a:extLst>
+              <a:ext uri="{FF2B5EF4-FFF2-40B4-BE49-F238E27FC236}">
+                <a16:creationId xmlns:a16="http://schemas.microsoft.com/office/drawing/2014/main" id="{C3896A03-3945-419A-B66B-4EE266EDD152}"/>
+              </a:ext>
+              <a:ext uri="{C183D7F6-B498-43B3-948B-1728B52AA6E4}">
+                <adec:decorative xmlns:adec="http://schemas.microsoft.com/office/drawing/2017/decorative" val="1"/>
+              </a:ext>
+            </a:extLst>
+          </p:cNvPr>
+          <p:cNvSpPr>
+            <a:spLocks noGrp="1" noRot="1" noChangeAspect="1" noMove="1" noResize="1" noEditPoints="1" noAdjustHandles="1" noChangeArrowheads="1" noChangeShapeType="1" noTextEdit="1"/>
+          </p:cNvSpPr>
+          <p:nvPr>
+            <p:extLst>
+              <p:ext uri="{386F3935-93C4-4BCD-93E2-E3B085C9AB24}">
+                <p16:designElem xmlns:p16="http://schemas.microsoft.com/office/powerpoint/2015/main" val="1"/>
+              </p:ext>
+            </p:extLst>
+          </p:nvPr>
+        </p:nvSpPr>
+        <p:spPr>
+          <a:xfrm>
+            <a:off x="10" y="0"/>
+            <a:ext cx="3745177" cy="6858001"/>
+          </a:xfrm>
+          <a:prstGeom prst="rect">
+            <a:avLst/>
+          </a:prstGeom>
+          <a:solidFill>
+            <a:schemeClr val="tx1">
+              <a:lumMod val="85000"/>
+              <a:lumOff val="15000"/>
+            </a:schemeClr>
+          </a:solidFill>
+          <a:ln>
+            <a:noFill/>
+          </a:ln>
+        </p:spPr>
+        <p:style>
+          <a:lnRef idx="2">
+            <a:schemeClr val="accent1">
+              <a:shade val="50000"/>
+            </a:schemeClr>
+          </a:lnRef>
+          <a:fillRef idx="1">
+            <a:schemeClr val="accent1"/>
+          </a:fillRef>
+          <a:effectRef idx="0">
+            <a:schemeClr val="accent1"/>
+          </a:effectRef>
+          <a:fontRef idx="minor">
+            <a:schemeClr val="lt1"/>
+          </a:fontRef>
+        </p:style>
+        <p:txBody>
+          <a:bodyPr rtlCol="0" anchor="ctr"/>
+          <a:lstStyle/>
+          <a:p>
+            <a:pPr algn="ctr"/>
+            <a:endParaRPr lang="en-US"/>
+          </a:p>
+        </p:txBody>
+      </p:sp>
+      <p:sp>
+        <p:nvSpPr>
+          <p:cNvPr id="2" name="Title 1">
+            <a:extLst>
+              <a:ext uri="{FF2B5EF4-FFF2-40B4-BE49-F238E27FC236}">
                 <a16:creationId xmlns:a16="http://schemas.microsoft.com/office/drawing/2014/main" id="{375E7518-DEA1-2DD2-F771-54FA72B7989B}"/>
               </a:ext>
             </a:extLst>
@@ -16272,7 +16832,7 @@
 </p:sld>
 </file>
 
-<file path=ppt/slides/slide5.xml><?xml version="1.0" encoding="utf-8"?>
+<file path=ppt/slides/slide6.xml><?xml version="1.0" encoding="utf-8"?>
 <p:sld xmlns:a="http://schemas.openxmlformats.org/drawingml/2006/main" xmlns:r="http://schemas.openxmlformats.org/officeDocument/2006/relationships" xmlns:p="http://schemas.openxmlformats.org/presentationml/2006/main">
   <p:cSld>
     <p:bg>
@@ -16620,7 +17180,7 @@
 </p:sld>
 </file>
 
-<file path=ppt/slides/slide6.xml><?xml version="1.0" encoding="utf-8"?>
+<file path=ppt/slides/slide7.xml><?xml version="1.0" encoding="utf-8"?>
 <p:sld xmlns:a="http://schemas.openxmlformats.org/drawingml/2006/main" xmlns:r="http://schemas.openxmlformats.org/officeDocument/2006/relationships" xmlns:p="http://schemas.openxmlformats.org/presentationml/2006/main">
   <p:cSld>
     <p:bg>
@@ -17022,7 +17582,7 @@
 </p:sld>
 </file>
 
-<file path=ppt/slides/slide7.xml><?xml version="1.0" encoding="utf-8"?>
+<file path=ppt/slides/slide8.xml><?xml version="1.0" encoding="utf-8"?>
 <p:sld xmlns:a="http://schemas.openxmlformats.org/drawingml/2006/main" xmlns:r="http://schemas.openxmlformats.org/officeDocument/2006/relationships" xmlns:p="http://schemas.openxmlformats.org/presentationml/2006/main">
   <p:cSld>
     <p:bg>
@@ -17349,7 +17909,7 @@
 </p:sld>
 </file>
 
-<file path=ppt/slides/slide8.xml><?xml version="1.0" encoding="utf-8"?>
+<file path=ppt/slides/slide9.xml><?xml version="1.0" encoding="utf-8"?>
 <p:sld xmlns:a="http://schemas.openxmlformats.org/drawingml/2006/main" xmlns:r="http://schemas.openxmlformats.org/officeDocument/2006/relationships" xmlns:p="http://schemas.openxmlformats.org/presentationml/2006/main">
   <p:cSld>
     <p:bg>
@@ -17693,375 +18253,6 @@
     <p:extLst>
       <p:ext uri="{BB962C8B-B14F-4D97-AF65-F5344CB8AC3E}">
         <p14:creationId xmlns:p14="http://schemas.microsoft.com/office/powerpoint/2010/main" val="2911438678"/>
-      </p:ext>
-    </p:extLst>
-  </p:cSld>
-  <p:clrMapOvr>
-    <a:masterClrMapping/>
-  </p:clrMapOvr>
-</p:sld>
-</file>
-
-<file path=ppt/slides/slide9.xml><?xml version="1.0" encoding="utf-8"?>
-<p:sld xmlns:a="http://schemas.openxmlformats.org/drawingml/2006/main" xmlns:r="http://schemas.openxmlformats.org/officeDocument/2006/relationships" xmlns:p="http://schemas.openxmlformats.org/presentationml/2006/main">
-  <p:cSld>
-    <p:bg>
-      <p:bgPr>
-        <a:solidFill>
-          <a:schemeClr val="bg1"/>
-        </a:solidFill>
-        <a:effectLst/>
-      </p:bgPr>
-    </p:bg>
-    <p:spTree>
-      <p:nvGrpSpPr>
-        <p:cNvPr id="1" name="">
-          <a:extLst>
-            <a:ext uri="{FF2B5EF4-FFF2-40B4-BE49-F238E27FC236}">
-              <a16:creationId xmlns:a16="http://schemas.microsoft.com/office/drawing/2014/main" id="{1346CCEB-06CE-A3DC-EED0-AE02035611CB}"/>
-            </a:ext>
-          </a:extLst>
-        </p:cNvPr>
-        <p:cNvGrpSpPr/>
-        <p:nvPr/>
-      </p:nvGrpSpPr>
-      <p:grpSpPr>
-        <a:xfrm>
-          <a:off x="0" y="0"/>
-          <a:ext cx="0" cy="0"/>
-          <a:chOff x="0" y="0"/>
-          <a:chExt cx="0" cy="0"/>
-        </a:xfrm>
-      </p:grpSpPr>
-      <p:sp>
-        <p:nvSpPr>
-          <p:cNvPr id="17" name="Rectangle 16">
-            <a:extLst>
-              <a:ext uri="{FF2B5EF4-FFF2-40B4-BE49-F238E27FC236}">
-                <a16:creationId xmlns:a16="http://schemas.microsoft.com/office/drawing/2014/main" id="{7C27D13A-093F-ECF9-A6F6-58F4923761A7}"/>
-              </a:ext>
-              <a:ext uri="{C183D7F6-B498-43B3-948B-1728B52AA6E4}">
-                <adec:decorative xmlns:adec="http://schemas.microsoft.com/office/drawing/2017/decorative" val="1"/>
-              </a:ext>
-            </a:extLst>
-          </p:cNvPr>
-          <p:cNvSpPr>
-            <a:spLocks noGrp="1" noRot="1" noChangeAspect="1" noMove="1" noResize="1" noEditPoints="1" noAdjustHandles="1" noChangeArrowheads="1" noChangeShapeType="1" noTextEdit="1"/>
-          </p:cNvSpPr>
-          <p:nvPr>
-            <p:extLst>
-              <p:ext uri="{386F3935-93C4-4BCD-93E2-E3B085C9AB24}">
-                <p16:designElem xmlns:p16="http://schemas.microsoft.com/office/powerpoint/2015/main" val="1"/>
-              </p:ext>
-            </p:extLst>
-          </p:nvPr>
-        </p:nvSpPr>
-        <p:spPr>
-          <a:xfrm>
-            <a:off x="3740383" y="0"/>
-            <a:ext cx="8451607" cy="6858001"/>
-          </a:xfrm>
-          <a:prstGeom prst="rect">
-            <a:avLst/>
-          </a:prstGeom>
-          <a:solidFill>
-            <a:schemeClr val="bg1">
-              <a:lumMod val="95000"/>
-            </a:schemeClr>
-          </a:solidFill>
-          <a:ln>
-            <a:noFill/>
-          </a:ln>
-        </p:spPr>
-        <p:style>
-          <a:lnRef idx="2">
-            <a:schemeClr val="accent1">
-              <a:shade val="50000"/>
-            </a:schemeClr>
-          </a:lnRef>
-          <a:fillRef idx="1">
-            <a:schemeClr val="accent1"/>
-          </a:fillRef>
-          <a:effectRef idx="0">
-            <a:schemeClr val="accent1"/>
-          </a:effectRef>
-          <a:fontRef idx="minor">
-            <a:schemeClr val="lt1"/>
-          </a:fontRef>
-        </p:style>
-        <p:txBody>
-          <a:bodyPr rtlCol="0" anchor="ctr"/>
-          <a:lstStyle/>
-          <a:p>
-            <a:pPr algn="ctr"/>
-            <a:endParaRPr lang="en-US"/>
-          </a:p>
-        </p:txBody>
-      </p:sp>
-      <p:sp>
-        <p:nvSpPr>
-          <p:cNvPr id="19" name="Rectangle 18">
-            <a:extLst>
-              <a:ext uri="{FF2B5EF4-FFF2-40B4-BE49-F238E27FC236}">
-                <a16:creationId xmlns:a16="http://schemas.microsoft.com/office/drawing/2014/main" id="{E9DCFABB-42CE-8C97-A3CD-01F4648C0489}"/>
-              </a:ext>
-              <a:ext uri="{C183D7F6-B498-43B3-948B-1728B52AA6E4}">
-                <adec:decorative xmlns:adec="http://schemas.microsoft.com/office/drawing/2017/decorative" val="1"/>
-              </a:ext>
-            </a:extLst>
-          </p:cNvPr>
-          <p:cNvSpPr>
-            <a:spLocks noGrp="1" noRot="1" noChangeAspect="1" noMove="1" noResize="1" noEditPoints="1" noAdjustHandles="1" noChangeArrowheads="1" noChangeShapeType="1" noTextEdit="1"/>
-          </p:cNvSpPr>
-          <p:nvPr>
-            <p:extLst>
-              <p:ext uri="{386F3935-93C4-4BCD-93E2-E3B085C9AB24}">
-                <p16:designElem xmlns:p16="http://schemas.microsoft.com/office/powerpoint/2015/main" val="1"/>
-              </p:ext>
-            </p:extLst>
-          </p:nvPr>
-        </p:nvSpPr>
-        <p:spPr>
-          <a:xfrm>
-            <a:off x="10" y="0"/>
-            <a:ext cx="3745177" cy="6858001"/>
-          </a:xfrm>
-          <a:prstGeom prst="rect">
-            <a:avLst/>
-          </a:prstGeom>
-          <a:solidFill>
-            <a:schemeClr val="tx1">
-              <a:lumMod val="85000"/>
-              <a:lumOff val="15000"/>
-            </a:schemeClr>
-          </a:solidFill>
-          <a:ln>
-            <a:noFill/>
-          </a:ln>
-        </p:spPr>
-        <p:style>
-          <a:lnRef idx="2">
-            <a:schemeClr val="accent1">
-              <a:shade val="50000"/>
-            </a:schemeClr>
-          </a:lnRef>
-          <a:fillRef idx="1">
-            <a:schemeClr val="accent1"/>
-          </a:fillRef>
-          <a:effectRef idx="0">
-            <a:schemeClr val="accent1"/>
-          </a:effectRef>
-          <a:fontRef idx="minor">
-            <a:schemeClr val="lt1"/>
-          </a:fontRef>
-        </p:style>
-        <p:txBody>
-          <a:bodyPr rtlCol="0" anchor="ctr"/>
-          <a:lstStyle/>
-          <a:p>
-            <a:pPr algn="ctr"/>
-            <a:endParaRPr lang="en-US"/>
-          </a:p>
-        </p:txBody>
-      </p:sp>
-      <p:sp>
-        <p:nvSpPr>
-          <p:cNvPr id="2" name="Title 1">
-            <a:extLst>
-              <a:ext uri="{FF2B5EF4-FFF2-40B4-BE49-F238E27FC236}">
-                <a16:creationId xmlns:a16="http://schemas.microsoft.com/office/drawing/2014/main" id="{E183A313-F797-F728-04EA-533355890755}"/>
-              </a:ext>
-            </a:extLst>
-          </p:cNvPr>
-          <p:cNvSpPr>
-            <a:spLocks noGrp="1"/>
-          </p:cNvSpPr>
-          <p:nvPr>
-            <p:ph type="title"/>
-          </p:nvPr>
-        </p:nvSpPr>
-        <p:spPr>
-          <a:xfrm>
-            <a:off x="1" y="637762"/>
-            <a:ext cx="3740382" cy="5576770"/>
-          </a:xfrm>
-        </p:spPr>
-        <p:txBody>
-          <a:bodyPr anchor="t">
-            <a:normAutofit/>
-          </a:bodyPr>
-          <a:lstStyle/>
-          <a:p>
-            <a:pPr algn="ctr"/>
-            <a:r>
-              <a:rPr lang="en-US" sz="3600" dirty="0" err="1">
-                <a:solidFill>
-                  <a:schemeClr val="bg1"/>
-                </a:solidFill>
-              </a:rPr>
-              <a:t>Pygame</a:t>
-            </a:r>
-            <a:r>
-              <a:rPr lang="en-US" sz="3600" dirty="0">
-                <a:solidFill>
-                  <a:schemeClr val="bg1"/>
-                </a:solidFill>
-              </a:rPr>
-              <a:t> Surface</a:t>
-            </a:r>
-          </a:p>
-        </p:txBody>
-      </p:sp>
-      <p:sp>
-        <p:nvSpPr>
-          <p:cNvPr id="3" name="Content Placeholder 2">
-            <a:extLst>
-              <a:ext uri="{FF2B5EF4-FFF2-40B4-BE49-F238E27FC236}">
-                <a16:creationId xmlns:a16="http://schemas.microsoft.com/office/drawing/2014/main" id="{77A62FB1-B80A-7F82-35A6-43B04E2C07E4}"/>
-              </a:ext>
-            </a:extLst>
-          </p:cNvPr>
-          <p:cNvSpPr>
-            <a:spLocks noGrp="1"/>
-          </p:cNvSpPr>
-          <p:nvPr>
-            <p:ph idx="1"/>
-          </p:nvPr>
-        </p:nvSpPr>
-        <p:spPr>
-          <a:xfrm>
-            <a:off x="3740384" y="637762"/>
-            <a:ext cx="7989162" cy="6220238"/>
-          </a:xfrm>
-        </p:spPr>
-        <p:txBody>
-          <a:bodyPr>
-            <a:normAutofit/>
-          </a:bodyPr>
-          <a:lstStyle/>
-          <a:p>
-            <a:pPr marL="0" indent="0">
-              <a:buNone/>
-            </a:pPr>
-            <a:r>
-              <a:rPr lang="en-US" dirty="0" err="1"/>
-              <a:t>pygame.Surface</a:t>
-            </a:r>
-            <a:endParaRPr lang="en-US" dirty="0"/>
-          </a:p>
-          <a:p>
-            <a:pPr lvl="1"/>
-            <a:r>
-              <a:rPr lang="en-US" sz="2800" dirty="0"/>
-              <a:t>Used to draw images on the </a:t>
-            </a:r>
-            <a:r>
-              <a:rPr lang="en-US" sz="2800" dirty="0" err="1"/>
-              <a:t>pygame</a:t>
-            </a:r>
-            <a:r>
-              <a:rPr lang="en-US" sz="2800" dirty="0"/>
-              <a:t> window</a:t>
-            </a:r>
-          </a:p>
-          <a:p>
-            <a:pPr marL="0" indent="0">
-              <a:buNone/>
-            </a:pPr>
-            <a:r>
-              <a:rPr lang="en-US" dirty="0"/>
-              <a:t>Four “types” of surfaces</a:t>
-            </a:r>
-          </a:p>
-          <a:p>
-            <a:pPr lvl="1"/>
-            <a:r>
-              <a:rPr lang="en-US" sz="2800" dirty="0"/>
-              <a:t>Basic surface</a:t>
-            </a:r>
-          </a:p>
-          <a:p>
-            <a:pPr lvl="1"/>
-            <a:r>
-              <a:rPr lang="en-US" sz="2800" dirty="0"/>
-              <a:t>Main surface</a:t>
-            </a:r>
-          </a:p>
-          <a:p>
-            <a:pPr lvl="2"/>
-            <a:r>
-              <a:rPr lang="en-US" sz="2800" dirty="0"/>
-              <a:t>The base surface all other surfaces are drawn on top of</a:t>
-            </a:r>
-          </a:p>
-          <a:p>
-            <a:pPr lvl="1"/>
-            <a:r>
-              <a:rPr lang="en-US" sz="2800" dirty="0"/>
-              <a:t>Image surface</a:t>
-            </a:r>
-          </a:p>
-          <a:p>
-            <a:pPr lvl="2"/>
-            <a:r>
-              <a:rPr lang="en-US" sz="2800" dirty="0"/>
-              <a:t>Used to display image data</a:t>
-            </a:r>
-          </a:p>
-          <a:p>
-            <a:pPr lvl="1"/>
-            <a:r>
-              <a:rPr lang="en-US" sz="2800" dirty="0"/>
-              <a:t>Text surface</a:t>
-            </a:r>
-          </a:p>
-          <a:p>
-            <a:pPr lvl="2"/>
-            <a:r>
-              <a:rPr lang="en-US" sz="2800" dirty="0"/>
-              <a:t>Used to render text</a:t>
-            </a:r>
-          </a:p>
-          <a:p>
-            <a:pPr marL="0" indent="0">
-              <a:buNone/>
-            </a:pPr>
-            <a:r>
-              <a:rPr lang="en-US" dirty="0" err="1"/>
-              <a:t>Surface.blit</a:t>
-            </a:r>
-            <a:r>
-              <a:rPr lang="en-US" dirty="0"/>
-              <a:t>(surface, </a:t>
-            </a:r>
-            <a:r>
-              <a:rPr lang="en-US" dirty="0" err="1"/>
-              <a:t>rect</a:t>
-            </a:r>
-            <a:r>
-              <a:rPr lang="en-US" dirty="0"/>
-              <a:t>)</a:t>
-            </a:r>
-          </a:p>
-          <a:p>
-            <a:pPr lvl="1"/>
-            <a:r>
-              <a:rPr lang="en-US" sz="2800" dirty="0"/>
-              <a:t>Used to draw any surface to any other surface</a:t>
-            </a:r>
-          </a:p>
-          <a:p>
-            <a:pPr marL="0" indent="0">
-              <a:buNone/>
-            </a:pPr>
-            <a:endParaRPr lang="en-US" dirty="0"/>
-          </a:p>
-        </p:txBody>
-      </p:sp>
-    </p:spTree>
-    <p:extLst>
-      <p:ext uri="{BB962C8B-B14F-4D97-AF65-F5344CB8AC3E}">
-        <p14:creationId xmlns:p14="http://schemas.microsoft.com/office/powerpoint/2010/main" val="1240660593"/>
       </p:ext>
     </p:extLst>
   </p:cSld>

</xml_diff>

<commit_message>
edited an example in a slide
</commit_message>
<xml_diff>
--- a/Introduction to Pygame.pptx
+++ b/Introduction to Pygame.pptx
@@ -16712,8 +16712,13 @@
             <a:pPr lvl="1"/>
             <a:r>
               <a:rPr lang="en-US" sz="2800" dirty="0"/>
-              <a:t>Mac: press</a:t>
-            </a:r>
+              <a:t>Mac: press ‘</a:t>
+            </a:r>
+            <a:r>
+              <a:rPr lang="en-US" dirty="0"/>
+              <a:t>⌘’ + ‘.’</a:t>
+            </a:r>
+            <a:endParaRPr lang="en-US" sz="2800" dirty="0"/>
           </a:p>
           <a:p>
             <a:pPr marL="0" indent="0">

</xml_diff>